<commit_message>
Prepared for chapter 6
</commit_message>
<xml_diff>
--- a/ChapterOverviews_picturesOfService.pptx
+++ b/ChapterOverviews_picturesOfService.pptx
@@ -8,7 +8,8 @@
     <p:sldId id="257" r:id="rId2"/>
     <p:sldId id="258" r:id="rId3"/>
     <p:sldId id="260" r:id="rId4"/>
-    <p:sldId id="259" r:id="rId5"/>
+    <p:sldId id="261" r:id="rId5"/>
+    <p:sldId id="259" r:id="rId6"/>
   </p:sldIdLst>
   <p:sldSz cx="9144000" cy="6858000" type="screen4x3"/>
   <p:notesSz cx="6858000" cy="9144000"/>
@@ -4712,11 +4713,7 @@
             </a:r>
             <a:r>
               <a:rPr lang="nl-NL" dirty="0" smtClean="0"/>
-              <a:t> </a:t>
-            </a:r>
-            <a:r>
-              <a:rPr lang="nl-NL" dirty="0" smtClean="0"/>
-              <a:t>5</a:t>
+              <a:t> 5</a:t>
             </a:r>
             <a:endParaRPr lang="en-US" dirty="0"/>
           </a:p>
@@ -5097,6 +5094,114 @@
           </a:fontRef>
         </p:style>
       </p:cxnSp>
+      <p:pic>
+        <p:nvPicPr>
+          <p:cNvPr id="1026" name="Picture 2"/>
+          <p:cNvPicPr>
+            <a:picLocks noChangeAspect="1" noChangeArrowheads="1"/>
+          </p:cNvPicPr>
+          <p:nvPr/>
+        </p:nvPicPr>
+        <p:blipFill>
+          <a:blip r:embed="rId6">
+            <a:extLst>
+              <a:ext uri="{28A0092B-C50C-407E-A947-70E740481C1C}">
+                <a14:useLocalDpi xmlns:a14="http://schemas.microsoft.com/office/drawing/2010/main" val="0"/>
+              </a:ext>
+            </a:extLst>
+          </a:blip>
+          <a:srcRect/>
+          <a:stretch>
+            <a:fillRect/>
+          </a:stretch>
+        </p:blipFill>
+        <p:spPr bwMode="auto">
+          <a:xfrm>
+            <a:off x="179511" y="404664"/>
+            <a:ext cx="1858963" cy="517525"/>
+          </a:xfrm>
+          <a:prstGeom prst="rect">
+            <a:avLst/>
+          </a:prstGeom>
+          <a:noFill/>
+          <a:ln>
+            <a:noFill/>
+          </a:ln>
+          <a:extLst>
+            <a:ext uri="{909E8E84-426E-40DD-AFC4-6F175D3DCCD1}">
+              <a14:hiddenFill xmlns:a14="http://schemas.microsoft.com/office/drawing/2010/main">
+                <a:solidFill>
+                  <a:schemeClr val="accent1"/>
+                </a:solidFill>
+              </a14:hiddenFill>
+            </a:ext>
+            <a:ext uri="{91240B29-F687-4F45-9708-019B960494DF}">
+              <a14:hiddenLine xmlns:a14="http://schemas.microsoft.com/office/drawing/2010/main" w="9525">
+                <a:solidFill>
+                  <a:schemeClr val="tx1"/>
+                </a:solidFill>
+                <a:miter lim="800000"/>
+                <a:headEnd/>
+                <a:tailEnd/>
+              </a14:hiddenLine>
+            </a:ext>
+          </a:extLst>
+        </p:spPr>
+      </p:pic>
+      <p:pic>
+        <p:nvPicPr>
+          <p:cNvPr id="1027" name="Picture 3"/>
+          <p:cNvPicPr>
+            <a:picLocks noChangeAspect="1" noChangeArrowheads="1"/>
+          </p:cNvPicPr>
+          <p:nvPr/>
+        </p:nvPicPr>
+        <p:blipFill>
+          <a:blip r:embed="rId7">
+            <a:extLst>
+              <a:ext uri="{28A0092B-C50C-407E-A947-70E740481C1C}">
+                <a14:useLocalDpi xmlns:a14="http://schemas.microsoft.com/office/drawing/2010/main" val="0"/>
+              </a:ext>
+            </a:extLst>
+          </a:blip>
+          <a:srcRect/>
+          <a:stretch>
+            <a:fillRect/>
+          </a:stretch>
+        </p:blipFill>
+        <p:spPr bwMode="auto">
+          <a:xfrm>
+            <a:off x="179511" y="1052736"/>
+            <a:ext cx="1806575" cy="411163"/>
+          </a:xfrm>
+          <a:prstGeom prst="rect">
+            <a:avLst/>
+          </a:prstGeom>
+          <a:noFill/>
+          <a:ln>
+            <a:noFill/>
+          </a:ln>
+          <a:extLst>
+            <a:ext uri="{909E8E84-426E-40DD-AFC4-6F175D3DCCD1}">
+              <a14:hiddenFill xmlns:a14="http://schemas.microsoft.com/office/drawing/2010/main">
+                <a:solidFill>
+                  <a:schemeClr val="accent1"/>
+                </a:solidFill>
+              </a14:hiddenFill>
+            </a:ext>
+            <a:ext uri="{91240B29-F687-4F45-9708-019B960494DF}">
+              <a14:hiddenLine xmlns:a14="http://schemas.microsoft.com/office/drawing/2010/main" w="9525">
+                <a:solidFill>
+                  <a:schemeClr val="tx1"/>
+                </a:solidFill>
+                <a:miter lim="800000"/>
+                <a:headEnd/>
+                <a:tailEnd/>
+              </a14:hiddenLine>
+            </a:ext>
+          </a:extLst>
+        </p:spPr>
+      </p:pic>
     </p:spTree>
     <p:extLst>
       <p:ext uri="{BB962C8B-B14F-4D97-AF65-F5344CB8AC3E}">
@@ -5136,65 +5241,6 @@
       </p:grpSpPr>
       <p:sp>
         <p:nvSpPr>
-          <p:cNvPr id="12" name="Rounded Rectangle 11"/>
-          <p:cNvSpPr/>
-          <p:nvPr/>
-        </p:nvSpPr>
-        <p:spPr>
-          <a:xfrm>
-            <a:off x="6264712" y="4177213"/>
-            <a:ext cx="2448272" cy="1008112"/>
-          </a:xfrm>
-          <a:prstGeom prst="roundRect">
-            <a:avLst/>
-          </a:prstGeom>
-        </p:spPr>
-        <p:style>
-          <a:lnRef idx="2">
-            <a:schemeClr val="accent1">
-              <a:shade val="50000"/>
-            </a:schemeClr>
-          </a:lnRef>
-          <a:fillRef idx="1">
-            <a:schemeClr val="accent1"/>
-          </a:fillRef>
-          <a:effectRef idx="0">
-            <a:schemeClr val="accent1"/>
-          </a:effectRef>
-          <a:fontRef idx="minor">
-            <a:schemeClr val="lt1"/>
-          </a:fontRef>
-        </p:style>
-        <p:txBody>
-          <a:bodyPr rtlCol="0" anchor="ctr"/>
-          <a:lstStyle/>
-          <a:p>
-            <a:pPr algn="ctr"/>
-            <a:r>
-              <a:rPr lang="nl-NL" sz="1400" dirty="0" err="1" smtClean="0"/>
-              <a:t>SlotService</a:t>
-            </a:r>
-            <a:r>
-              <a:rPr lang="nl-NL" sz="1400" dirty="0" smtClean="0"/>
-              <a:t> (Ch4)</a:t>
-            </a:r>
-          </a:p>
-          <a:p>
-            <a:pPr algn="ctr"/>
-            <a:endParaRPr lang="nl-NL" sz="1400" dirty="0"/>
-          </a:p>
-          <a:p>
-            <a:pPr algn="ctr"/>
-            <a:endParaRPr lang="nl-NL" sz="1400" dirty="0" smtClean="0"/>
-          </a:p>
-          <a:p>
-            <a:pPr algn="ctr"/>
-            <a:endParaRPr lang="en-US" sz="1400" dirty="0"/>
-          </a:p>
-        </p:txBody>
-      </p:sp>
-      <p:sp>
-        <p:nvSpPr>
           <p:cNvPr id="2" name="Title 1"/>
           <p:cNvSpPr>
             <a:spLocks noGrp="1"/>
@@ -5214,104 +5260,26 @@
             </a:r>
             <a:r>
               <a:rPr lang="nl-NL" dirty="0" smtClean="0"/>
-              <a:t> 13</a:t>
+              <a:t> </a:t>
+            </a:r>
+            <a:r>
+              <a:rPr lang="nl-NL" dirty="0" smtClean="0"/>
+              <a:t>6</a:t>
             </a:r>
             <a:endParaRPr lang="en-US" dirty="0"/>
-          </a:p>
-        </p:txBody>
-      </p:sp>
-      <p:sp>
-        <p:nvSpPr>
-          <p:cNvPr id="4" name="Flowchart: Magnetic Disk 3"/>
-          <p:cNvSpPr/>
-          <p:nvPr/>
-        </p:nvSpPr>
-        <p:spPr>
-          <a:xfrm>
-            <a:off x="6957435" y="5459319"/>
-            <a:ext cx="2016224" cy="1224136"/>
-          </a:xfrm>
-          <a:prstGeom prst="flowChartMagneticDisk">
-            <a:avLst/>
-          </a:prstGeom>
-        </p:spPr>
-        <p:style>
-          <a:lnRef idx="1">
-            <a:schemeClr val="accent2"/>
-          </a:lnRef>
-          <a:fillRef idx="2">
-            <a:schemeClr val="accent2"/>
-          </a:fillRef>
-          <a:effectRef idx="1">
-            <a:schemeClr val="accent2"/>
-          </a:effectRef>
-          <a:fontRef idx="minor">
-            <a:schemeClr val="dk1"/>
-          </a:fontRef>
-        </p:style>
-        <p:txBody>
-          <a:bodyPr rtlCol="0" anchor="ctr"/>
-          <a:lstStyle/>
-          <a:p>
-            <a:pPr algn="ctr"/>
-            <a:endParaRPr lang="en-US"/>
-          </a:p>
-        </p:txBody>
-      </p:sp>
-      <p:sp>
-        <p:nvSpPr>
-          <p:cNvPr id="7" name="Oval 6"/>
-          <p:cNvSpPr/>
-          <p:nvPr/>
-        </p:nvSpPr>
-        <p:spPr>
-          <a:xfrm>
-            <a:off x="7291393" y="6214848"/>
-            <a:ext cx="1348307" cy="432048"/>
-          </a:xfrm>
-          <a:prstGeom prst="ellipse">
-            <a:avLst/>
-          </a:prstGeom>
-        </p:spPr>
-        <p:style>
-          <a:lnRef idx="2">
-            <a:schemeClr val="accent1">
-              <a:shade val="50000"/>
-            </a:schemeClr>
-          </a:lnRef>
-          <a:fillRef idx="1">
-            <a:schemeClr val="accent1"/>
-          </a:fillRef>
-          <a:effectRef idx="0">
-            <a:schemeClr val="accent1"/>
-          </a:effectRef>
-          <a:fontRef idx="minor">
-            <a:schemeClr val="lt1"/>
-          </a:fontRef>
-        </p:style>
-        <p:txBody>
-          <a:bodyPr rtlCol="0" anchor="ctr"/>
-          <a:lstStyle/>
-          <a:p>
-            <a:pPr algn="ctr"/>
-            <a:r>
-              <a:rPr lang="nl-NL" sz="1200" dirty="0" err="1" smtClean="0"/>
-              <a:t>fut_allocate_slots</a:t>
-            </a:r>
-            <a:endParaRPr lang="en-US" sz="1200" dirty="0"/>
           </a:p>
         </p:txBody>
       </p:sp>
       <p:pic>
         <p:nvPicPr>
-          <p:cNvPr id="2056" name="Picture 8"/>
+          <p:cNvPr id="2051" name="Picture 3"/>
           <p:cNvPicPr>
             <a:picLocks noChangeAspect="1" noChangeArrowheads="1"/>
           </p:cNvPicPr>
           <p:nvPr/>
         </p:nvPicPr>
         <p:blipFill>
-          <a:blip r:embed="rId2" cstate="print">
+          <a:blip r:embed="rId2">
             <a:extLst>
               <a:ext uri="{28A0092B-C50C-407E-A947-70E740481C1C}">
                 <a14:useLocalDpi xmlns:a14="http://schemas.microsoft.com/office/drawing/2010/main" val="0"/>
@@ -5325,8 +5293,8 @@
         </p:blipFill>
         <p:spPr bwMode="auto">
           <a:xfrm>
-            <a:off x="6352878" y="4495664"/>
-            <a:ext cx="2216090" cy="617653"/>
+            <a:off x="1620732" y="2204864"/>
+            <a:ext cx="5148436" cy="1579728"/>
           </a:xfrm>
           <a:prstGeom prst="rect">
             <a:avLst/>
@@ -5356,16 +5324,418 @@
           </a:extLst>
         </p:spPr>
       </p:pic>
-      <p:sp>
-        <p:nvSpPr>
-          <p:cNvPr id="25" name="Flowchart: Magnetic Disk 24"/>
+      <p:cxnSp>
+        <p:nvCxnSpPr>
+          <p:cNvPr id="6" name="Straight Arrow Connector 5"/>
+          <p:cNvCxnSpPr/>
+          <p:nvPr/>
+        </p:nvCxnSpPr>
+        <p:spPr>
+          <a:xfrm>
+            <a:off x="6300192" y="3573016"/>
+            <a:ext cx="1008112" cy="144016"/>
+          </a:xfrm>
+          <a:prstGeom prst="straightConnector1">
+            <a:avLst/>
+          </a:prstGeom>
+          <a:ln>
+            <a:tailEnd type="arrow"/>
+          </a:ln>
+        </p:spPr>
+        <p:style>
+          <a:lnRef idx="1">
+            <a:schemeClr val="accent1"/>
+          </a:lnRef>
+          <a:fillRef idx="0">
+            <a:schemeClr val="accent1"/>
+          </a:fillRef>
+          <a:effectRef idx="0">
+            <a:schemeClr val="accent1"/>
+          </a:effectRef>
+          <a:fontRef idx="minor">
+            <a:schemeClr val="tx1"/>
+          </a:fontRef>
+        </p:style>
+      </p:cxnSp>
+      <p:sp>
+        <p:nvSpPr>
+          <p:cNvPr id="7" name="Cube 6"/>
           <p:cNvSpPr/>
           <p:nvPr/>
         </p:nvSpPr>
         <p:spPr>
           <a:xfrm>
-            <a:off x="179512" y="1484784"/>
-            <a:ext cx="1512168" cy="1684007"/>
+            <a:off x="7452320" y="3356992"/>
+            <a:ext cx="1368152" cy="864096"/>
+          </a:xfrm>
+          <a:prstGeom prst="cube">
+            <a:avLst/>
+          </a:prstGeom>
+        </p:spPr>
+        <p:style>
+          <a:lnRef idx="2">
+            <a:schemeClr val="accent1">
+              <a:shade val="50000"/>
+            </a:schemeClr>
+          </a:lnRef>
+          <a:fillRef idx="1">
+            <a:schemeClr val="accent1"/>
+          </a:fillRef>
+          <a:effectRef idx="0">
+            <a:schemeClr val="accent1"/>
+          </a:effectRef>
+          <a:fontRef idx="minor">
+            <a:schemeClr val="lt1"/>
+          </a:fontRef>
+        </p:style>
+        <p:txBody>
+          <a:bodyPr rtlCol="0" anchor="ctr"/>
+          <a:lstStyle/>
+          <a:p>
+            <a:pPr algn="ctr"/>
+            <a:r>
+              <a:rPr lang="nl-NL" dirty="0" smtClean="0"/>
+              <a:t>Gmail</a:t>
+            </a:r>
+            <a:endParaRPr lang="en-US" dirty="0"/>
+          </a:p>
+        </p:txBody>
+      </p:sp>
+      <p:sp>
+        <p:nvSpPr>
+          <p:cNvPr id="18" name="Cube 17"/>
+          <p:cNvSpPr/>
+          <p:nvPr/>
+        </p:nvSpPr>
+        <p:spPr>
+          <a:xfrm>
+            <a:off x="7380312" y="4797152"/>
+            <a:ext cx="1368152" cy="864096"/>
+          </a:xfrm>
+          <a:prstGeom prst="cube">
+            <a:avLst/>
+          </a:prstGeom>
+        </p:spPr>
+        <p:style>
+          <a:lnRef idx="2">
+            <a:schemeClr val="accent1">
+              <a:shade val="50000"/>
+            </a:schemeClr>
+          </a:lnRef>
+          <a:fillRef idx="1">
+            <a:schemeClr val="accent1"/>
+          </a:fillRef>
+          <a:effectRef idx="0">
+            <a:schemeClr val="accent1"/>
+          </a:effectRef>
+          <a:fontRef idx="minor">
+            <a:schemeClr val="lt1"/>
+          </a:fontRef>
+        </p:style>
+        <p:txBody>
+          <a:bodyPr rtlCol="0" anchor="ctr"/>
+          <a:lstStyle/>
+          <a:p>
+            <a:pPr algn="ctr"/>
+            <a:r>
+              <a:rPr lang="nl-NL" dirty="0" err="1" smtClean="0"/>
+              <a:t>Any</a:t>
+            </a:r>
+            <a:r>
+              <a:rPr lang="nl-NL" dirty="0" smtClean="0"/>
+              <a:t> mail</a:t>
+            </a:r>
+            <a:endParaRPr lang="en-US" dirty="0"/>
+          </a:p>
+        </p:txBody>
+      </p:sp>
+      <p:cxnSp>
+        <p:nvCxnSpPr>
+          <p:cNvPr id="10" name="Straight Arrow Connector 9"/>
+          <p:cNvCxnSpPr>
+            <a:stCxn id="7" idx="3"/>
+          </p:cNvCxnSpPr>
+          <p:nvPr/>
+        </p:nvCxnSpPr>
+        <p:spPr>
+          <a:xfrm>
+            <a:off x="8028384" y="4221088"/>
+            <a:ext cx="0" cy="720080"/>
+          </a:xfrm>
+          <a:prstGeom prst="straightConnector1">
+            <a:avLst/>
+          </a:prstGeom>
+          <a:ln>
+            <a:solidFill>
+              <a:schemeClr val="tx2">
+                <a:lumMod val="75000"/>
+              </a:schemeClr>
+            </a:solidFill>
+            <a:tailEnd type="arrow"/>
+          </a:ln>
+        </p:spPr>
+        <p:style>
+          <a:lnRef idx="1">
+            <a:schemeClr val="accent1"/>
+          </a:lnRef>
+          <a:fillRef idx="0">
+            <a:schemeClr val="accent1"/>
+          </a:fillRef>
+          <a:effectRef idx="0">
+            <a:schemeClr val="accent1"/>
+          </a:effectRef>
+          <a:fontRef idx="minor">
+            <a:schemeClr val="tx1"/>
+          </a:fontRef>
+        </p:style>
+      </p:cxnSp>
+      <p:pic>
+        <p:nvPicPr>
+          <p:cNvPr id="2052" name="Picture 4"/>
+          <p:cNvPicPr>
+            <a:picLocks noChangeAspect="1" noChangeArrowheads="1"/>
+          </p:cNvPicPr>
+          <p:nvPr/>
+        </p:nvPicPr>
+        <p:blipFill>
+          <a:blip r:embed="rId3">
+            <a:extLst>
+              <a:ext uri="{28A0092B-C50C-407E-A947-70E740481C1C}">
+                <a14:useLocalDpi xmlns:a14="http://schemas.microsoft.com/office/drawing/2010/main" val="0"/>
+              </a:ext>
+            </a:extLst>
+          </a:blip>
+          <a:srcRect/>
+          <a:stretch>
+            <a:fillRect/>
+          </a:stretch>
+        </p:blipFill>
+        <p:spPr bwMode="auto">
+          <a:xfrm>
+            <a:off x="8244408" y="2909515"/>
+            <a:ext cx="702568" cy="583222"/>
+          </a:xfrm>
+          <a:prstGeom prst="rect">
+            <a:avLst/>
+          </a:prstGeom>
+          <a:noFill/>
+          <a:ln>
+            <a:noFill/>
+          </a:ln>
+          <a:extLst>
+            <a:ext uri="{909E8E84-426E-40DD-AFC4-6F175D3DCCD1}">
+              <a14:hiddenFill xmlns:a14="http://schemas.microsoft.com/office/drawing/2010/main">
+                <a:solidFill>
+                  <a:schemeClr val="accent1"/>
+                </a:solidFill>
+              </a14:hiddenFill>
+            </a:ext>
+            <a:ext uri="{91240B29-F687-4F45-9708-019B960494DF}">
+              <a14:hiddenLine xmlns:a14="http://schemas.microsoft.com/office/drawing/2010/main" w="9525">
+                <a:solidFill>
+                  <a:schemeClr val="tx1"/>
+                </a:solidFill>
+                <a:miter lim="800000"/>
+                <a:headEnd/>
+                <a:tailEnd/>
+              </a14:hiddenLine>
+            </a:ext>
+          </a:extLst>
+        </p:spPr>
+      </p:pic>
+      <p:pic>
+        <p:nvPicPr>
+          <p:cNvPr id="2053" name="Picture 5"/>
+          <p:cNvPicPr>
+            <a:picLocks noChangeAspect="1" noChangeArrowheads="1"/>
+          </p:cNvPicPr>
+          <p:nvPr/>
+        </p:nvPicPr>
+        <p:blipFill>
+          <a:blip r:embed="rId4">
+            <a:extLst>
+              <a:ext uri="{28A0092B-C50C-407E-A947-70E740481C1C}">
+                <a14:useLocalDpi xmlns:a14="http://schemas.microsoft.com/office/drawing/2010/main" val="0"/>
+              </a:ext>
+            </a:extLst>
+          </a:blip>
+          <a:srcRect/>
+          <a:stretch>
+            <a:fillRect/>
+          </a:stretch>
+        </p:blipFill>
+        <p:spPr bwMode="auto">
+          <a:xfrm>
+            <a:off x="676291" y="5644714"/>
+            <a:ext cx="8283575" cy="342900"/>
+          </a:xfrm>
+          <a:prstGeom prst="rect">
+            <a:avLst/>
+          </a:prstGeom>
+          <a:ln>
+            <a:noFill/>
+          </a:ln>
+          <a:effectLst>
+            <a:outerShdw blurRad="292100" dist="139700" dir="2700000" algn="tl" rotWithShape="0">
+              <a:srgbClr val="333333">
+                <a:alpha val="65000"/>
+              </a:srgbClr>
+            </a:outerShdw>
+          </a:effectLst>
+          <a:extLst>
+            <a:ext uri="{909E8E84-426E-40DD-AFC4-6F175D3DCCD1}">
+              <a14:hiddenFill xmlns:a14="http://schemas.microsoft.com/office/drawing/2010/main">
+                <a:solidFill>
+                  <a:schemeClr val="accent1"/>
+                </a:solidFill>
+              </a14:hiddenFill>
+            </a:ext>
+            <a:ext uri="{91240B29-F687-4F45-9708-019B960494DF}">
+              <a14:hiddenLine xmlns:a14="http://schemas.microsoft.com/office/drawing/2010/main" w="9525">
+                <a:solidFill>
+                  <a:schemeClr val="tx1"/>
+                </a:solidFill>
+                <a:miter lim="800000"/>
+                <a:headEnd/>
+                <a:tailEnd/>
+              </a14:hiddenLine>
+            </a:ext>
+          </a:extLst>
+        </p:spPr>
+      </p:pic>
+    </p:spTree>
+    <p:extLst>
+      <p:ext uri="{BB962C8B-B14F-4D97-AF65-F5344CB8AC3E}">
+        <p14:creationId xmlns:p14="http://schemas.microsoft.com/office/powerpoint/2010/main" val="2472052023"/>
+      </p:ext>
+    </p:extLst>
+  </p:cSld>
+  <p:clrMapOvr>
+    <a:masterClrMapping/>
+  </p:clrMapOvr>
+  <p:timing>
+    <p:tnLst>
+      <p:par>
+        <p:cTn id="1" dur="indefinite" restart="never" nodeType="tmRoot"/>
+      </p:par>
+    </p:tnLst>
+  </p:timing>
+</p:sld>
+</file>
+
+<file path=ppt/slides/slide5.xml><?xml version="1.0" encoding="utf-8"?>
+<p:sld xmlns:a="http://schemas.openxmlformats.org/drawingml/2006/main" xmlns:r="http://schemas.openxmlformats.org/officeDocument/2006/relationships" xmlns:p="http://schemas.openxmlformats.org/presentationml/2006/main">
+  <p:cSld>
+    <p:spTree>
+      <p:nvGrpSpPr>
+        <p:cNvPr id="1" name=""/>
+        <p:cNvGrpSpPr/>
+        <p:nvPr/>
+      </p:nvGrpSpPr>
+      <p:grpSpPr>
+        <a:xfrm>
+          <a:off x="0" y="0"/>
+          <a:ext cx="0" cy="0"/>
+          <a:chOff x="0" y="0"/>
+          <a:chExt cx="0" cy="0"/>
+        </a:xfrm>
+      </p:grpSpPr>
+      <p:sp>
+        <p:nvSpPr>
+          <p:cNvPr id="12" name="Rounded Rectangle 11"/>
+          <p:cNvSpPr/>
+          <p:nvPr/>
+        </p:nvSpPr>
+        <p:spPr>
+          <a:xfrm>
+            <a:off x="6264712" y="4177213"/>
+            <a:ext cx="2448272" cy="1008112"/>
+          </a:xfrm>
+          <a:prstGeom prst="roundRect">
+            <a:avLst/>
+          </a:prstGeom>
+        </p:spPr>
+        <p:style>
+          <a:lnRef idx="2">
+            <a:schemeClr val="accent1">
+              <a:shade val="50000"/>
+            </a:schemeClr>
+          </a:lnRef>
+          <a:fillRef idx="1">
+            <a:schemeClr val="accent1"/>
+          </a:fillRef>
+          <a:effectRef idx="0">
+            <a:schemeClr val="accent1"/>
+          </a:effectRef>
+          <a:fontRef idx="minor">
+            <a:schemeClr val="lt1"/>
+          </a:fontRef>
+        </p:style>
+        <p:txBody>
+          <a:bodyPr rtlCol="0" anchor="ctr"/>
+          <a:lstStyle/>
+          <a:p>
+            <a:pPr algn="ctr"/>
+            <a:r>
+              <a:rPr lang="nl-NL" sz="1400" dirty="0" err="1" smtClean="0"/>
+              <a:t>SlotService</a:t>
+            </a:r>
+            <a:r>
+              <a:rPr lang="nl-NL" sz="1400" dirty="0" smtClean="0"/>
+              <a:t> (Ch4)</a:t>
+            </a:r>
+          </a:p>
+          <a:p>
+            <a:pPr algn="ctr"/>
+            <a:endParaRPr lang="nl-NL" sz="1400" dirty="0"/>
+          </a:p>
+          <a:p>
+            <a:pPr algn="ctr"/>
+            <a:endParaRPr lang="nl-NL" sz="1400" dirty="0" smtClean="0"/>
+          </a:p>
+          <a:p>
+            <a:pPr algn="ctr"/>
+            <a:endParaRPr lang="en-US" sz="1400" dirty="0"/>
+          </a:p>
+        </p:txBody>
+      </p:sp>
+      <p:sp>
+        <p:nvSpPr>
+          <p:cNvPr id="2" name="Title 1"/>
+          <p:cNvSpPr>
+            <a:spLocks noGrp="1"/>
+          </p:cNvSpPr>
+          <p:nvPr>
+            <p:ph type="title"/>
+          </p:nvPr>
+        </p:nvSpPr>
+        <p:spPr/>
+        <p:txBody>
+          <a:bodyPr/>
+          <a:lstStyle/>
+          <a:p>
+            <a:r>
+              <a:rPr lang="nl-NL" dirty="0" err="1" smtClean="0"/>
+              <a:t>Chapter</a:t>
+            </a:r>
+            <a:r>
+              <a:rPr lang="nl-NL" dirty="0" smtClean="0"/>
+              <a:t> 13</a:t>
+            </a:r>
+            <a:endParaRPr lang="en-US" dirty="0"/>
+          </a:p>
+        </p:txBody>
+      </p:sp>
+      <p:sp>
+        <p:nvSpPr>
+          <p:cNvPr id="4" name="Flowchart: Magnetic Disk 3"/>
+          <p:cNvSpPr/>
+          <p:nvPr/>
+        </p:nvSpPr>
+        <p:spPr>
+          <a:xfrm>
+            <a:off x="6957435" y="5459319"/>
+            <a:ext cx="2016224" cy="1224136"/>
           </a:xfrm>
           <a:prstGeom prst="flowChartMagneticDisk">
             <a:avLst/>
@@ -5396,16 +5766,16 @@
       </p:sp>
       <p:sp>
         <p:nvSpPr>
-          <p:cNvPr id="26" name="Rectangle 25"/>
+          <p:cNvPr id="7" name="Oval 6"/>
           <p:cNvSpPr/>
           <p:nvPr/>
         </p:nvSpPr>
         <p:spPr>
           <a:xfrm>
-            <a:off x="372202" y="2564904"/>
-            <a:ext cx="1128124" cy="288032"/>
-          </a:xfrm>
-          <a:prstGeom prst="rect">
+            <a:off x="7291393" y="6214848"/>
+            <a:ext cx="1348307" cy="432048"/>
+          </a:xfrm>
+          <a:prstGeom prst="ellipse">
             <a:avLst/>
           </a:prstGeom>
         </p:spPr>
@@ -5431,10 +5801,145 @@
           <a:p>
             <a:pPr algn="ctr"/>
             <a:r>
+              <a:rPr lang="nl-NL" sz="1200" dirty="0" err="1" smtClean="0"/>
+              <a:t>fut_allocate_slots</a:t>
+            </a:r>
+            <a:endParaRPr lang="en-US" sz="1200" dirty="0"/>
+          </a:p>
+        </p:txBody>
+      </p:sp>
+      <p:pic>
+        <p:nvPicPr>
+          <p:cNvPr id="2056" name="Picture 8"/>
+          <p:cNvPicPr>
+            <a:picLocks noChangeAspect="1" noChangeArrowheads="1"/>
+          </p:cNvPicPr>
+          <p:nvPr/>
+        </p:nvPicPr>
+        <p:blipFill>
+          <a:blip r:embed="rId2" cstate="print">
+            <a:extLst>
+              <a:ext uri="{28A0092B-C50C-407E-A947-70E740481C1C}">
+                <a14:useLocalDpi xmlns:a14="http://schemas.microsoft.com/office/drawing/2010/main" val="0"/>
+              </a:ext>
+            </a:extLst>
+          </a:blip>
+          <a:srcRect/>
+          <a:stretch>
+            <a:fillRect/>
+          </a:stretch>
+        </p:blipFill>
+        <p:spPr bwMode="auto">
+          <a:xfrm>
+            <a:off x="6352878" y="4495664"/>
+            <a:ext cx="2216090" cy="617653"/>
+          </a:xfrm>
+          <a:prstGeom prst="rect">
+            <a:avLst/>
+          </a:prstGeom>
+          <a:noFill/>
+          <a:ln>
+            <a:noFill/>
+          </a:ln>
+          <a:extLst>
+            <a:ext uri="{909E8E84-426E-40DD-AFC4-6F175D3DCCD1}">
+              <a14:hiddenFill xmlns:a14="http://schemas.microsoft.com/office/drawing/2010/main">
+                <a:solidFill>
+                  <a:schemeClr val="accent1"/>
+                </a:solidFill>
+              </a14:hiddenFill>
+            </a:ext>
+            <a:ext uri="{91240B29-F687-4F45-9708-019B960494DF}">
+              <a14:hiddenLine xmlns:a14="http://schemas.microsoft.com/office/drawing/2010/main" w="9525">
+                <a:solidFill>
+                  <a:schemeClr val="tx1"/>
+                </a:solidFill>
+                <a:miter lim="800000"/>
+                <a:headEnd/>
+                <a:tailEnd/>
+              </a14:hiddenLine>
+            </a:ext>
+          </a:extLst>
+        </p:spPr>
+      </p:pic>
+      <p:sp>
+        <p:nvSpPr>
+          <p:cNvPr id="25" name="Flowchart: Magnetic Disk 24"/>
+          <p:cNvSpPr/>
+          <p:nvPr/>
+        </p:nvSpPr>
+        <p:spPr>
+          <a:xfrm>
+            <a:off x="179512" y="1484784"/>
+            <a:ext cx="1512168" cy="1684007"/>
+          </a:xfrm>
+          <a:prstGeom prst="flowChartMagneticDisk">
+            <a:avLst/>
+          </a:prstGeom>
+        </p:spPr>
+        <p:style>
+          <a:lnRef idx="1">
+            <a:schemeClr val="accent2"/>
+          </a:lnRef>
+          <a:fillRef idx="2">
+            <a:schemeClr val="accent2"/>
+          </a:fillRef>
+          <a:effectRef idx="1">
+            <a:schemeClr val="accent2"/>
+          </a:effectRef>
+          <a:fontRef idx="minor">
+            <a:schemeClr val="dk1"/>
+          </a:fontRef>
+        </p:style>
+        <p:txBody>
+          <a:bodyPr rtlCol="0" anchor="ctr"/>
+          <a:lstStyle/>
+          <a:p>
+            <a:pPr algn="ctr"/>
+            <a:endParaRPr lang="en-US"/>
+          </a:p>
+        </p:txBody>
+      </p:sp>
+      <p:sp>
+        <p:nvSpPr>
+          <p:cNvPr id="26" name="Rectangle 25"/>
+          <p:cNvSpPr/>
+          <p:nvPr/>
+        </p:nvSpPr>
+        <p:spPr>
+          <a:xfrm>
+            <a:off x="372202" y="2564904"/>
+            <a:ext cx="1128124" cy="288032"/>
+          </a:xfrm>
+          <a:prstGeom prst="rect">
+            <a:avLst/>
+          </a:prstGeom>
+        </p:spPr>
+        <p:style>
+          <a:lnRef idx="2">
+            <a:schemeClr val="accent1">
+              <a:shade val="50000"/>
+            </a:schemeClr>
+          </a:lnRef>
+          <a:fillRef idx="1">
+            <a:schemeClr val="accent1"/>
+          </a:fillRef>
+          <a:effectRef idx="0">
+            <a:schemeClr val="accent1"/>
+          </a:effectRef>
+          <a:fontRef idx="minor">
+            <a:schemeClr val="lt1"/>
+          </a:fontRef>
+        </p:style>
+        <p:txBody>
+          <a:bodyPr rtlCol="0" anchor="ctr"/>
+          <a:lstStyle/>
+          <a:p>
+            <a:pPr algn="ctr"/>
+            <a:r>
               <a:rPr lang="en-US" sz="1100" dirty="0"/>
               <a:t>PORTAL_SLOT_ALLOCATIONS </a:t>
             </a:r>
-            <a:endParaRPr lang="en-US" sz="1100" dirty="0"/>
           </a:p>
         </p:txBody>
       </p:sp>

</xml_diff>

<commit_message>
Added Chapter 6 overview
Overview of chapter 6 applications and interactions
</commit_message>
<xml_diff>
--- a/ChapterOverviews_picturesOfService.pptx
+++ b/ChapterOverviews_picturesOfService.pptx
@@ -9,7 +9,8 @@
     <p:sldId id="258" r:id="rId3"/>
     <p:sldId id="260" r:id="rId4"/>
     <p:sldId id="261" r:id="rId5"/>
-    <p:sldId id="259" r:id="rId6"/>
+    <p:sldId id="262" r:id="rId6"/>
+    <p:sldId id="259" r:id="rId7"/>
   </p:sldIdLst>
   <p:sldSz cx="9144000" cy="6858000" type="screen4x3"/>
   <p:notesSz cx="6858000" cy="9144000"/>
@@ -292,7 +293,7 @@
           <a:p>
             <a:fld id="{56109F2C-2545-4AE2-8C8C-1380225067C3}" type="datetimeFigureOut">
               <a:rPr lang="en-US" smtClean="0"/>
-              <a:t>8/4/2014</a:t>
+              <a:t>8/7/2014</a:t>
             </a:fld>
             <a:endParaRPr lang="en-US"/>
           </a:p>
@@ -462,7 +463,7 @@
           <a:p>
             <a:fld id="{56109F2C-2545-4AE2-8C8C-1380225067C3}" type="datetimeFigureOut">
               <a:rPr lang="en-US" smtClean="0"/>
-              <a:t>8/4/2014</a:t>
+              <a:t>8/7/2014</a:t>
             </a:fld>
             <a:endParaRPr lang="en-US"/>
           </a:p>
@@ -642,7 +643,7 @@
           <a:p>
             <a:fld id="{56109F2C-2545-4AE2-8C8C-1380225067C3}" type="datetimeFigureOut">
               <a:rPr lang="en-US" smtClean="0"/>
-              <a:t>8/4/2014</a:t>
+              <a:t>8/7/2014</a:t>
             </a:fld>
             <a:endParaRPr lang="en-US"/>
           </a:p>
@@ -812,7 +813,7 @@
           <a:p>
             <a:fld id="{56109F2C-2545-4AE2-8C8C-1380225067C3}" type="datetimeFigureOut">
               <a:rPr lang="en-US" smtClean="0"/>
-              <a:t>8/4/2014</a:t>
+              <a:t>8/7/2014</a:t>
             </a:fld>
             <a:endParaRPr lang="en-US"/>
           </a:p>
@@ -1058,7 +1059,7 @@
           <a:p>
             <a:fld id="{56109F2C-2545-4AE2-8C8C-1380225067C3}" type="datetimeFigureOut">
               <a:rPr lang="en-US" smtClean="0"/>
-              <a:t>8/4/2014</a:t>
+              <a:t>8/7/2014</a:t>
             </a:fld>
             <a:endParaRPr lang="en-US"/>
           </a:p>
@@ -1346,7 +1347,7 @@
           <a:p>
             <a:fld id="{56109F2C-2545-4AE2-8C8C-1380225067C3}" type="datetimeFigureOut">
               <a:rPr lang="en-US" smtClean="0"/>
-              <a:t>8/4/2014</a:t>
+              <a:t>8/7/2014</a:t>
             </a:fld>
             <a:endParaRPr lang="en-US"/>
           </a:p>
@@ -1768,7 +1769,7 @@
           <a:p>
             <a:fld id="{56109F2C-2545-4AE2-8C8C-1380225067C3}" type="datetimeFigureOut">
               <a:rPr lang="en-US" smtClean="0"/>
-              <a:t>8/4/2014</a:t>
+              <a:t>8/7/2014</a:t>
             </a:fld>
             <a:endParaRPr lang="en-US"/>
           </a:p>
@@ -1886,7 +1887,7 @@
           <a:p>
             <a:fld id="{56109F2C-2545-4AE2-8C8C-1380225067C3}" type="datetimeFigureOut">
               <a:rPr lang="en-US" smtClean="0"/>
-              <a:t>8/4/2014</a:t>
+              <a:t>8/7/2014</a:t>
             </a:fld>
             <a:endParaRPr lang="en-US"/>
           </a:p>
@@ -1981,7 +1982,7 @@
           <a:p>
             <a:fld id="{56109F2C-2545-4AE2-8C8C-1380225067C3}" type="datetimeFigureOut">
               <a:rPr lang="en-US" smtClean="0"/>
-              <a:t>8/4/2014</a:t>
+              <a:t>8/7/2014</a:t>
             </a:fld>
             <a:endParaRPr lang="en-US"/>
           </a:p>
@@ -2258,7 +2259,7 @@
           <a:p>
             <a:fld id="{56109F2C-2545-4AE2-8C8C-1380225067C3}" type="datetimeFigureOut">
               <a:rPr lang="en-US" smtClean="0"/>
-              <a:t>8/4/2014</a:t>
+              <a:t>8/7/2014</a:t>
             </a:fld>
             <a:endParaRPr lang="en-US"/>
           </a:p>
@@ -2511,7 +2512,7 @@
           <a:p>
             <a:fld id="{56109F2C-2545-4AE2-8C8C-1380225067C3}" type="datetimeFigureOut">
               <a:rPr lang="en-US" smtClean="0"/>
-              <a:t>8/4/2014</a:t>
+              <a:t>8/7/2014</a:t>
             </a:fld>
             <a:endParaRPr lang="en-US"/>
           </a:p>
@@ -2724,7 +2725,7 @@
           <a:p>
             <a:fld id="{56109F2C-2545-4AE2-8C8C-1380225067C3}" type="datetimeFigureOut">
               <a:rPr lang="en-US" smtClean="0"/>
-              <a:t>8/4/2014</a:t>
+              <a:t>8/7/2014</a:t>
             </a:fld>
             <a:endParaRPr lang="en-US"/>
           </a:p>
@@ -5251,7 +5252,9 @@
         </p:nvSpPr>
         <p:spPr/>
         <p:txBody>
-          <a:bodyPr/>
+          <a:bodyPr>
+            <a:normAutofit fontScale="90000"/>
+          </a:bodyPr>
           <a:lstStyle/>
           <a:p>
             <a:r>
@@ -5260,19 +5263,148 @@
             </a:r>
             <a:r>
               <a:rPr lang="nl-NL" dirty="0" smtClean="0"/>
-              <a:t> </a:t>
-            </a:r>
-            <a:r>
+              <a:t> 6</a:t>
+            </a:r>
+            <a:br>
               <a:rPr lang="nl-NL" dirty="0" smtClean="0"/>
-              <a:t>6</a:t>
-            </a:r>
+            </a:br>
             <a:endParaRPr lang="en-US" dirty="0"/>
           </a:p>
         </p:txBody>
       </p:sp>
+      <p:sp>
+        <p:nvSpPr>
+          <p:cNvPr id="7" name="Cube 6"/>
+          <p:cNvSpPr/>
+          <p:nvPr/>
+        </p:nvSpPr>
+        <p:spPr>
+          <a:xfrm>
+            <a:off x="7452320" y="2708920"/>
+            <a:ext cx="1368152" cy="864096"/>
+          </a:xfrm>
+          <a:prstGeom prst="cube">
+            <a:avLst/>
+          </a:prstGeom>
+        </p:spPr>
+        <p:style>
+          <a:lnRef idx="2">
+            <a:schemeClr val="accent1">
+              <a:shade val="50000"/>
+            </a:schemeClr>
+          </a:lnRef>
+          <a:fillRef idx="1">
+            <a:schemeClr val="accent1"/>
+          </a:fillRef>
+          <a:effectRef idx="0">
+            <a:schemeClr val="accent1"/>
+          </a:effectRef>
+          <a:fontRef idx="minor">
+            <a:schemeClr val="lt1"/>
+          </a:fontRef>
+        </p:style>
+        <p:txBody>
+          <a:bodyPr rtlCol="0" anchor="ctr"/>
+          <a:lstStyle/>
+          <a:p>
+            <a:pPr algn="ctr"/>
+            <a:r>
+              <a:rPr lang="nl-NL" dirty="0" smtClean="0"/>
+              <a:t>Gmail</a:t>
+            </a:r>
+            <a:endParaRPr lang="en-US" dirty="0"/>
+          </a:p>
+        </p:txBody>
+      </p:sp>
+      <p:sp>
+        <p:nvSpPr>
+          <p:cNvPr id="18" name="Cube 17"/>
+          <p:cNvSpPr/>
+          <p:nvPr/>
+        </p:nvSpPr>
+        <p:spPr>
+          <a:xfrm>
+            <a:off x="7556159" y="1052736"/>
+            <a:ext cx="1368152" cy="864096"/>
+          </a:xfrm>
+          <a:prstGeom prst="cube">
+            <a:avLst/>
+          </a:prstGeom>
+        </p:spPr>
+        <p:style>
+          <a:lnRef idx="2">
+            <a:schemeClr val="accent1">
+              <a:shade val="50000"/>
+            </a:schemeClr>
+          </a:lnRef>
+          <a:fillRef idx="1">
+            <a:schemeClr val="accent1"/>
+          </a:fillRef>
+          <a:effectRef idx="0">
+            <a:schemeClr val="accent1"/>
+          </a:effectRef>
+          <a:fontRef idx="minor">
+            <a:schemeClr val="lt1"/>
+          </a:fontRef>
+        </p:style>
+        <p:txBody>
+          <a:bodyPr rtlCol="0" anchor="ctr"/>
+          <a:lstStyle/>
+          <a:p>
+            <a:pPr algn="ctr"/>
+            <a:r>
+              <a:rPr lang="nl-NL" dirty="0" err="1" smtClean="0"/>
+              <a:t>Any</a:t>
+            </a:r>
+            <a:r>
+              <a:rPr lang="nl-NL" dirty="0" smtClean="0"/>
+              <a:t> mail</a:t>
+            </a:r>
+            <a:endParaRPr lang="en-US" dirty="0"/>
+          </a:p>
+        </p:txBody>
+      </p:sp>
+      <p:cxnSp>
+        <p:nvCxnSpPr>
+          <p:cNvPr id="10" name="Straight Arrow Connector 9"/>
+          <p:cNvCxnSpPr/>
+          <p:nvPr/>
+        </p:nvCxnSpPr>
+        <p:spPr>
+          <a:xfrm flipH="1" flipV="1">
+            <a:off x="8388424" y="1916832"/>
+            <a:ext cx="144016" cy="344611"/>
+          </a:xfrm>
+          <a:prstGeom prst="straightConnector1">
+            <a:avLst/>
+          </a:prstGeom>
+          <a:ln>
+            <a:solidFill>
+              <a:schemeClr val="tx2">
+                <a:lumMod val="75000"/>
+              </a:schemeClr>
+            </a:solidFill>
+            <a:tailEnd type="arrow"/>
+          </a:ln>
+        </p:spPr>
+        <p:style>
+          <a:lnRef idx="1">
+            <a:schemeClr val="accent1"/>
+          </a:lnRef>
+          <a:fillRef idx="0">
+            <a:schemeClr val="accent1"/>
+          </a:fillRef>
+          <a:effectRef idx="0">
+            <a:schemeClr val="accent1"/>
+          </a:effectRef>
+          <a:fontRef idx="minor">
+            <a:schemeClr val="tx1"/>
+          </a:fontRef>
+        </p:style>
+      </p:cxnSp>
       <p:pic>
         <p:nvPicPr>
-          <p:cNvPr id="2051" name="Picture 3"/>
+          <p:cNvPr id="2052" name="Picture 4"/>
           <p:cNvPicPr>
             <a:picLocks noChangeAspect="1" noChangeArrowheads="1"/>
           </p:cNvPicPr>
@@ -5293,8 +5425,8 @@
         </p:blipFill>
         <p:spPr bwMode="auto">
           <a:xfrm>
-            <a:off x="1620732" y="2204864"/>
-            <a:ext cx="5148436" cy="1579728"/>
+            <a:off x="8244408" y="2261443"/>
+            <a:ext cx="702568" cy="583222"/>
           </a:xfrm>
           <a:prstGeom prst="rect">
             <a:avLst/>
@@ -5324,174 +5456,9 @@
           </a:extLst>
         </p:spPr>
       </p:pic>
-      <p:cxnSp>
-        <p:nvCxnSpPr>
-          <p:cNvPr id="6" name="Straight Arrow Connector 5"/>
-          <p:cNvCxnSpPr/>
-          <p:nvPr/>
-        </p:nvCxnSpPr>
-        <p:spPr>
-          <a:xfrm>
-            <a:off x="6300192" y="3573016"/>
-            <a:ext cx="1008112" cy="144016"/>
-          </a:xfrm>
-          <a:prstGeom prst="straightConnector1">
-            <a:avLst/>
-          </a:prstGeom>
-          <a:ln>
-            <a:tailEnd type="arrow"/>
-          </a:ln>
-        </p:spPr>
-        <p:style>
-          <a:lnRef idx="1">
-            <a:schemeClr val="accent1"/>
-          </a:lnRef>
-          <a:fillRef idx="0">
-            <a:schemeClr val="accent1"/>
-          </a:fillRef>
-          <a:effectRef idx="0">
-            <a:schemeClr val="accent1"/>
-          </a:effectRef>
-          <a:fontRef idx="minor">
-            <a:schemeClr val="tx1"/>
-          </a:fontRef>
-        </p:style>
-      </p:cxnSp>
-      <p:sp>
-        <p:nvSpPr>
-          <p:cNvPr id="7" name="Cube 6"/>
-          <p:cNvSpPr/>
-          <p:nvPr/>
-        </p:nvSpPr>
-        <p:spPr>
-          <a:xfrm>
-            <a:off x="7452320" y="3356992"/>
-            <a:ext cx="1368152" cy="864096"/>
-          </a:xfrm>
-          <a:prstGeom prst="cube">
-            <a:avLst/>
-          </a:prstGeom>
-        </p:spPr>
-        <p:style>
-          <a:lnRef idx="2">
-            <a:schemeClr val="accent1">
-              <a:shade val="50000"/>
-            </a:schemeClr>
-          </a:lnRef>
-          <a:fillRef idx="1">
-            <a:schemeClr val="accent1"/>
-          </a:fillRef>
-          <a:effectRef idx="0">
-            <a:schemeClr val="accent1"/>
-          </a:effectRef>
-          <a:fontRef idx="minor">
-            <a:schemeClr val="lt1"/>
-          </a:fontRef>
-        </p:style>
-        <p:txBody>
-          <a:bodyPr rtlCol="0" anchor="ctr"/>
-          <a:lstStyle/>
-          <a:p>
-            <a:pPr algn="ctr"/>
-            <a:r>
-              <a:rPr lang="nl-NL" dirty="0" smtClean="0"/>
-              <a:t>Gmail</a:t>
-            </a:r>
-            <a:endParaRPr lang="en-US" dirty="0"/>
-          </a:p>
-        </p:txBody>
-      </p:sp>
-      <p:sp>
-        <p:nvSpPr>
-          <p:cNvPr id="18" name="Cube 17"/>
-          <p:cNvSpPr/>
-          <p:nvPr/>
-        </p:nvSpPr>
-        <p:spPr>
-          <a:xfrm>
-            <a:off x="7380312" y="4797152"/>
-            <a:ext cx="1368152" cy="864096"/>
-          </a:xfrm>
-          <a:prstGeom prst="cube">
-            <a:avLst/>
-          </a:prstGeom>
-        </p:spPr>
-        <p:style>
-          <a:lnRef idx="2">
-            <a:schemeClr val="accent1">
-              <a:shade val="50000"/>
-            </a:schemeClr>
-          </a:lnRef>
-          <a:fillRef idx="1">
-            <a:schemeClr val="accent1"/>
-          </a:fillRef>
-          <a:effectRef idx="0">
-            <a:schemeClr val="accent1"/>
-          </a:effectRef>
-          <a:fontRef idx="minor">
-            <a:schemeClr val="lt1"/>
-          </a:fontRef>
-        </p:style>
-        <p:txBody>
-          <a:bodyPr rtlCol="0" anchor="ctr"/>
-          <a:lstStyle/>
-          <a:p>
-            <a:pPr algn="ctr"/>
-            <a:r>
-              <a:rPr lang="nl-NL" dirty="0" err="1" smtClean="0"/>
-              <a:t>Any</a:t>
-            </a:r>
-            <a:r>
-              <a:rPr lang="nl-NL" dirty="0" smtClean="0"/>
-              <a:t> mail</a:t>
-            </a:r>
-            <a:endParaRPr lang="en-US" dirty="0"/>
-          </a:p>
-        </p:txBody>
-      </p:sp>
-      <p:cxnSp>
-        <p:nvCxnSpPr>
-          <p:cNvPr id="10" name="Straight Arrow Connector 9"/>
-          <p:cNvCxnSpPr>
-            <a:stCxn id="7" idx="3"/>
-          </p:cNvCxnSpPr>
-          <p:nvPr/>
-        </p:nvCxnSpPr>
-        <p:spPr>
-          <a:xfrm>
-            <a:off x="8028384" y="4221088"/>
-            <a:ext cx="0" cy="720080"/>
-          </a:xfrm>
-          <a:prstGeom prst="straightConnector1">
-            <a:avLst/>
-          </a:prstGeom>
-          <a:ln>
-            <a:solidFill>
-              <a:schemeClr val="tx2">
-                <a:lumMod val="75000"/>
-              </a:schemeClr>
-            </a:solidFill>
-            <a:tailEnd type="arrow"/>
-          </a:ln>
-        </p:spPr>
-        <p:style>
-          <a:lnRef idx="1">
-            <a:schemeClr val="accent1"/>
-          </a:lnRef>
-          <a:fillRef idx="0">
-            <a:schemeClr val="accent1"/>
-          </a:fillRef>
-          <a:effectRef idx="0">
-            <a:schemeClr val="accent1"/>
-          </a:effectRef>
-          <a:fontRef idx="minor">
-            <a:schemeClr val="tx1"/>
-          </a:fontRef>
-        </p:style>
-      </p:cxnSp>
       <p:pic>
         <p:nvPicPr>
-          <p:cNvPr id="2052" name="Picture 4"/>
+          <p:cNvPr id="2053" name="Picture 5"/>
           <p:cNvPicPr>
             <a:picLocks noChangeAspect="1" noChangeArrowheads="1"/>
           </p:cNvPicPr>
@@ -5512,61 +5479,7 @@
         </p:blipFill>
         <p:spPr bwMode="auto">
           <a:xfrm>
-            <a:off x="8244408" y="2909515"/>
-            <a:ext cx="702568" cy="583222"/>
-          </a:xfrm>
-          <a:prstGeom prst="rect">
-            <a:avLst/>
-          </a:prstGeom>
-          <a:noFill/>
-          <a:ln>
-            <a:noFill/>
-          </a:ln>
-          <a:extLst>
-            <a:ext uri="{909E8E84-426E-40DD-AFC4-6F175D3DCCD1}">
-              <a14:hiddenFill xmlns:a14="http://schemas.microsoft.com/office/drawing/2010/main">
-                <a:solidFill>
-                  <a:schemeClr val="accent1"/>
-                </a:solidFill>
-              </a14:hiddenFill>
-            </a:ext>
-            <a:ext uri="{91240B29-F687-4F45-9708-019B960494DF}">
-              <a14:hiddenLine xmlns:a14="http://schemas.microsoft.com/office/drawing/2010/main" w="9525">
-                <a:solidFill>
-                  <a:schemeClr val="tx1"/>
-                </a:solidFill>
-                <a:miter lim="800000"/>
-                <a:headEnd/>
-                <a:tailEnd/>
-              </a14:hiddenLine>
-            </a:ext>
-          </a:extLst>
-        </p:spPr>
-      </p:pic>
-      <p:pic>
-        <p:nvPicPr>
-          <p:cNvPr id="2053" name="Picture 5"/>
-          <p:cNvPicPr>
-            <a:picLocks noChangeAspect="1" noChangeArrowheads="1"/>
-          </p:cNvPicPr>
-          <p:nvPr/>
-        </p:nvPicPr>
-        <p:blipFill>
-          <a:blip r:embed="rId4">
-            <a:extLst>
-              <a:ext uri="{28A0092B-C50C-407E-A947-70E740481C1C}">
-                <a14:useLocalDpi xmlns:a14="http://schemas.microsoft.com/office/drawing/2010/main" val="0"/>
-              </a:ext>
-            </a:extLst>
-          </a:blip>
-          <a:srcRect/>
-          <a:stretch>
-            <a:fillRect/>
-          </a:stretch>
-        </p:blipFill>
-        <p:spPr bwMode="auto">
-          <a:xfrm>
-            <a:off x="676291" y="5644714"/>
+            <a:off x="248865" y="881286"/>
             <a:ext cx="8283575" cy="342900"/>
           </a:xfrm>
           <a:prstGeom prst="rect">
@@ -5603,6 +5516,386 @@
           </a:extLst>
         </p:spPr>
       </p:pic>
+      <p:pic>
+        <p:nvPicPr>
+          <p:cNvPr id="2054" name="Picture 6"/>
+          <p:cNvPicPr>
+            <a:picLocks noChangeAspect="1" noChangeArrowheads="1"/>
+          </p:cNvPicPr>
+          <p:nvPr/>
+        </p:nvPicPr>
+        <p:blipFill>
+          <a:blip r:embed="rId4">
+            <a:extLst>
+              <a:ext uri="{28A0092B-C50C-407E-A947-70E740481C1C}">
+                <a14:useLocalDpi xmlns:a14="http://schemas.microsoft.com/office/drawing/2010/main" val="0"/>
+              </a:ext>
+            </a:extLst>
+          </a:blip>
+          <a:srcRect/>
+          <a:stretch>
+            <a:fillRect/>
+          </a:stretch>
+        </p:blipFill>
+        <p:spPr bwMode="auto">
+          <a:xfrm>
+            <a:off x="179512" y="2089137"/>
+            <a:ext cx="6850087" cy="1936801"/>
+          </a:xfrm>
+          <a:prstGeom prst="rect">
+            <a:avLst/>
+          </a:prstGeom>
+          <a:noFill/>
+          <a:ln>
+            <a:noFill/>
+          </a:ln>
+          <a:extLst>
+            <a:ext uri="{909E8E84-426E-40DD-AFC4-6F175D3DCCD1}">
+              <a14:hiddenFill xmlns:a14="http://schemas.microsoft.com/office/drawing/2010/main">
+                <a:solidFill>
+                  <a:schemeClr val="accent1"/>
+                </a:solidFill>
+              </a14:hiddenFill>
+            </a:ext>
+            <a:ext uri="{91240B29-F687-4F45-9708-019B960494DF}">
+              <a14:hiddenLine xmlns:a14="http://schemas.microsoft.com/office/drawing/2010/main" w="9525">
+                <a:solidFill>
+                  <a:schemeClr val="tx1"/>
+                </a:solidFill>
+                <a:miter lim="800000"/>
+                <a:headEnd/>
+                <a:tailEnd/>
+              </a14:hiddenLine>
+            </a:ext>
+          </a:extLst>
+        </p:spPr>
+      </p:pic>
+      <p:cxnSp>
+        <p:nvCxnSpPr>
+          <p:cNvPr id="6" name="Straight Arrow Connector 5"/>
+          <p:cNvCxnSpPr/>
+          <p:nvPr/>
+        </p:nvCxnSpPr>
+        <p:spPr>
+          <a:xfrm>
+            <a:off x="6156176" y="2741216"/>
+            <a:ext cx="1296144" cy="327744"/>
+          </a:xfrm>
+          <a:prstGeom prst="straightConnector1">
+            <a:avLst/>
+          </a:prstGeom>
+          <a:ln>
+            <a:tailEnd type="arrow"/>
+          </a:ln>
+        </p:spPr>
+        <p:style>
+          <a:lnRef idx="1">
+            <a:schemeClr val="accent1"/>
+          </a:lnRef>
+          <a:fillRef idx="0">
+            <a:schemeClr val="accent1"/>
+          </a:fillRef>
+          <a:effectRef idx="0">
+            <a:schemeClr val="accent1"/>
+          </a:effectRef>
+          <a:fontRef idx="minor">
+            <a:schemeClr val="tx1"/>
+          </a:fontRef>
+        </p:style>
+      </p:cxnSp>
+      <p:sp>
+        <p:nvSpPr>
+          <p:cNvPr id="25" name="Cube 24"/>
+          <p:cNvSpPr/>
+          <p:nvPr/>
+        </p:nvSpPr>
+        <p:spPr>
+          <a:xfrm>
+            <a:off x="7447220" y="3789040"/>
+            <a:ext cx="1368152" cy="864096"/>
+          </a:xfrm>
+          <a:prstGeom prst="cube">
+            <a:avLst/>
+          </a:prstGeom>
+        </p:spPr>
+        <p:style>
+          <a:lnRef idx="2">
+            <a:schemeClr val="accent1">
+              <a:shade val="50000"/>
+            </a:schemeClr>
+          </a:lnRef>
+          <a:fillRef idx="1">
+            <a:schemeClr val="accent1"/>
+          </a:fillRef>
+          <a:effectRef idx="0">
+            <a:schemeClr val="accent1"/>
+          </a:effectRef>
+          <a:fontRef idx="minor">
+            <a:schemeClr val="lt1"/>
+          </a:fontRef>
+        </p:style>
+        <p:txBody>
+          <a:bodyPr rtlCol="0" anchor="ctr"/>
+          <a:lstStyle/>
+          <a:p>
+            <a:pPr algn="ctr"/>
+            <a:r>
+              <a:rPr lang="nl-NL" dirty="0" smtClean="0"/>
+              <a:t>XMPP Server</a:t>
+            </a:r>
+            <a:endParaRPr lang="en-US" dirty="0"/>
+          </a:p>
+        </p:txBody>
+      </p:sp>
+      <p:sp>
+        <p:nvSpPr>
+          <p:cNvPr id="29" name="Cube 28"/>
+          <p:cNvSpPr/>
+          <p:nvPr/>
+        </p:nvSpPr>
+        <p:spPr>
+          <a:xfrm>
+            <a:off x="7164288" y="5013176"/>
+            <a:ext cx="1584176" cy="864096"/>
+          </a:xfrm>
+          <a:prstGeom prst="cube">
+            <a:avLst/>
+          </a:prstGeom>
+        </p:spPr>
+        <p:style>
+          <a:lnRef idx="2">
+            <a:schemeClr val="accent1">
+              <a:shade val="50000"/>
+            </a:schemeClr>
+          </a:lnRef>
+          <a:fillRef idx="1">
+            <a:schemeClr val="accent1"/>
+          </a:fillRef>
+          <a:effectRef idx="0">
+            <a:schemeClr val="accent1"/>
+          </a:effectRef>
+          <a:fontRef idx="minor">
+            <a:schemeClr val="lt1"/>
+          </a:fontRef>
+        </p:style>
+        <p:txBody>
+          <a:bodyPr rtlCol="0" anchor="ctr"/>
+          <a:lstStyle/>
+          <a:p>
+            <a:pPr algn="ctr"/>
+            <a:r>
+              <a:rPr lang="nl-NL" sz="1200" dirty="0" smtClean="0"/>
+              <a:t>Chat </a:t>
+            </a:r>
+            <a:r>
+              <a:rPr lang="nl-NL" sz="1200" dirty="0" err="1" smtClean="0"/>
+              <a:t>Contacts</a:t>
+            </a:r>
+            <a:r>
+              <a:rPr lang="nl-NL" sz="1200" dirty="0" smtClean="0"/>
+              <a:t> on </a:t>
+            </a:r>
+            <a:r>
+              <a:rPr lang="nl-NL" sz="1200" dirty="0" err="1" smtClean="0"/>
+              <a:t>same</a:t>
+            </a:r>
+            <a:r>
+              <a:rPr lang="nl-NL" sz="1200" dirty="0" smtClean="0"/>
+              <a:t> or </a:t>
+            </a:r>
+            <a:r>
+              <a:rPr lang="nl-NL" sz="1200" dirty="0" err="1" smtClean="0"/>
+              <a:t>other</a:t>
+            </a:r>
+            <a:r>
+              <a:rPr lang="nl-NL" sz="1200" dirty="0" smtClean="0"/>
+              <a:t> XMPP Server</a:t>
+            </a:r>
+            <a:endParaRPr lang="en-US" sz="1200" dirty="0"/>
+          </a:p>
+        </p:txBody>
+      </p:sp>
+      <p:cxnSp>
+        <p:nvCxnSpPr>
+          <p:cNvPr id="28" name="Straight Arrow Connector 27"/>
+          <p:cNvCxnSpPr>
+            <a:stCxn id="25" idx="3"/>
+          </p:cNvCxnSpPr>
+          <p:nvPr/>
+        </p:nvCxnSpPr>
+        <p:spPr>
+          <a:xfrm flipH="1">
+            <a:off x="7987280" y="4653136"/>
+            <a:ext cx="36004" cy="519287"/>
+          </a:xfrm>
+          <a:prstGeom prst="straightConnector1">
+            <a:avLst/>
+          </a:prstGeom>
+          <a:ln>
+            <a:solidFill>
+              <a:schemeClr val="tx2">
+                <a:lumMod val="75000"/>
+              </a:schemeClr>
+            </a:solidFill>
+            <a:tailEnd type="arrow"/>
+          </a:ln>
+        </p:spPr>
+        <p:style>
+          <a:lnRef idx="1">
+            <a:schemeClr val="accent1"/>
+          </a:lnRef>
+          <a:fillRef idx="0">
+            <a:schemeClr val="accent1"/>
+          </a:fillRef>
+          <a:effectRef idx="0">
+            <a:schemeClr val="accent1"/>
+          </a:effectRef>
+          <a:fontRef idx="minor">
+            <a:schemeClr val="tx1"/>
+          </a:fontRef>
+        </p:style>
+      </p:cxnSp>
+      <p:cxnSp>
+        <p:nvCxnSpPr>
+          <p:cNvPr id="30" name="Straight Arrow Connector 29"/>
+          <p:cNvCxnSpPr/>
+          <p:nvPr/>
+        </p:nvCxnSpPr>
+        <p:spPr>
+          <a:xfrm>
+            <a:off x="6156176" y="3501008"/>
+            <a:ext cx="1291044" cy="576064"/>
+          </a:xfrm>
+          <a:prstGeom prst="straightConnector1">
+            <a:avLst/>
+          </a:prstGeom>
+          <a:ln>
+            <a:tailEnd type="arrow"/>
+          </a:ln>
+        </p:spPr>
+        <p:style>
+          <a:lnRef idx="1">
+            <a:schemeClr val="accent1"/>
+          </a:lnRef>
+          <a:fillRef idx="0">
+            <a:schemeClr val="accent1"/>
+          </a:fillRef>
+          <a:effectRef idx="0">
+            <a:schemeClr val="accent1"/>
+          </a:effectRef>
+          <a:fontRef idx="minor">
+            <a:schemeClr val="tx1"/>
+          </a:fontRef>
+        </p:style>
+      </p:cxnSp>
+      <p:pic>
+        <p:nvPicPr>
+          <p:cNvPr id="2055" name="Picture 7"/>
+          <p:cNvPicPr>
+            <a:picLocks noChangeAspect="1" noChangeArrowheads="1"/>
+          </p:cNvPicPr>
+          <p:nvPr/>
+        </p:nvPicPr>
+        <p:blipFill>
+          <a:blip r:embed="rId5">
+            <a:extLst>
+              <a:ext uri="{28A0092B-C50C-407E-A947-70E740481C1C}">
+                <a14:useLocalDpi xmlns:a14="http://schemas.microsoft.com/office/drawing/2010/main" val="0"/>
+              </a:ext>
+            </a:extLst>
+          </a:blip>
+          <a:srcRect/>
+          <a:stretch>
+            <a:fillRect/>
+          </a:stretch>
+        </p:blipFill>
+        <p:spPr bwMode="auto">
+          <a:xfrm>
+            <a:off x="1445045" y="5445224"/>
+            <a:ext cx="5891213" cy="1096963"/>
+          </a:xfrm>
+          <a:prstGeom prst="rect">
+            <a:avLst/>
+          </a:prstGeom>
+          <a:noFill/>
+          <a:ln>
+            <a:noFill/>
+          </a:ln>
+          <a:extLst>
+            <a:ext uri="{909E8E84-426E-40DD-AFC4-6F175D3DCCD1}">
+              <a14:hiddenFill xmlns:a14="http://schemas.microsoft.com/office/drawing/2010/main">
+                <a:solidFill>
+                  <a:schemeClr val="accent1"/>
+                </a:solidFill>
+              </a14:hiddenFill>
+            </a:ext>
+            <a:ext uri="{91240B29-F687-4F45-9708-019B960494DF}">
+              <a14:hiddenLine xmlns:a14="http://schemas.microsoft.com/office/drawing/2010/main" w="9525">
+                <a:solidFill>
+                  <a:schemeClr val="tx1"/>
+                </a:solidFill>
+                <a:miter lim="800000"/>
+                <a:headEnd/>
+                <a:tailEnd/>
+              </a14:hiddenLine>
+            </a:ext>
+          </a:extLst>
+        </p:spPr>
+      </p:pic>
+      <p:pic>
+        <p:nvPicPr>
+          <p:cNvPr id="2056" name="Picture 8"/>
+          <p:cNvPicPr>
+            <a:picLocks noChangeAspect="1" noChangeArrowheads="1"/>
+          </p:cNvPicPr>
+          <p:nvPr/>
+        </p:nvPicPr>
+        <p:blipFill>
+          <a:blip r:embed="rId6">
+            <a:extLst>
+              <a:ext uri="{28A0092B-C50C-407E-A947-70E740481C1C}">
+                <a14:useLocalDpi xmlns:a14="http://schemas.microsoft.com/office/drawing/2010/main" val="0"/>
+              </a:ext>
+            </a:extLst>
+          </a:blip>
+          <a:srcRect/>
+          <a:stretch>
+            <a:fillRect/>
+          </a:stretch>
+        </p:blipFill>
+        <p:spPr bwMode="auto">
+          <a:xfrm>
+            <a:off x="179512" y="1373047"/>
+            <a:ext cx="1928813" cy="723900"/>
+          </a:xfrm>
+          <a:prstGeom prst="rect">
+            <a:avLst/>
+          </a:prstGeom>
+          <a:noFill/>
+          <a:ln>
+            <a:noFill/>
+          </a:ln>
+          <a:extLst>
+            <a:ext uri="{909E8E84-426E-40DD-AFC4-6F175D3DCCD1}">
+              <a14:hiddenFill xmlns:a14="http://schemas.microsoft.com/office/drawing/2010/main">
+                <a:solidFill>
+                  <a:schemeClr val="accent1"/>
+                </a:solidFill>
+              </a14:hiddenFill>
+            </a:ext>
+            <a:ext uri="{91240B29-F687-4F45-9708-019B960494DF}">
+              <a14:hiddenLine xmlns:a14="http://schemas.microsoft.com/office/drawing/2010/main" w="9525">
+                <a:solidFill>
+                  <a:schemeClr val="tx1"/>
+                </a:solidFill>
+                <a:miter lim="800000"/>
+                <a:headEnd/>
+                <a:tailEnd/>
+              </a14:hiddenLine>
+            </a:ext>
+          </a:extLst>
+        </p:spPr>
+      </p:pic>
     </p:spTree>
     <p:extLst>
       <p:ext uri="{BB962C8B-B14F-4D97-AF65-F5344CB8AC3E}">
@@ -5624,6 +5917,955 @@
 </file>
 
 <file path=ppt/slides/slide5.xml><?xml version="1.0" encoding="utf-8"?>
+<p:sld xmlns:a="http://schemas.openxmlformats.org/drawingml/2006/main" xmlns:r="http://schemas.openxmlformats.org/officeDocument/2006/relationships" xmlns:p="http://schemas.openxmlformats.org/presentationml/2006/main">
+  <p:cSld>
+    <p:spTree>
+      <p:nvGrpSpPr>
+        <p:cNvPr id="1" name=""/>
+        <p:cNvGrpSpPr/>
+        <p:nvPr/>
+      </p:nvGrpSpPr>
+      <p:grpSpPr>
+        <a:xfrm>
+          <a:off x="0" y="0"/>
+          <a:ext cx="0" cy="0"/>
+          <a:chOff x="0" y="0"/>
+          <a:chExt cx="0" cy="0"/>
+        </a:xfrm>
+      </p:grpSpPr>
+      <p:sp>
+        <p:nvSpPr>
+          <p:cNvPr id="19" name="Flowchart: Magnetic Disk 18"/>
+          <p:cNvSpPr/>
+          <p:nvPr/>
+        </p:nvSpPr>
+        <p:spPr>
+          <a:xfrm>
+            <a:off x="6660232" y="692696"/>
+            <a:ext cx="2880320" cy="2160240"/>
+          </a:xfrm>
+          <a:prstGeom prst="flowChartMagneticDisk">
+            <a:avLst/>
+          </a:prstGeom>
+        </p:spPr>
+        <p:style>
+          <a:lnRef idx="1">
+            <a:schemeClr val="accent2"/>
+          </a:lnRef>
+          <a:fillRef idx="2">
+            <a:schemeClr val="accent2"/>
+          </a:fillRef>
+          <a:effectRef idx="1">
+            <a:schemeClr val="accent2"/>
+          </a:effectRef>
+          <a:fontRef idx="minor">
+            <a:schemeClr val="dk1"/>
+          </a:fontRef>
+        </p:style>
+        <p:txBody>
+          <a:bodyPr rtlCol="0" anchor="ctr"/>
+          <a:lstStyle/>
+          <a:p>
+            <a:pPr algn="ctr"/>
+            <a:r>
+              <a:rPr lang="nl-NL" dirty="0" smtClean="0"/>
+              <a:t>SAIBOT_FINANCE</a:t>
+            </a:r>
+          </a:p>
+          <a:p>
+            <a:pPr algn="ctr"/>
+            <a:endParaRPr lang="nl-NL" dirty="0"/>
+          </a:p>
+          <a:p>
+            <a:pPr algn="ctr"/>
+            <a:endParaRPr lang="nl-NL" dirty="0" smtClean="0"/>
+          </a:p>
+          <a:p>
+            <a:pPr algn="ctr"/>
+            <a:endParaRPr lang="nl-NL" dirty="0"/>
+          </a:p>
+          <a:p>
+            <a:pPr algn="ctr"/>
+            <a:endParaRPr lang="nl-NL" dirty="0" smtClean="0"/>
+          </a:p>
+          <a:p>
+            <a:pPr algn="ctr"/>
+            <a:endParaRPr lang="en-US" dirty="0"/>
+          </a:p>
+        </p:txBody>
+      </p:sp>
+      <p:sp>
+        <p:nvSpPr>
+          <p:cNvPr id="2" name="Title 1"/>
+          <p:cNvSpPr>
+            <a:spLocks noGrp="1"/>
+          </p:cNvSpPr>
+          <p:nvPr>
+            <p:ph type="title"/>
+          </p:nvPr>
+        </p:nvSpPr>
+        <p:spPr/>
+        <p:txBody>
+          <a:bodyPr>
+            <a:normAutofit fontScale="90000"/>
+          </a:bodyPr>
+          <a:lstStyle/>
+          <a:p>
+            <a:r>
+              <a:rPr lang="nl-NL" dirty="0" err="1" smtClean="0"/>
+              <a:t>Chapter</a:t>
+            </a:r>
+            <a:r>
+              <a:rPr lang="nl-NL" dirty="0" smtClean="0"/>
+              <a:t> 6</a:t>
+            </a:r>
+            <a:br>
+              <a:rPr lang="nl-NL" dirty="0" smtClean="0"/>
+            </a:br>
+            <a:endParaRPr lang="en-US" dirty="0"/>
+          </a:p>
+        </p:txBody>
+      </p:sp>
+      <p:sp>
+        <p:nvSpPr>
+          <p:cNvPr id="3" name="Flowchart: Direct Access Storage 2"/>
+          <p:cNvSpPr/>
+          <p:nvPr/>
+        </p:nvSpPr>
+        <p:spPr>
+          <a:xfrm>
+            <a:off x="6643594" y="4077072"/>
+            <a:ext cx="3096344" cy="1008112"/>
+          </a:xfrm>
+          <a:prstGeom prst="flowChartMagneticDrum">
+            <a:avLst/>
+          </a:prstGeom>
+        </p:spPr>
+        <p:style>
+          <a:lnRef idx="2">
+            <a:schemeClr val="accent1">
+              <a:shade val="50000"/>
+            </a:schemeClr>
+          </a:lnRef>
+          <a:fillRef idx="1">
+            <a:schemeClr val="accent1"/>
+          </a:fillRef>
+          <a:effectRef idx="0">
+            <a:schemeClr val="accent1"/>
+          </a:effectRef>
+          <a:fontRef idx="minor">
+            <a:schemeClr val="lt1"/>
+          </a:fontRef>
+        </p:style>
+        <p:txBody>
+          <a:bodyPr rtlCol="0" anchor="ctr"/>
+          <a:lstStyle/>
+          <a:p>
+            <a:pPr algn="ctr"/>
+            <a:r>
+              <a:rPr lang="nl-NL" dirty="0" smtClean="0"/>
+              <a:t>JMS Queue</a:t>
+            </a:r>
+          </a:p>
+          <a:p>
+            <a:pPr algn="ctr"/>
+            <a:r>
+              <a:rPr lang="en-US" sz="1200" dirty="0" err="1"/>
+              <a:t>jms</a:t>
+            </a:r>
+            <a:r>
+              <a:rPr lang="en-US" sz="1200" dirty="0"/>
+              <a:t>/finance/</a:t>
+            </a:r>
+            <a:r>
+              <a:rPr lang="en-US" sz="1200" dirty="0" err="1"/>
+              <a:t>AircraftMovementsQueue</a:t>
+            </a:r>
+            <a:endParaRPr lang="en-US" sz="1200" dirty="0"/>
+          </a:p>
+        </p:txBody>
+      </p:sp>
+      <p:sp>
+        <p:nvSpPr>
+          <p:cNvPr id="16" name="Flowchart: Direct Access Storage 15"/>
+          <p:cNvSpPr/>
+          <p:nvPr/>
+        </p:nvSpPr>
+        <p:spPr>
+          <a:xfrm>
+            <a:off x="6912260" y="1628800"/>
+            <a:ext cx="2376264" cy="1008112"/>
+          </a:xfrm>
+          <a:prstGeom prst="flowChartMagneticDrum">
+            <a:avLst/>
+          </a:prstGeom>
+        </p:spPr>
+        <p:style>
+          <a:lnRef idx="2">
+            <a:schemeClr val="accent1">
+              <a:shade val="50000"/>
+            </a:schemeClr>
+          </a:lnRef>
+          <a:fillRef idx="1">
+            <a:schemeClr val="accent1"/>
+          </a:fillRef>
+          <a:effectRef idx="0">
+            <a:schemeClr val="accent1"/>
+          </a:effectRef>
+          <a:fontRef idx="minor">
+            <a:schemeClr val="lt1"/>
+          </a:fontRef>
+        </p:style>
+        <p:txBody>
+          <a:bodyPr rtlCol="0" anchor="ctr"/>
+          <a:lstStyle/>
+          <a:p>
+            <a:pPr algn="ctr"/>
+            <a:r>
+              <a:rPr lang="nl-NL" dirty="0" smtClean="0"/>
+              <a:t>AQ</a:t>
+            </a:r>
+          </a:p>
+          <a:p>
+            <a:pPr algn="ctr"/>
+            <a:r>
+              <a:rPr lang="en-US" sz="1200" dirty="0" err="1"/>
+              <a:t>aircraft_movements_queue</a:t>
+            </a:r>
+            <a:endParaRPr lang="en-US" sz="1200" dirty="0"/>
+          </a:p>
+        </p:txBody>
+      </p:sp>
+      <p:pic>
+        <p:nvPicPr>
+          <p:cNvPr id="3075" name="Picture 3"/>
+          <p:cNvPicPr>
+            <a:picLocks noChangeAspect="1" noChangeArrowheads="1"/>
+          </p:cNvPicPr>
+          <p:nvPr/>
+        </p:nvPicPr>
+        <p:blipFill>
+          <a:blip r:embed="rId2">
+            <a:extLst>
+              <a:ext uri="{28A0092B-C50C-407E-A947-70E740481C1C}">
+                <a14:useLocalDpi xmlns:a14="http://schemas.microsoft.com/office/drawing/2010/main" val="0"/>
+              </a:ext>
+            </a:extLst>
+          </a:blip>
+          <a:srcRect/>
+          <a:stretch>
+            <a:fillRect/>
+          </a:stretch>
+        </p:blipFill>
+        <p:spPr bwMode="auto">
+          <a:xfrm>
+            <a:off x="251520" y="260648"/>
+            <a:ext cx="2255837" cy="1279525"/>
+          </a:xfrm>
+          <a:prstGeom prst="rect">
+            <a:avLst/>
+          </a:prstGeom>
+          <a:noFill/>
+          <a:ln>
+            <a:noFill/>
+          </a:ln>
+          <a:extLst>
+            <a:ext uri="{909E8E84-426E-40DD-AFC4-6F175D3DCCD1}">
+              <a14:hiddenFill xmlns:a14="http://schemas.microsoft.com/office/drawing/2010/main">
+                <a:solidFill>
+                  <a:schemeClr val="accent1"/>
+                </a:solidFill>
+              </a14:hiddenFill>
+            </a:ext>
+            <a:ext uri="{91240B29-F687-4F45-9708-019B960494DF}">
+              <a14:hiddenLine xmlns:a14="http://schemas.microsoft.com/office/drawing/2010/main" w="9525">
+                <a:solidFill>
+                  <a:schemeClr val="tx1"/>
+                </a:solidFill>
+                <a:miter lim="800000"/>
+                <a:headEnd/>
+                <a:tailEnd/>
+              </a14:hiddenLine>
+            </a:ext>
+          </a:extLst>
+        </p:spPr>
+      </p:pic>
+      <p:pic>
+        <p:nvPicPr>
+          <p:cNvPr id="1026" name="Picture 2"/>
+          <p:cNvPicPr>
+            <a:picLocks noChangeAspect="1" noChangeArrowheads="1"/>
+          </p:cNvPicPr>
+          <p:nvPr/>
+        </p:nvPicPr>
+        <p:blipFill>
+          <a:blip r:embed="rId3">
+            <a:extLst>
+              <a:ext uri="{28A0092B-C50C-407E-A947-70E740481C1C}">
+                <a14:useLocalDpi xmlns:a14="http://schemas.microsoft.com/office/drawing/2010/main" val="0"/>
+              </a:ext>
+            </a:extLst>
+          </a:blip>
+          <a:srcRect/>
+          <a:stretch>
+            <a:fillRect/>
+          </a:stretch>
+        </p:blipFill>
+        <p:spPr bwMode="auto">
+          <a:xfrm>
+            <a:off x="899592" y="4176905"/>
+            <a:ext cx="5040486" cy="1916391"/>
+          </a:xfrm>
+          <a:prstGeom prst="rect">
+            <a:avLst/>
+          </a:prstGeom>
+          <a:noFill/>
+          <a:ln>
+            <a:noFill/>
+          </a:ln>
+          <a:extLst>
+            <a:ext uri="{909E8E84-426E-40DD-AFC4-6F175D3DCCD1}">
+              <a14:hiddenFill xmlns:a14="http://schemas.microsoft.com/office/drawing/2010/main">
+                <a:solidFill>
+                  <a:schemeClr val="accent1"/>
+                </a:solidFill>
+              </a14:hiddenFill>
+            </a:ext>
+            <a:ext uri="{91240B29-F687-4F45-9708-019B960494DF}">
+              <a14:hiddenLine xmlns:a14="http://schemas.microsoft.com/office/drawing/2010/main" w="9525">
+                <a:solidFill>
+                  <a:schemeClr val="tx1"/>
+                </a:solidFill>
+                <a:miter lim="800000"/>
+                <a:headEnd/>
+                <a:tailEnd/>
+              </a14:hiddenLine>
+            </a:ext>
+          </a:extLst>
+        </p:spPr>
+      </p:pic>
+      <p:pic>
+        <p:nvPicPr>
+          <p:cNvPr id="1027" name="Picture 3"/>
+          <p:cNvPicPr>
+            <a:picLocks noChangeAspect="1" noChangeArrowheads="1"/>
+          </p:cNvPicPr>
+          <p:nvPr/>
+        </p:nvPicPr>
+        <p:blipFill>
+          <a:blip r:embed="rId4">
+            <a:extLst>
+              <a:ext uri="{28A0092B-C50C-407E-A947-70E740481C1C}">
+                <a14:useLocalDpi xmlns:a14="http://schemas.microsoft.com/office/drawing/2010/main" val="0"/>
+              </a:ext>
+            </a:extLst>
+          </a:blip>
+          <a:srcRect/>
+          <a:stretch>
+            <a:fillRect/>
+          </a:stretch>
+        </p:blipFill>
+        <p:spPr bwMode="auto">
+          <a:xfrm>
+            <a:off x="776573" y="1768991"/>
+            <a:ext cx="5163505" cy="1907885"/>
+          </a:xfrm>
+          <a:prstGeom prst="rect">
+            <a:avLst/>
+          </a:prstGeom>
+          <a:noFill/>
+          <a:ln>
+            <a:noFill/>
+          </a:ln>
+          <a:extLst>
+            <a:ext uri="{909E8E84-426E-40DD-AFC4-6F175D3DCCD1}">
+              <a14:hiddenFill xmlns:a14="http://schemas.microsoft.com/office/drawing/2010/main">
+                <a:solidFill>
+                  <a:schemeClr val="accent1"/>
+                </a:solidFill>
+              </a14:hiddenFill>
+            </a:ext>
+            <a:ext uri="{91240B29-F687-4F45-9708-019B960494DF}">
+              <a14:hiddenLine xmlns:a14="http://schemas.microsoft.com/office/drawing/2010/main" w="9525">
+                <a:solidFill>
+                  <a:schemeClr val="tx1"/>
+                </a:solidFill>
+                <a:miter lim="800000"/>
+                <a:headEnd/>
+                <a:tailEnd/>
+              </a14:hiddenLine>
+            </a:ext>
+          </a:extLst>
+        </p:spPr>
+      </p:pic>
+      <p:sp>
+        <p:nvSpPr>
+          <p:cNvPr id="7" name="Oval 6"/>
+          <p:cNvSpPr/>
+          <p:nvPr/>
+        </p:nvSpPr>
+        <p:spPr>
+          <a:xfrm>
+            <a:off x="6660232" y="5351125"/>
+            <a:ext cx="2088232" cy="720080"/>
+          </a:xfrm>
+          <a:prstGeom prst="ellipse">
+            <a:avLst/>
+          </a:prstGeom>
+        </p:spPr>
+        <p:style>
+          <a:lnRef idx="1">
+            <a:schemeClr val="accent1"/>
+          </a:lnRef>
+          <a:fillRef idx="2">
+            <a:schemeClr val="accent1"/>
+          </a:fillRef>
+          <a:effectRef idx="1">
+            <a:schemeClr val="accent1"/>
+          </a:effectRef>
+          <a:fontRef idx="minor">
+            <a:schemeClr val="dk1"/>
+          </a:fontRef>
+        </p:style>
+        <p:txBody>
+          <a:bodyPr rtlCol="0" anchor="ctr"/>
+          <a:lstStyle/>
+          <a:p>
+            <a:pPr algn="ctr"/>
+            <a:r>
+              <a:rPr lang="nl-NL" dirty="0" smtClean="0"/>
+              <a:t>EJB</a:t>
+            </a:r>
+          </a:p>
+          <a:p>
+            <a:pPr algn="ctr"/>
+            <a:r>
+              <a:rPr lang="en-US" sz="1200" dirty="0" err="1"/>
+              <a:t>FinanceAircraftMovementReporter</a:t>
+            </a:r>
+            <a:endParaRPr lang="en-US" sz="1200" dirty="0"/>
+          </a:p>
+        </p:txBody>
+      </p:sp>
+      <p:cxnSp>
+        <p:nvCxnSpPr>
+          <p:cNvPr id="22" name="Elbow Connector 21"/>
+          <p:cNvCxnSpPr/>
+          <p:nvPr/>
+        </p:nvCxnSpPr>
+        <p:spPr>
+          <a:xfrm flipV="1">
+            <a:off x="5796136" y="2420888"/>
+            <a:ext cx="1224136" cy="1152128"/>
+          </a:xfrm>
+          <a:prstGeom prst="bentConnector3">
+            <a:avLst/>
+          </a:prstGeom>
+          <a:ln>
+            <a:tailEnd type="arrow"/>
+          </a:ln>
+        </p:spPr>
+        <p:style>
+          <a:lnRef idx="1">
+            <a:schemeClr val="accent1"/>
+          </a:lnRef>
+          <a:fillRef idx="0">
+            <a:schemeClr val="accent1"/>
+          </a:fillRef>
+          <a:effectRef idx="0">
+            <a:schemeClr val="accent1"/>
+          </a:effectRef>
+          <a:fontRef idx="minor">
+            <a:schemeClr val="tx1"/>
+          </a:fontRef>
+        </p:style>
+      </p:cxnSp>
+      <p:cxnSp>
+        <p:nvCxnSpPr>
+          <p:cNvPr id="26" name="Elbow Connector 25"/>
+          <p:cNvCxnSpPr/>
+          <p:nvPr/>
+        </p:nvCxnSpPr>
+        <p:spPr>
+          <a:xfrm rot="16200000" flipH="1">
+            <a:off x="5508104" y="3212976"/>
+            <a:ext cx="1440160" cy="864096"/>
+          </a:xfrm>
+          <a:prstGeom prst="bentConnector3">
+            <a:avLst>
+              <a:gd name="adj1" fmla="val -920"/>
+            </a:avLst>
+          </a:prstGeom>
+          <a:ln>
+            <a:tailEnd type="arrow"/>
+          </a:ln>
+        </p:spPr>
+        <p:style>
+          <a:lnRef idx="1">
+            <a:schemeClr val="accent1"/>
+          </a:lnRef>
+          <a:fillRef idx="0">
+            <a:schemeClr val="accent1"/>
+          </a:fillRef>
+          <a:effectRef idx="0">
+            <a:schemeClr val="accent1"/>
+          </a:effectRef>
+          <a:fontRef idx="minor">
+            <a:schemeClr val="tx1"/>
+          </a:fontRef>
+        </p:style>
+      </p:cxnSp>
+      <p:cxnSp>
+        <p:nvCxnSpPr>
+          <p:cNvPr id="30" name="Elbow Connector 29"/>
+          <p:cNvCxnSpPr/>
+          <p:nvPr/>
+        </p:nvCxnSpPr>
+        <p:spPr>
+          <a:xfrm rot="16200000" flipH="1">
+            <a:off x="5400092" y="2816932"/>
+            <a:ext cx="1800200" cy="1008112"/>
+          </a:xfrm>
+          <a:prstGeom prst="bentConnector3">
+            <a:avLst>
+              <a:gd name="adj1" fmla="val 17311"/>
+            </a:avLst>
+          </a:prstGeom>
+          <a:ln>
+            <a:tailEnd type="arrow"/>
+          </a:ln>
+        </p:spPr>
+        <p:style>
+          <a:lnRef idx="1">
+            <a:schemeClr val="accent1"/>
+          </a:lnRef>
+          <a:fillRef idx="0">
+            <a:schemeClr val="accent1"/>
+          </a:fillRef>
+          <a:effectRef idx="0">
+            <a:schemeClr val="accent1"/>
+          </a:effectRef>
+          <a:fontRef idx="minor">
+            <a:schemeClr val="tx1"/>
+          </a:fontRef>
+        </p:style>
+      </p:cxnSp>
+      <p:cxnSp>
+        <p:nvCxnSpPr>
+          <p:cNvPr id="39" name="Straight Arrow Connector 38"/>
+          <p:cNvCxnSpPr/>
+          <p:nvPr/>
+        </p:nvCxnSpPr>
+        <p:spPr>
+          <a:xfrm flipV="1">
+            <a:off x="5652120" y="4636413"/>
+            <a:ext cx="1008112" cy="376762"/>
+          </a:xfrm>
+          <a:prstGeom prst="straightConnector1">
+            <a:avLst/>
+          </a:prstGeom>
+          <a:ln>
+            <a:tailEnd type="arrow"/>
+          </a:ln>
+        </p:spPr>
+        <p:style>
+          <a:lnRef idx="1">
+            <a:schemeClr val="accent1"/>
+          </a:lnRef>
+          <a:fillRef idx="0">
+            <a:schemeClr val="accent1"/>
+          </a:fillRef>
+          <a:effectRef idx="0">
+            <a:schemeClr val="accent1"/>
+          </a:effectRef>
+          <a:fontRef idx="minor">
+            <a:schemeClr val="tx1"/>
+          </a:fontRef>
+        </p:style>
+      </p:cxnSp>
+      <p:sp>
+        <p:nvSpPr>
+          <p:cNvPr id="41" name="Can 40"/>
+          <p:cNvSpPr/>
+          <p:nvPr/>
+        </p:nvSpPr>
+        <p:spPr>
+          <a:xfrm rot="16200000">
+            <a:off x="489856" y="5544837"/>
+            <a:ext cx="504056" cy="548680"/>
+          </a:xfrm>
+          <a:prstGeom prst="can">
+            <a:avLst/>
+          </a:prstGeom>
+        </p:spPr>
+        <p:style>
+          <a:lnRef idx="1">
+            <a:schemeClr val="dk1"/>
+          </a:lnRef>
+          <a:fillRef idx="2">
+            <a:schemeClr val="dk1"/>
+          </a:fillRef>
+          <a:effectRef idx="1">
+            <a:schemeClr val="dk1"/>
+          </a:effectRef>
+          <a:fontRef idx="minor">
+            <a:schemeClr val="dk1"/>
+          </a:fontRef>
+        </p:style>
+        <p:txBody>
+          <a:bodyPr rtlCol="0" anchor="ctr"/>
+          <a:lstStyle/>
+          <a:p>
+            <a:pPr algn="ctr"/>
+            <a:r>
+              <a:rPr lang="nl-NL" sz="800" dirty="0" smtClean="0"/>
+              <a:t>Direct</a:t>
+            </a:r>
+          </a:p>
+          <a:p>
+            <a:pPr algn="ctr"/>
+            <a:r>
+              <a:rPr lang="nl-NL" sz="800" dirty="0" smtClean="0"/>
+              <a:t>Binding</a:t>
+            </a:r>
+            <a:endParaRPr lang="en-US" sz="800" dirty="0"/>
+          </a:p>
+        </p:txBody>
+      </p:sp>
+      <p:sp>
+        <p:nvSpPr>
+          <p:cNvPr id="47" name="Can 46"/>
+          <p:cNvSpPr/>
+          <p:nvPr/>
+        </p:nvSpPr>
+        <p:spPr>
+          <a:xfrm rot="16200000">
+            <a:off x="651874" y="5166795"/>
+            <a:ext cx="360040" cy="296652"/>
+          </a:xfrm>
+          <a:prstGeom prst="can">
+            <a:avLst/>
+          </a:prstGeom>
+        </p:spPr>
+        <p:style>
+          <a:lnRef idx="1">
+            <a:schemeClr val="dk1"/>
+          </a:lnRef>
+          <a:fillRef idx="2">
+            <a:schemeClr val="dk1"/>
+          </a:fillRef>
+          <a:effectRef idx="1">
+            <a:schemeClr val="dk1"/>
+          </a:effectRef>
+          <a:fontRef idx="minor">
+            <a:schemeClr val="dk1"/>
+          </a:fontRef>
+        </p:style>
+        <p:txBody>
+          <a:bodyPr rtlCol="0" anchor="ctr"/>
+          <a:lstStyle/>
+          <a:p>
+            <a:pPr algn="ctr"/>
+            <a:r>
+              <a:rPr lang="nl-NL" sz="800" dirty="0" smtClean="0"/>
+              <a:t>EJB</a:t>
+            </a:r>
+            <a:endParaRPr lang="en-US" sz="800" dirty="0"/>
+          </a:p>
+        </p:txBody>
+      </p:sp>
+      <p:sp>
+        <p:nvSpPr>
+          <p:cNvPr id="48" name="Can 47"/>
+          <p:cNvSpPr/>
+          <p:nvPr/>
+        </p:nvSpPr>
+        <p:spPr>
+          <a:xfrm rot="16200000">
+            <a:off x="547369" y="3008485"/>
+            <a:ext cx="360040" cy="296652"/>
+          </a:xfrm>
+          <a:prstGeom prst="can">
+            <a:avLst/>
+          </a:prstGeom>
+        </p:spPr>
+        <p:style>
+          <a:lnRef idx="1">
+            <a:schemeClr val="dk1"/>
+          </a:lnRef>
+          <a:fillRef idx="2">
+            <a:schemeClr val="dk1"/>
+          </a:fillRef>
+          <a:effectRef idx="1">
+            <a:schemeClr val="dk1"/>
+          </a:effectRef>
+          <a:fontRef idx="minor">
+            <a:schemeClr val="dk1"/>
+          </a:fontRef>
+        </p:style>
+        <p:txBody>
+          <a:bodyPr rtlCol="0" anchor="ctr"/>
+          <a:lstStyle/>
+          <a:p>
+            <a:pPr algn="ctr"/>
+            <a:r>
+              <a:rPr lang="nl-NL" sz="800" dirty="0" smtClean="0"/>
+              <a:t>JEJB</a:t>
+            </a:r>
+            <a:endParaRPr lang="en-US" sz="800" dirty="0"/>
+          </a:p>
+        </p:txBody>
+      </p:sp>
+      <p:sp>
+        <p:nvSpPr>
+          <p:cNvPr id="42" name="Rounded Rectangle 41"/>
+          <p:cNvSpPr/>
+          <p:nvPr/>
+        </p:nvSpPr>
+        <p:spPr>
+          <a:xfrm>
+            <a:off x="107504" y="6309320"/>
+            <a:ext cx="1656184" cy="504056"/>
+          </a:xfrm>
+          <a:prstGeom prst="roundRect">
+            <a:avLst/>
+          </a:prstGeom>
+        </p:spPr>
+        <p:style>
+          <a:lnRef idx="1">
+            <a:schemeClr val="accent2"/>
+          </a:lnRef>
+          <a:fillRef idx="2">
+            <a:schemeClr val="accent2"/>
+          </a:fillRef>
+          <a:effectRef idx="1">
+            <a:schemeClr val="accent2"/>
+          </a:effectRef>
+          <a:fontRef idx="minor">
+            <a:schemeClr val="dk1"/>
+          </a:fontRef>
+        </p:style>
+        <p:txBody>
+          <a:bodyPr rtlCol="0" anchor="ctr"/>
+          <a:lstStyle/>
+          <a:p>
+            <a:pPr algn="ctr"/>
+            <a:r>
+              <a:rPr lang="nl-NL" sz="1200" dirty="0" err="1" smtClean="0"/>
+              <a:t>AircraftMovementServiceDirectBindingClient</a:t>
+            </a:r>
+            <a:endParaRPr lang="en-US" sz="1200" dirty="0"/>
+          </a:p>
+        </p:txBody>
+      </p:sp>
+      <p:cxnSp>
+        <p:nvCxnSpPr>
+          <p:cNvPr id="46" name="Elbow Connector 45"/>
+          <p:cNvCxnSpPr>
+            <a:stCxn id="42" idx="0"/>
+            <a:endCxn id="41" idx="0"/>
+          </p:cNvCxnSpPr>
+          <p:nvPr/>
+        </p:nvCxnSpPr>
+        <p:spPr>
+          <a:xfrm rot="16200000" flipV="1">
+            <a:off x="519506" y="5893230"/>
+            <a:ext cx="490143" cy="342038"/>
+          </a:xfrm>
+          <a:prstGeom prst="bentConnector4">
+            <a:avLst>
+              <a:gd name="adj1" fmla="val 22014"/>
+              <a:gd name="adj2" fmla="val 308940"/>
+            </a:avLst>
+          </a:prstGeom>
+          <a:ln>
+            <a:tailEnd type="arrow"/>
+          </a:ln>
+        </p:spPr>
+        <p:style>
+          <a:lnRef idx="1">
+            <a:schemeClr val="accent1"/>
+          </a:lnRef>
+          <a:fillRef idx="0">
+            <a:schemeClr val="accent1"/>
+          </a:fillRef>
+          <a:effectRef idx="0">
+            <a:schemeClr val="accent1"/>
+          </a:effectRef>
+          <a:fontRef idx="minor">
+            <a:schemeClr val="tx1"/>
+          </a:fontRef>
+        </p:style>
+      </p:cxnSp>
+      <p:sp>
+        <p:nvSpPr>
+          <p:cNvPr id="53" name="Rounded Rectangle 52"/>
+          <p:cNvSpPr/>
+          <p:nvPr/>
+        </p:nvSpPr>
+        <p:spPr>
+          <a:xfrm>
+            <a:off x="107504" y="3501008"/>
+            <a:ext cx="1368152" cy="504056"/>
+          </a:xfrm>
+          <a:prstGeom prst="roundRect">
+            <a:avLst/>
+          </a:prstGeom>
+        </p:spPr>
+        <p:style>
+          <a:lnRef idx="1">
+            <a:schemeClr val="accent2"/>
+          </a:lnRef>
+          <a:fillRef idx="2">
+            <a:schemeClr val="accent2"/>
+          </a:fillRef>
+          <a:effectRef idx="1">
+            <a:schemeClr val="accent2"/>
+          </a:effectRef>
+          <a:fontRef idx="minor">
+            <a:schemeClr val="dk1"/>
+          </a:fontRef>
+        </p:style>
+        <p:txBody>
+          <a:bodyPr rtlCol="0" anchor="ctr"/>
+          <a:lstStyle/>
+          <a:p>
+            <a:pPr algn="ctr"/>
+            <a:r>
+              <a:rPr lang="nl-NL" sz="1200" dirty="0" err="1" smtClean="0"/>
+              <a:t>AircraftMovementServiceJEJBClient</a:t>
+            </a:r>
+            <a:endParaRPr lang="en-US" sz="1200" dirty="0"/>
+          </a:p>
+        </p:txBody>
+      </p:sp>
+      <p:cxnSp>
+        <p:nvCxnSpPr>
+          <p:cNvPr id="51" name="Elbow Connector 50"/>
+          <p:cNvCxnSpPr>
+            <a:endCxn id="48" idx="1"/>
+          </p:cNvCxnSpPr>
+          <p:nvPr/>
+        </p:nvCxnSpPr>
+        <p:spPr>
+          <a:xfrm rot="16200000" flipV="1">
+            <a:off x="513224" y="3222651"/>
+            <a:ext cx="344197" cy="212517"/>
+          </a:xfrm>
+          <a:prstGeom prst="bentConnector4">
+            <a:avLst>
+              <a:gd name="adj1" fmla="val 28453"/>
+              <a:gd name="adj2" fmla="val 222481"/>
+            </a:avLst>
+          </a:prstGeom>
+          <a:ln>
+            <a:tailEnd type="arrow"/>
+          </a:ln>
+        </p:spPr>
+        <p:style>
+          <a:lnRef idx="1">
+            <a:schemeClr val="accent1"/>
+          </a:lnRef>
+          <a:fillRef idx="0">
+            <a:schemeClr val="accent1"/>
+          </a:fillRef>
+          <a:effectRef idx="0">
+            <a:schemeClr val="accent1"/>
+          </a:effectRef>
+          <a:fontRef idx="minor">
+            <a:schemeClr val="tx1"/>
+          </a:fontRef>
+        </p:style>
+      </p:cxnSp>
+      <p:cxnSp>
+        <p:nvCxnSpPr>
+          <p:cNvPr id="56" name="Elbow Connector 55"/>
+          <p:cNvCxnSpPr>
+            <a:endCxn id="7" idx="2"/>
+          </p:cNvCxnSpPr>
+          <p:nvPr/>
+        </p:nvCxnSpPr>
+        <p:spPr>
+          <a:xfrm rot="16200000" flipH="1">
+            <a:off x="4951007" y="4001939"/>
+            <a:ext cx="2554355" cy="864095"/>
+          </a:xfrm>
+          <a:prstGeom prst="bentConnector2">
+            <a:avLst/>
+          </a:prstGeom>
+          <a:ln>
+            <a:tailEnd type="arrow"/>
+          </a:ln>
+        </p:spPr>
+        <p:style>
+          <a:lnRef idx="1">
+            <a:schemeClr val="accent1"/>
+          </a:lnRef>
+          <a:fillRef idx="0">
+            <a:schemeClr val="accent1"/>
+          </a:fillRef>
+          <a:effectRef idx="0">
+            <a:schemeClr val="accent1"/>
+          </a:effectRef>
+          <a:fontRef idx="minor">
+            <a:schemeClr val="tx1"/>
+          </a:fontRef>
+        </p:style>
+      </p:cxnSp>
+      <p:cxnSp>
+        <p:nvCxnSpPr>
+          <p:cNvPr id="60" name="Straight Arrow Connector 59"/>
+          <p:cNvCxnSpPr/>
+          <p:nvPr/>
+        </p:nvCxnSpPr>
+        <p:spPr>
+          <a:xfrm>
+            <a:off x="5652120" y="5567149"/>
+            <a:ext cx="1152128" cy="0"/>
+          </a:xfrm>
+          <a:prstGeom prst="straightConnector1">
+            <a:avLst/>
+          </a:prstGeom>
+          <a:ln>
+            <a:tailEnd type="arrow"/>
+          </a:ln>
+        </p:spPr>
+        <p:style>
+          <a:lnRef idx="1">
+            <a:schemeClr val="accent1"/>
+          </a:lnRef>
+          <a:fillRef idx="0">
+            <a:schemeClr val="accent1"/>
+          </a:fillRef>
+          <a:effectRef idx="0">
+            <a:schemeClr val="accent1"/>
+          </a:effectRef>
+          <a:fontRef idx="minor">
+            <a:schemeClr val="tx1"/>
+          </a:fontRef>
+        </p:style>
+      </p:cxnSp>
+    </p:spTree>
+    <p:extLst>
+      <p:ext uri="{BB962C8B-B14F-4D97-AF65-F5344CB8AC3E}">
+        <p14:creationId xmlns:p14="http://schemas.microsoft.com/office/powerpoint/2010/main" val="2154352014"/>
+      </p:ext>
+    </p:extLst>
+  </p:cSld>
+  <p:clrMapOvr>
+    <a:masterClrMapping/>
+  </p:clrMapOvr>
+  <p:timing>
+    <p:tnLst>
+      <p:par>
+        <p:cTn id="1" dur="indefinite" restart="never" nodeType="tmRoot"/>
+      </p:par>
+    </p:tnLst>
+  </p:timing>
+</p:sld>
+</file>
+
+<file path=ppt/slides/slide6.xml><?xml version="1.0" encoding="utf-8"?>
 <p:sld xmlns:a="http://schemas.openxmlformats.org/drawingml/2006/main" xmlns:r="http://schemas.openxmlformats.org/officeDocument/2006/relationships" xmlns:p="http://schemas.openxmlformats.org/presentationml/2006/main">
   <p:cSld>
     <p:spTree>

</xml_diff>

<commit_message>
Chapter 14 added to the overview
</commit_message>
<xml_diff>
--- a/ChapterOverviews_picturesOfService.pptx
+++ b/ChapterOverviews_picturesOfService.pptx
@@ -11,6 +11,7 @@
     <p:sldId id="261" r:id="rId5"/>
     <p:sldId id="262" r:id="rId6"/>
     <p:sldId id="259" r:id="rId7"/>
+    <p:sldId id="263" r:id="rId8"/>
   </p:sldIdLst>
   <p:sldSz cx="9144000" cy="6858000" type="screen4x3"/>
   <p:notesSz cx="6858000" cy="9144000"/>
@@ -293,7 +294,7 @@
           <a:p>
             <a:fld id="{56109F2C-2545-4AE2-8C8C-1380225067C3}" type="datetimeFigureOut">
               <a:rPr lang="en-US" smtClean="0"/>
-              <a:t>8/7/2014</a:t>
+              <a:t>8/26/2014</a:t>
             </a:fld>
             <a:endParaRPr lang="en-US"/>
           </a:p>
@@ -463,7 +464,7 @@
           <a:p>
             <a:fld id="{56109F2C-2545-4AE2-8C8C-1380225067C3}" type="datetimeFigureOut">
               <a:rPr lang="en-US" smtClean="0"/>
-              <a:t>8/7/2014</a:t>
+              <a:t>8/26/2014</a:t>
             </a:fld>
             <a:endParaRPr lang="en-US"/>
           </a:p>
@@ -643,7 +644,7 @@
           <a:p>
             <a:fld id="{56109F2C-2545-4AE2-8C8C-1380225067C3}" type="datetimeFigureOut">
               <a:rPr lang="en-US" smtClean="0"/>
-              <a:t>8/7/2014</a:t>
+              <a:t>8/26/2014</a:t>
             </a:fld>
             <a:endParaRPr lang="en-US"/>
           </a:p>
@@ -813,7 +814,7 @@
           <a:p>
             <a:fld id="{56109F2C-2545-4AE2-8C8C-1380225067C3}" type="datetimeFigureOut">
               <a:rPr lang="en-US" smtClean="0"/>
-              <a:t>8/7/2014</a:t>
+              <a:t>8/26/2014</a:t>
             </a:fld>
             <a:endParaRPr lang="en-US"/>
           </a:p>
@@ -1059,7 +1060,7 @@
           <a:p>
             <a:fld id="{56109F2C-2545-4AE2-8C8C-1380225067C3}" type="datetimeFigureOut">
               <a:rPr lang="en-US" smtClean="0"/>
-              <a:t>8/7/2014</a:t>
+              <a:t>8/26/2014</a:t>
             </a:fld>
             <a:endParaRPr lang="en-US"/>
           </a:p>
@@ -1347,7 +1348,7 @@
           <a:p>
             <a:fld id="{56109F2C-2545-4AE2-8C8C-1380225067C3}" type="datetimeFigureOut">
               <a:rPr lang="en-US" smtClean="0"/>
-              <a:t>8/7/2014</a:t>
+              <a:t>8/26/2014</a:t>
             </a:fld>
             <a:endParaRPr lang="en-US"/>
           </a:p>
@@ -1769,7 +1770,7 @@
           <a:p>
             <a:fld id="{56109F2C-2545-4AE2-8C8C-1380225067C3}" type="datetimeFigureOut">
               <a:rPr lang="en-US" smtClean="0"/>
-              <a:t>8/7/2014</a:t>
+              <a:t>8/26/2014</a:t>
             </a:fld>
             <a:endParaRPr lang="en-US"/>
           </a:p>
@@ -1887,7 +1888,7 @@
           <a:p>
             <a:fld id="{56109F2C-2545-4AE2-8C8C-1380225067C3}" type="datetimeFigureOut">
               <a:rPr lang="en-US" smtClean="0"/>
-              <a:t>8/7/2014</a:t>
+              <a:t>8/26/2014</a:t>
             </a:fld>
             <a:endParaRPr lang="en-US"/>
           </a:p>
@@ -1982,7 +1983,7 @@
           <a:p>
             <a:fld id="{56109F2C-2545-4AE2-8C8C-1380225067C3}" type="datetimeFigureOut">
               <a:rPr lang="en-US" smtClean="0"/>
-              <a:t>8/7/2014</a:t>
+              <a:t>8/26/2014</a:t>
             </a:fld>
             <a:endParaRPr lang="en-US"/>
           </a:p>
@@ -2259,7 +2260,7 @@
           <a:p>
             <a:fld id="{56109F2C-2545-4AE2-8C8C-1380225067C3}" type="datetimeFigureOut">
               <a:rPr lang="en-US" smtClean="0"/>
-              <a:t>8/7/2014</a:t>
+              <a:t>8/26/2014</a:t>
             </a:fld>
             <a:endParaRPr lang="en-US"/>
           </a:p>
@@ -2512,7 +2513,7 @@
           <a:p>
             <a:fld id="{56109F2C-2545-4AE2-8C8C-1380225067C3}" type="datetimeFigureOut">
               <a:rPr lang="en-US" smtClean="0"/>
-              <a:t>8/7/2014</a:t>
+              <a:t>8/26/2014</a:t>
             </a:fld>
             <a:endParaRPr lang="en-US"/>
           </a:p>
@@ -2725,7 +2726,7 @@
           <a:p>
             <a:fld id="{56109F2C-2545-4AE2-8C8C-1380225067C3}" type="datetimeFigureOut">
               <a:rPr lang="en-US" smtClean="0"/>
-              <a:t>8/7/2014</a:t>
+              <a:t>8/26/2014</a:t>
             </a:fld>
             <a:endParaRPr lang="en-US"/>
           </a:p>
@@ -7462,6 +7463,1623 @@
 </p:sld>
 </file>
 
+<file path=ppt/slides/slide7.xml><?xml version="1.0" encoding="utf-8"?>
+<p:sld xmlns:a="http://schemas.openxmlformats.org/drawingml/2006/main" xmlns:r="http://schemas.openxmlformats.org/officeDocument/2006/relationships" xmlns:p="http://schemas.openxmlformats.org/presentationml/2006/main">
+  <p:cSld>
+    <p:spTree>
+      <p:nvGrpSpPr>
+        <p:cNvPr id="1" name=""/>
+        <p:cNvGrpSpPr/>
+        <p:nvPr/>
+      </p:nvGrpSpPr>
+      <p:grpSpPr>
+        <a:xfrm>
+          <a:off x="0" y="0"/>
+          <a:ext cx="0" cy="0"/>
+          <a:chOff x="0" y="0"/>
+          <a:chExt cx="0" cy="0"/>
+        </a:xfrm>
+      </p:grpSpPr>
+      <p:sp>
+        <p:nvSpPr>
+          <p:cNvPr id="2" name="Title 1"/>
+          <p:cNvSpPr>
+            <a:spLocks noGrp="1"/>
+          </p:cNvSpPr>
+          <p:nvPr>
+            <p:ph type="title"/>
+          </p:nvPr>
+        </p:nvSpPr>
+        <p:spPr/>
+        <p:txBody>
+          <a:bodyPr/>
+          <a:lstStyle/>
+          <a:p>
+            <a:r>
+              <a:rPr lang="nl-NL" dirty="0" err="1" smtClean="0"/>
+              <a:t>Chapter</a:t>
+            </a:r>
+            <a:r>
+              <a:rPr lang="nl-NL" dirty="0" smtClean="0"/>
+              <a:t> 14</a:t>
+            </a:r>
+            <a:endParaRPr lang="en-US" dirty="0"/>
+          </a:p>
+        </p:txBody>
+      </p:sp>
+      <p:pic>
+        <p:nvPicPr>
+          <p:cNvPr id="3" name="Picture 2"/>
+          <p:cNvPicPr/>
+          <p:nvPr/>
+        </p:nvPicPr>
+        <p:blipFill>
+          <a:blip r:embed="rId2"/>
+          <a:stretch>
+            <a:fillRect/>
+          </a:stretch>
+        </p:blipFill>
+        <p:spPr>
+          <a:xfrm>
+            <a:off x="1979712" y="1412776"/>
+            <a:ext cx="4210541" cy="1616640"/>
+          </a:xfrm>
+          <a:prstGeom prst="rect">
+            <a:avLst/>
+          </a:prstGeom>
+        </p:spPr>
+      </p:pic>
+      <p:sp>
+        <p:nvSpPr>
+          <p:cNvPr id="4" name="Pentagon 3"/>
+          <p:cNvSpPr/>
+          <p:nvPr/>
+        </p:nvSpPr>
+        <p:spPr>
+          <a:xfrm>
+            <a:off x="1331640" y="3388901"/>
+            <a:ext cx="2249285" cy="936104"/>
+          </a:xfrm>
+          <a:prstGeom prst="homePlate">
+            <a:avLst/>
+          </a:prstGeom>
+        </p:spPr>
+        <p:style>
+          <a:lnRef idx="1">
+            <a:schemeClr val="accent5"/>
+          </a:lnRef>
+          <a:fillRef idx="2">
+            <a:schemeClr val="accent5"/>
+          </a:fillRef>
+          <a:effectRef idx="1">
+            <a:schemeClr val="accent5"/>
+          </a:effectRef>
+          <a:fontRef idx="minor">
+            <a:schemeClr val="dk1"/>
+          </a:fontRef>
+        </p:style>
+        <p:txBody>
+          <a:bodyPr rtlCol="0" anchor="ctr"/>
+          <a:lstStyle/>
+          <a:p>
+            <a:pPr algn="ctr"/>
+            <a:r>
+              <a:rPr lang="nl-NL" dirty="0" smtClean="0"/>
+              <a:t>Enterprise </a:t>
+            </a:r>
+            <a:r>
+              <a:rPr lang="nl-NL" dirty="0" err="1" smtClean="0"/>
+              <a:t>Scheduling</a:t>
+            </a:r>
+            <a:r>
+              <a:rPr lang="nl-NL" dirty="0" smtClean="0"/>
+              <a:t> Service</a:t>
+            </a:r>
+            <a:endParaRPr lang="en-US" dirty="0"/>
+          </a:p>
+        </p:txBody>
+      </p:sp>
+      <p:sp>
+        <p:nvSpPr>
+          <p:cNvPr id="5" name="Flowchart: Magnetic Disk 4"/>
+          <p:cNvSpPr/>
+          <p:nvPr/>
+        </p:nvSpPr>
+        <p:spPr>
+          <a:xfrm>
+            <a:off x="6876256" y="2060848"/>
+            <a:ext cx="2016224" cy="2376263"/>
+          </a:xfrm>
+          <a:prstGeom prst="flowChartMagneticDisk">
+            <a:avLst/>
+          </a:prstGeom>
+        </p:spPr>
+        <p:style>
+          <a:lnRef idx="1">
+            <a:schemeClr val="accent2"/>
+          </a:lnRef>
+          <a:fillRef idx="2">
+            <a:schemeClr val="accent2"/>
+          </a:fillRef>
+          <a:effectRef idx="1">
+            <a:schemeClr val="accent2"/>
+          </a:effectRef>
+          <a:fontRef idx="minor">
+            <a:schemeClr val="dk1"/>
+          </a:fontRef>
+        </p:style>
+        <p:txBody>
+          <a:bodyPr rtlCol="0" anchor="ctr"/>
+          <a:lstStyle/>
+          <a:p>
+            <a:pPr algn="ctr"/>
+            <a:endParaRPr lang="en-US"/>
+          </a:p>
+        </p:txBody>
+      </p:sp>
+      <p:sp>
+        <p:nvSpPr>
+          <p:cNvPr id="6" name="Oval 5"/>
+          <p:cNvSpPr/>
+          <p:nvPr/>
+        </p:nvSpPr>
+        <p:spPr>
+          <a:xfrm>
+            <a:off x="6970392" y="2924944"/>
+            <a:ext cx="1348307" cy="432048"/>
+          </a:xfrm>
+          <a:prstGeom prst="ellipse">
+            <a:avLst/>
+          </a:prstGeom>
+        </p:spPr>
+        <p:style>
+          <a:lnRef idx="2">
+            <a:schemeClr val="accent1">
+              <a:shade val="50000"/>
+            </a:schemeClr>
+          </a:lnRef>
+          <a:fillRef idx="1">
+            <a:schemeClr val="accent1"/>
+          </a:fillRef>
+          <a:effectRef idx="0">
+            <a:schemeClr val="accent1"/>
+          </a:effectRef>
+          <a:fontRef idx="minor">
+            <a:schemeClr val="lt1"/>
+          </a:fontRef>
+        </p:style>
+        <p:txBody>
+          <a:bodyPr rtlCol="0" anchor="ctr"/>
+          <a:lstStyle/>
+          <a:p>
+            <a:pPr algn="ctr"/>
+            <a:r>
+              <a:rPr lang="en-US" sz="1200" dirty="0" err="1"/>
+              <a:t>flight_data_manager</a:t>
+            </a:r>
+            <a:endParaRPr lang="en-US" sz="1200" dirty="0"/>
+          </a:p>
+        </p:txBody>
+      </p:sp>
+      <p:sp>
+        <p:nvSpPr>
+          <p:cNvPr id="7" name="Flowchart: Magnetic Disk 6"/>
+          <p:cNvSpPr/>
+          <p:nvPr/>
+        </p:nvSpPr>
+        <p:spPr>
+          <a:xfrm>
+            <a:off x="323528" y="5081644"/>
+            <a:ext cx="1512168" cy="1035935"/>
+          </a:xfrm>
+          <a:prstGeom prst="flowChartMagneticDisk">
+            <a:avLst/>
+          </a:prstGeom>
+        </p:spPr>
+        <p:style>
+          <a:lnRef idx="1">
+            <a:schemeClr val="accent2"/>
+          </a:lnRef>
+          <a:fillRef idx="2">
+            <a:schemeClr val="accent2"/>
+          </a:fillRef>
+          <a:effectRef idx="1">
+            <a:schemeClr val="accent2"/>
+          </a:effectRef>
+          <a:fontRef idx="minor">
+            <a:schemeClr val="dk1"/>
+          </a:fontRef>
+        </p:style>
+        <p:txBody>
+          <a:bodyPr rtlCol="0" anchor="ctr"/>
+          <a:lstStyle/>
+          <a:p>
+            <a:pPr algn="ctr"/>
+            <a:endParaRPr lang="en-US"/>
+          </a:p>
+        </p:txBody>
+      </p:sp>
+      <p:sp>
+        <p:nvSpPr>
+          <p:cNvPr id="8" name="Rectangle 7"/>
+          <p:cNvSpPr/>
+          <p:nvPr/>
+        </p:nvSpPr>
+        <p:spPr>
+          <a:xfrm>
+            <a:off x="516218" y="5585700"/>
+            <a:ext cx="1128124" cy="288032"/>
+          </a:xfrm>
+          <a:prstGeom prst="rect">
+            <a:avLst/>
+          </a:prstGeom>
+        </p:spPr>
+        <p:style>
+          <a:lnRef idx="2">
+            <a:schemeClr val="accent1">
+              <a:shade val="50000"/>
+            </a:schemeClr>
+          </a:lnRef>
+          <a:fillRef idx="1">
+            <a:schemeClr val="accent1"/>
+          </a:fillRef>
+          <a:effectRef idx="0">
+            <a:schemeClr val="accent1"/>
+          </a:effectRef>
+          <a:fontRef idx="minor">
+            <a:schemeClr val="lt1"/>
+          </a:fontRef>
+        </p:style>
+        <p:txBody>
+          <a:bodyPr rtlCol="0" anchor="ctr"/>
+          <a:lstStyle/>
+          <a:p>
+            <a:pPr algn="ctr"/>
+            <a:r>
+              <a:rPr lang="en-US" sz="1100" dirty="0"/>
+              <a:t>PORTAL_SLOT_ALLOCATIONS </a:t>
+            </a:r>
+          </a:p>
+        </p:txBody>
+      </p:sp>
+      <p:sp>
+        <p:nvSpPr>
+          <p:cNvPr id="10" name="Rectangle 9"/>
+          <p:cNvSpPr/>
+          <p:nvPr/>
+        </p:nvSpPr>
+        <p:spPr>
+          <a:xfrm>
+            <a:off x="7474448" y="2264665"/>
+            <a:ext cx="1128124" cy="351989"/>
+          </a:xfrm>
+          <a:prstGeom prst="rect">
+            <a:avLst/>
+          </a:prstGeom>
+        </p:spPr>
+        <p:style>
+          <a:lnRef idx="2">
+            <a:schemeClr val="accent1">
+              <a:shade val="50000"/>
+            </a:schemeClr>
+          </a:lnRef>
+          <a:fillRef idx="1">
+            <a:schemeClr val="accent1"/>
+          </a:fillRef>
+          <a:effectRef idx="0">
+            <a:schemeClr val="accent1"/>
+          </a:effectRef>
+          <a:fontRef idx="minor">
+            <a:schemeClr val="lt1"/>
+          </a:fontRef>
+        </p:style>
+        <p:txBody>
+          <a:bodyPr rtlCol="0" anchor="ctr"/>
+          <a:lstStyle/>
+          <a:p>
+            <a:pPr algn="ctr"/>
+            <a:r>
+              <a:rPr lang="nl-NL" sz="1100" dirty="0" smtClean="0"/>
+              <a:t>CURRENT_</a:t>
+            </a:r>
+            <a:br>
+              <a:rPr lang="nl-NL" sz="1100" dirty="0" smtClean="0"/>
+            </a:br>
+            <a:r>
+              <a:rPr lang="nl-NL" sz="1100" dirty="0" smtClean="0"/>
+              <a:t>&lt;FLIGHT-DATA&gt;</a:t>
+            </a:r>
+            <a:endParaRPr lang="en-US" sz="1100" dirty="0"/>
+          </a:p>
+        </p:txBody>
+      </p:sp>
+      <p:sp>
+        <p:nvSpPr>
+          <p:cNvPr id="11" name="Rectangle 10"/>
+          <p:cNvSpPr/>
+          <p:nvPr/>
+        </p:nvSpPr>
+        <p:spPr>
+          <a:xfrm>
+            <a:off x="7495371" y="3608465"/>
+            <a:ext cx="1128124" cy="351989"/>
+          </a:xfrm>
+          <a:prstGeom prst="rect">
+            <a:avLst/>
+          </a:prstGeom>
+        </p:spPr>
+        <p:style>
+          <a:lnRef idx="2">
+            <a:schemeClr val="accent1">
+              <a:shade val="50000"/>
+            </a:schemeClr>
+          </a:lnRef>
+          <a:fillRef idx="1">
+            <a:schemeClr val="accent1"/>
+          </a:fillRef>
+          <a:effectRef idx="0">
+            <a:schemeClr val="accent1"/>
+          </a:effectRef>
+          <a:fontRef idx="minor">
+            <a:schemeClr val="lt1"/>
+          </a:fontRef>
+        </p:style>
+        <p:txBody>
+          <a:bodyPr rtlCol="0" anchor="ctr"/>
+          <a:lstStyle/>
+          <a:p>
+            <a:pPr algn="ctr"/>
+            <a:r>
+              <a:rPr lang="nl-NL" sz="1100" dirty="0" smtClean="0"/>
+              <a:t>FUTURE_</a:t>
+            </a:r>
+            <a:br>
+              <a:rPr lang="nl-NL" sz="1100" dirty="0" smtClean="0"/>
+            </a:br>
+            <a:r>
+              <a:rPr lang="nl-NL" sz="1100" dirty="0" smtClean="0"/>
+              <a:t>&lt;SLOT-DATA&gt;</a:t>
+            </a:r>
+            <a:endParaRPr lang="en-US" sz="1100" dirty="0"/>
+          </a:p>
+        </p:txBody>
+      </p:sp>
+      <p:sp>
+        <p:nvSpPr>
+          <p:cNvPr id="12" name="Freeform 11"/>
+          <p:cNvSpPr/>
+          <p:nvPr/>
+        </p:nvSpPr>
+        <p:spPr>
+          <a:xfrm>
+            <a:off x="1524077" y="2777972"/>
+            <a:ext cx="2144696" cy="805759"/>
+          </a:xfrm>
+          <a:custGeom>
+            <a:avLst/>
+            <a:gdLst>
+              <a:gd name="connsiteX0" fmla="*/ 1791590 w 2144696"/>
+              <a:gd name="connsiteY0" fmla="*/ 805759 h 805759"/>
+              <a:gd name="connsiteX1" fmla="*/ 2090354 w 2144696"/>
+              <a:gd name="connsiteY1" fmla="*/ 633743 h 805759"/>
+              <a:gd name="connsiteX2" fmla="*/ 1927392 w 2144696"/>
+              <a:gd name="connsiteY2" fmla="*/ 416460 h 805759"/>
+              <a:gd name="connsiteX3" fmla="*/ 53325 w 2144696"/>
+              <a:gd name="connsiteY3" fmla="*/ 253498 h 805759"/>
+              <a:gd name="connsiteX4" fmla="*/ 696121 w 2144696"/>
+              <a:gd name="connsiteY4" fmla="*/ 0 h 805759"/>
+            </a:gdLst>
+            <a:ahLst/>
+            <a:cxnLst>
+              <a:cxn ang="0">
+                <a:pos x="connsiteX0" y="connsiteY0"/>
+              </a:cxn>
+              <a:cxn ang="0">
+                <a:pos x="connsiteX1" y="connsiteY1"/>
+              </a:cxn>
+              <a:cxn ang="0">
+                <a:pos x="connsiteX2" y="connsiteY2"/>
+              </a:cxn>
+              <a:cxn ang="0">
+                <a:pos x="connsiteX3" y="connsiteY3"/>
+              </a:cxn>
+              <a:cxn ang="0">
+                <a:pos x="connsiteX4" y="connsiteY4"/>
+              </a:cxn>
+            </a:cxnLst>
+            <a:rect l="l" t="t" r="r" b="b"/>
+            <a:pathLst>
+              <a:path w="2144696" h="805759">
+                <a:moveTo>
+                  <a:pt x="1791590" y="805759"/>
+                </a:moveTo>
+                <a:cubicBezTo>
+                  <a:pt x="1929655" y="752192"/>
+                  <a:pt x="2067720" y="698626"/>
+                  <a:pt x="2090354" y="633743"/>
+                </a:cubicBezTo>
+                <a:cubicBezTo>
+                  <a:pt x="2112988" y="568860"/>
+                  <a:pt x="2266897" y="479834"/>
+                  <a:pt x="1927392" y="416460"/>
+                </a:cubicBezTo>
+                <a:cubicBezTo>
+                  <a:pt x="1587887" y="353086"/>
+                  <a:pt x="258537" y="322908"/>
+                  <a:pt x="53325" y="253498"/>
+                </a:cubicBezTo>
+                <a:cubicBezTo>
+                  <a:pt x="-151887" y="184088"/>
+                  <a:pt x="272117" y="92044"/>
+                  <a:pt x="696121" y="0"/>
+                </a:cubicBezTo>
+              </a:path>
+            </a:pathLst>
+          </a:custGeom>
+          <a:noFill/>
+          <a:ln>
+            <a:headEnd type="none" w="med" len="med"/>
+            <a:tailEnd type="arrow" w="med" len="med"/>
+          </a:ln>
+        </p:spPr>
+        <p:style>
+          <a:lnRef idx="2">
+            <a:schemeClr val="accent1">
+              <a:shade val="50000"/>
+            </a:schemeClr>
+          </a:lnRef>
+          <a:fillRef idx="1">
+            <a:schemeClr val="accent1"/>
+          </a:fillRef>
+          <a:effectRef idx="0">
+            <a:schemeClr val="accent1"/>
+          </a:effectRef>
+          <a:fontRef idx="minor">
+            <a:schemeClr val="lt1"/>
+          </a:fontRef>
+        </p:style>
+        <p:txBody>
+          <a:bodyPr rtlCol="0" anchor="ctr"/>
+          <a:lstStyle/>
+          <a:p>
+            <a:pPr algn="ctr"/>
+            <a:endParaRPr lang="en-US"/>
+          </a:p>
+        </p:txBody>
+      </p:sp>
+      <p:sp>
+        <p:nvSpPr>
+          <p:cNvPr id="13" name="Freeform 12"/>
+          <p:cNvSpPr/>
+          <p:nvPr/>
+        </p:nvSpPr>
+        <p:spPr>
+          <a:xfrm>
+            <a:off x="7944330" y="2629281"/>
+            <a:ext cx="453517" cy="1005911"/>
+          </a:xfrm>
+          <a:custGeom>
+            <a:avLst/>
+            <a:gdLst>
+              <a:gd name="connsiteX0" fmla="*/ 0 w 453517"/>
+              <a:gd name="connsiteY0" fmla="*/ 706171 h 1005911"/>
+              <a:gd name="connsiteX1" fmla="*/ 144855 w 453517"/>
+              <a:gd name="connsiteY1" fmla="*/ 959668 h 1005911"/>
+              <a:gd name="connsiteX2" fmla="*/ 307818 w 453517"/>
+              <a:gd name="connsiteY2" fmla="*/ 959668 h 1005911"/>
+              <a:gd name="connsiteX3" fmla="*/ 452673 w 453517"/>
+              <a:gd name="connsiteY3" fmla="*/ 488888 h 1005911"/>
+              <a:gd name="connsiteX4" fmla="*/ 371192 w 453517"/>
+              <a:gd name="connsiteY4" fmla="*/ 0 h 1005911"/>
+            </a:gdLst>
+            <a:ahLst/>
+            <a:cxnLst>
+              <a:cxn ang="0">
+                <a:pos x="connsiteX0" y="connsiteY0"/>
+              </a:cxn>
+              <a:cxn ang="0">
+                <a:pos x="connsiteX1" y="connsiteY1"/>
+              </a:cxn>
+              <a:cxn ang="0">
+                <a:pos x="connsiteX2" y="connsiteY2"/>
+              </a:cxn>
+              <a:cxn ang="0">
+                <a:pos x="connsiteX3" y="connsiteY3"/>
+              </a:cxn>
+              <a:cxn ang="0">
+                <a:pos x="connsiteX4" y="connsiteY4"/>
+              </a:cxn>
+            </a:cxnLst>
+            <a:rect l="l" t="t" r="r" b="b"/>
+            <a:pathLst>
+              <a:path w="453517" h="1005911">
+                <a:moveTo>
+                  <a:pt x="0" y="706171"/>
+                </a:moveTo>
+                <a:cubicBezTo>
+                  <a:pt x="46776" y="811795"/>
+                  <a:pt x="93552" y="917419"/>
+                  <a:pt x="144855" y="959668"/>
+                </a:cubicBezTo>
+                <a:cubicBezTo>
+                  <a:pt x="196158" y="1001917"/>
+                  <a:pt x="256515" y="1038131"/>
+                  <a:pt x="307818" y="959668"/>
+                </a:cubicBezTo>
+                <a:cubicBezTo>
+                  <a:pt x="359121" y="881205"/>
+                  <a:pt x="442111" y="648833"/>
+                  <a:pt x="452673" y="488888"/>
+                </a:cubicBezTo>
+                <a:cubicBezTo>
+                  <a:pt x="463235" y="328943"/>
+                  <a:pt x="371192" y="0"/>
+                  <a:pt x="371192" y="0"/>
+                </a:cubicBezTo>
+              </a:path>
+            </a:pathLst>
+          </a:custGeom>
+          <a:noFill/>
+          <a:ln w="12700">
+            <a:headEnd type="none" w="med" len="med"/>
+            <a:tailEnd type="arrow" w="med" len="med"/>
+          </a:ln>
+        </p:spPr>
+        <p:style>
+          <a:lnRef idx="2">
+            <a:schemeClr val="accent1">
+              <a:shade val="50000"/>
+            </a:schemeClr>
+          </a:lnRef>
+          <a:fillRef idx="1">
+            <a:schemeClr val="accent1"/>
+          </a:fillRef>
+          <a:effectRef idx="0">
+            <a:schemeClr val="accent1"/>
+          </a:effectRef>
+          <a:fontRef idx="minor">
+            <a:schemeClr val="lt1"/>
+          </a:fontRef>
+        </p:style>
+        <p:txBody>
+          <a:bodyPr rtlCol="0" anchor="ctr"/>
+          <a:lstStyle/>
+          <a:p>
+            <a:pPr algn="ctr"/>
+            <a:endParaRPr lang="en-US"/>
+          </a:p>
+        </p:txBody>
+      </p:sp>
+      <p:sp>
+        <p:nvSpPr>
+          <p:cNvPr id="14" name="Freeform 13"/>
+          <p:cNvSpPr/>
+          <p:nvPr/>
+        </p:nvSpPr>
+        <p:spPr>
+          <a:xfrm rot="20974169">
+            <a:off x="5886850" y="2496330"/>
+            <a:ext cx="1277437" cy="606017"/>
+          </a:xfrm>
+          <a:custGeom>
+            <a:avLst/>
+            <a:gdLst>
+              <a:gd name="connsiteX0" fmla="*/ 0 w 1050202"/>
+              <a:gd name="connsiteY0" fmla="*/ 108076 h 606017"/>
+              <a:gd name="connsiteX1" fmla="*/ 497941 w 1050202"/>
+              <a:gd name="connsiteY1" fmla="*/ 35648 h 606017"/>
+              <a:gd name="connsiteX2" fmla="*/ 1050202 w 1050202"/>
+              <a:gd name="connsiteY2" fmla="*/ 606017 h 606017"/>
+            </a:gdLst>
+            <a:ahLst/>
+            <a:cxnLst>
+              <a:cxn ang="0">
+                <a:pos x="connsiteX0" y="connsiteY0"/>
+              </a:cxn>
+              <a:cxn ang="0">
+                <a:pos x="connsiteX1" y="connsiteY1"/>
+              </a:cxn>
+              <a:cxn ang="0">
+                <a:pos x="connsiteX2" y="connsiteY2"/>
+              </a:cxn>
+            </a:cxnLst>
+            <a:rect l="l" t="t" r="r" b="b"/>
+            <a:pathLst>
+              <a:path w="1050202" h="606017">
+                <a:moveTo>
+                  <a:pt x="0" y="108076"/>
+                </a:moveTo>
+                <a:cubicBezTo>
+                  <a:pt x="161453" y="30367"/>
+                  <a:pt x="322907" y="-47342"/>
+                  <a:pt x="497941" y="35648"/>
+                </a:cubicBezTo>
+                <a:cubicBezTo>
+                  <a:pt x="672975" y="118638"/>
+                  <a:pt x="861588" y="362327"/>
+                  <a:pt x="1050202" y="606017"/>
+                </a:cubicBezTo>
+              </a:path>
+            </a:pathLst>
+          </a:custGeom>
+          <a:noFill/>
+          <a:ln w="12700">
+            <a:headEnd type="none" w="med" len="med"/>
+            <a:tailEnd type="arrow" w="med" len="med"/>
+          </a:ln>
+        </p:spPr>
+        <p:style>
+          <a:lnRef idx="2">
+            <a:schemeClr val="accent1">
+              <a:shade val="50000"/>
+            </a:schemeClr>
+          </a:lnRef>
+          <a:fillRef idx="1">
+            <a:schemeClr val="accent1"/>
+          </a:fillRef>
+          <a:effectRef idx="0">
+            <a:schemeClr val="accent1"/>
+          </a:effectRef>
+          <a:fontRef idx="minor">
+            <a:schemeClr val="lt1"/>
+          </a:fontRef>
+        </p:style>
+        <p:txBody>
+          <a:bodyPr rtlCol="0" anchor="ctr"/>
+          <a:lstStyle/>
+          <a:p>
+            <a:pPr algn="ctr"/>
+            <a:endParaRPr lang="en-US"/>
+          </a:p>
+        </p:txBody>
+      </p:sp>
+      <p:pic>
+        <p:nvPicPr>
+          <p:cNvPr id="1026" name="Picture 2"/>
+          <p:cNvPicPr>
+            <a:picLocks noChangeAspect="1" noChangeArrowheads="1"/>
+          </p:cNvPicPr>
+          <p:nvPr/>
+        </p:nvPicPr>
+        <p:blipFill>
+          <a:blip r:embed="rId3">
+            <a:extLst>
+              <a:ext uri="{28A0092B-C50C-407E-A947-70E740481C1C}">
+                <a14:useLocalDpi xmlns:a14="http://schemas.microsoft.com/office/drawing/2010/main" val="0"/>
+              </a:ext>
+            </a:extLst>
+          </a:blip>
+          <a:srcRect/>
+          <a:stretch>
+            <a:fillRect/>
+          </a:stretch>
+        </p:blipFill>
+        <p:spPr bwMode="auto">
+          <a:xfrm>
+            <a:off x="1979712" y="4644445"/>
+            <a:ext cx="4351437" cy="2168931"/>
+          </a:xfrm>
+          <a:prstGeom prst="rect">
+            <a:avLst/>
+          </a:prstGeom>
+          <a:noFill/>
+          <a:ln>
+            <a:noFill/>
+          </a:ln>
+          <a:extLst>
+            <a:ext uri="{909E8E84-426E-40DD-AFC4-6F175D3DCCD1}">
+              <a14:hiddenFill xmlns:a14="http://schemas.microsoft.com/office/drawing/2010/main">
+                <a:solidFill>
+                  <a:schemeClr val="accent1"/>
+                </a:solidFill>
+              </a14:hiddenFill>
+            </a:ext>
+            <a:ext uri="{91240B29-F687-4F45-9708-019B960494DF}">
+              <a14:hiddenLine xmlns:a14="http://schemas.microsoft.com/office/drawing/2010/main" w="9525">
+                <a:solidFill>
+                  <a:schemeClr val="tx1"/>
+                </a:solidFill>
+                <a:miter lim="800000"/>
+                <a:headEnd/>
+                <a:tailEnd/>
+              </a14:hiddenLine>
+            </a:ext>
+          </a:extLst>
+        </p:spPr>
+      </p:pic>
+      <p:sp>
+        <p:nvSpPr>
+          <p:cNvPr id="16" name="Rounded Rectangle 15"/>
+          <p:cNvSpPr/>
+          <p:nvPr/>
+        </p:nvSpPr>
+        <p:spPr>
+          <a:xfrm>
+            <a:off x="6573534" y="4941168"/>
+            <a:ext cx="2448272" cy="1008112"/>
+          </a:xfrm>
+          <a:prstGeom prst="roundRect">
+            <a:avLst/>
+          </a:prstGeom>
+        </p:spPr>
+        <p:style>
+          <a:lnRef idx="2">
+            <a:schemeClr val="accent1">
+              <a:shade val="50000"/>
+            </a:schemeClr>
+          </a:lnRef>
+          <a:fillRef idx="1">
+            <a:schemeClr val="accent1"/>
+          </a:fillRef>
+          <a:effectRef idx="0">
+            <a:schemeClr val="accent1"/>
+          </a:effectRef>
+          <a:fontRef idx="minor">
+            <a:schemeClr val="lt1"/>
+          </a:fontRef>
+        </p:style>
+        <p:txBody>
+          <a:bodyPr rtlCol="0" anchor="ctr"/>
+          <a:lstStyle/>
+          <a:p>
+            <a:pPr algn="ctr"/>
+            <a:r>
+              <a:rPr lang="nl-NL" sz="1400" dirty="0" err="1" smtClean="0"/>
+              <a:t>SlotService</a:t>
+            </a:r>
+            <a:r>
+              <a:rPr lang="nl-NL" sz="1400" dirty="0" smtClean="0"/>
+              <a:t> (Ch4)</a:t>
+            </a:r>
+          </a:p>
+          <a:p>
+            <a:pPr algn="ctr"/>
+            <a:endParaRPr lang="nl-NL" sz="1400" dirty="0"/>
+          </a:p>
+          <a:p>
+            <a:pPr algn="ctr"/>
+            <a:endParaRPr lang="nl-NL" sz="1400" dirty="0" smtClean="0"/>
+          </a:p>
+          <a:p>
+            <a:pPr algn="ctr"/>
+            <a:endParaRPr lang="en-US" sz="1400" dirty="0"/>
+          </a:p>
+        </p:txBody>
+      </p:sp>
+      <p:pic>
+        <p:nvPicPr>
+          <p:cNvPr id="17" name="Picture 8"/>
+          <p:cNvPicPr>
+            <a:picLocks noChangeAspect="1" noChangeArrowheads="1"/>
+          </p:cNvPicPr>
+          <p:nvPr/>
+        </p:nvPicPr>
+        <p:blipFill>
+          <a:blip r:embed="rId4" cstate="print">
+            <a:extLst>
+              <a:ext uri="{28A0092B-C50C-407E-A947-70E740481C1C}">
+                <a14:useLocalDpi xmlns:a14="http://schemas.microsoft.com/office/drawing/2010/main" val="0"/>
+              </a:ext>
+            </a:extLst>
+          </a:blip>
+          <a:srcRect/>
+          <a:stretch>
+            <a:fillRect/>
+          </a:stretch>
+        </p:blipFill>
+        <p:spPr bwMode="auto">
+          <a:xfrm>
+            <a:off x="6661700" y="5259619"/>
+            <a:ext cx="2216090" cy="617653"/>
+          </a:xfrm>
+          <a:prstGeom prst="rect">
+            <a:avLst/>
+          </a:prstGeom>
+          <a:noFill/>
+          <a:ln>
+            <a:noFill/>
+          </a:ln>
+          <a:extLst>
+            <a:ext uri="{909E8E84-426E-40DD-AFC4-6F175D3DCCD1}">
+              <a14:hiddenFill xmlns:a14="http://schemas.microsoft.com/office/drawing/2010/main">
+                <a:solidFill>
+                  <a:schemeClr val="accent1"/>
+                </a:solidFill>
+              </a14:hiddenFill>
+            </a:ext>
+            <a:ext uri="{91240B29-F687-4F45-9708-019B960494DF}">
+              <a14:hiddenLine xmlns:a14="http://schemas.microsoft.com/office/drawing/2010/main" w="9525">
+                <a:solidFill>
+                  <a:schemeClr val="tx1"/>
+                </a:solidFill>
+                <a:miter lim="800000"/>
+                <a:headEnd/>
+                <a:tailEnd/>
+              </a14:hiddenLine>
+            </a:ext>
+          </a:extLst>
+        </p:spPr>
+      </p:pic>
+      <p:sp>
+        <p:nvSpPr>
+          <p:cNvPr id="18" name="Freeform 17"/>
+          <p:cNvSpPr/>
+          <p:nvPr/>
+        </p:nvSpPr>
+        <p:spPr>
+          <a:xfrm rot="2022306">
+            <a:off x="1561279" y="5750924"/>
+            <a:ext cx="686966" cy="284621"/>
+          </a:xfrm>
+          <a:custGeom>
+            <a:avLst/>
+            <a:gdLst>
+              <a:gd name="connsiteX0" fmla="*/ 1150136 w 1249724"/>
+              <a:gd name="connsiteY0" fmla="*/ 0 h 284621"/>
+              <a:gd name="connsiteX1" fmla="*/ 346 w 1249724"/>
+              <a:gd name="connsiteY1" fmla="*/ 271604 h 284621"/>
+              <a:gd name="connsiteX2" fmla="*/ 1249724 w 1249724"/>
+              <a:gd name="connsiteY2" fmla="*/ 244444 h 284621"/>
+            </a:gdLst>
+            <a:ahLst/>
+            <a:cxnLst>
+              <a:cxn ang="0">
+                <a:pos x="connsiteX0" y="connsiteY0"/>
+              </a:cxn>
+              <a:cxn ang="0">
+                <a:pos x="connsiteX1" y="connsiteY1"/>
+              </a:cxn>
+              <a:cxn ang="0">
+                <a:pos x="connsiteX2" y="connsiteY2"/>
+              </a:cxn>
+            </a:cxnLst>
+            <a:rect l="l" t="t" r="r" b="b"/>
+            <a:pathLst>
+              <a:path w="1249724" h="284621">
+                <a:moveTo>
+                  <a:pt x="1150136" y="0"/>
+                </a:moveTo>
+                <a:cubicBezTo>
+                  <a:pt x="566942" y="115431"/>
+                  <a:pt x="-16252" y="230863"/>
+                  <a:pt x="346" y="271604"/>
+                </a:cubicBezTo>
+                <a:cubicBezTo>
+                  <a:pt x="16944" y="312345"/>
+                  <a:pt x="1249724" y="244444"/>
+                  <a:pt x="1249724" y="244444"/>
+                </a:cubicBezTo>
+              </a:path>
+            </a:pathLst>
+          </a:custGeom>
+          <a:noFill/>
+          <a:ln w="12700">
+            <a:headEnd type="none" w="med" len="med"/>
+            <a:tailEnd type="arrow" w="med" len="med"/>
+          </a:ln>
+        </p:spPr>
+        <p:style>
+          <a:lnRef idx="2">
+            <a:schemeClr val="accent1">
+              <a:shade val="50000"/>
+            </a:schemeClr>
+          </a:lnRef>
+          <a:fillRef idx="1">
+            <a:schemeClr val="accent1"/>
+          </a:fillRef>
+          <a:effectRef idx="0">
+            <a:schemeClr val="accent1"/>
+          </a:effectRef>
+          <a:fontRef idx="minor">
+            <a:schemeClr val="lt1"/>
+          </a:fontRef>
+        </p:style>
+        <p:txBody>
+          <a:bodyPr rtlCol="0" anchor="ctr"/>
+          <a:lstStyle/>
+          <a:p>
+            <a:pPr algn="ctr"/>
+            <a:endParaRPr lang="en-US"/>
+          </a:p>
+        </p:txBody>
+      </p:sp>
+      <p:cxnSp>
+        <p:nvCxnSpPr>
+          <p:cNvPr id="19" name="Straight Arrow Connector 18"/>
+          <p:cNvCxnSpPr/>
+          <p:nvPr/>
+        </p:nvCxnSpPr>
+        <p:spPr>
+          <a:xfrm>
+            <a:off x="6190253" y="5599611"/>
+            <a:ext cx="613995" cy="130105"/>
+          </a:xfrm>
+          <a:prstGeom prst="straightConnector1">
+            <a:avLst/>
+          </a:prstGeom>
+          <a:ln>
+            <a:tailEnd type="arrow"/>
+          </a:ln>
+        </p:spPr>
+        <p:style>
+          <a:lnRef idx="1">
+            <a:schemeClr val="accent1"/>
+          </a:lnRef>
+          <a:fillRef idx="0">
+            <a:schemeClr val="accent1"/>
+          </a:fillRef>
+          <a:effectRef idx="0">
+            <a:schemeClr val="accent1"/>
+          </a:effectRef>
+          <a:fontRef idx="minor">
+            <a:schemeClr val="tx1"/>
+          </a:fontRef>
+        </p:style>
+      </p:cxnSp>
+      <p:cxnSp>
+        <p:nvCxnSpPr>
+          <p:cNvPr id="21" name="Straight Arrow Connector 20"/>
+          <p:cNvCxnSpPr/>
+          <p:nvPr/>
+        </p:nvCxnSpPr>
+        <p:spPr>
+          <a:xfrm flipH="1" flipV="1">
+            <a:off x="8382071" y="3960454"/>
+            <a:ext cx="294386" cy="1704209"/>
+          </a:xfrm>
+          <a:prstGeom prst="straightConnector1">
+            <a:avLst/>
+          </a:prstGeom>
+          <a:ln>
+            <a:tailEnd type="arrow"/>
+          </a:ln>
+        </p:spPr>
+        <p:style>
+          <a:lnRef idx="1">
+            <a:schemeClr val="accent1"/>
+          </a:lnRef>
+          <a:fillRef idx="0">
+            <a:schemeClr val="accent1"/>
+          </a:fillRef>
+          <a:effectRef idx="0">
+            <a:schemeClr val="accent1"/>
+          </a:effectRef>
+          <a:fontRef idx="minor">
+            <a:schemeClr val="tx1"/>
+          </a:fontRef>
+        </p:style>
+      </p:cxnSp>
+      <p:sp>
+        <p:nvSpPr>
+          <p:cNvPr id="22" name="Freeform 21"/>
+          <p:cNvSpPr/>
+          <p:nvPr/>
+        </p:nvSpPr>
+        <p:spPr>
+          <a:xfrm>
+            <a:off x="2679826" y="4173648"/>
+            <a:ext cx="597528" cy="1720158"/>
+          </a:xfrm>
+          <a:custGeom>
+            <a:avLst/>
+            <a:gdLst>
+              <a:gd name="connsiteX0" fmla="*/ 597528 w 597528"/>
+              <a:gd name="connsiteY0" fmla="*/ 0 h 1720158"/>
+              <a:gd name="connsiteX1" fmla="*/ 479833 w 597528"/>
+              <a:gd name="connsiteY1" fmla="*/ 878186 h 1720158"/>
+              <a:gd name="connsiteX2" fmla="*/ 0 w 597528"/>
+              <a:gd name="connsiteY2" fmla="*/ 1720158 h 1720158"/>
+            </a:gdLst>
+            <a:ahLst/>
+            <a:cxnLst>
+              <a:cxn ang="0">
+                <a:pos x="connsiteX0" y="connsiteY0"/>
+              </a:cxn>
+              <a:cxn ang="0">
+                <a:pos x="connsiteX1" y="connsiteY1"/>
+              </a:cxn>
+              <a:cxn ang="0">
+                <a:pos x="connsiteX2" y="connsiteY2"/>
+              </a:cxn>
+            </a:cxnLst>
+            <a:rect l="l" t="t" r="r" b="b"/>
+            <a:pathLst>
+              <a:path w="597528" h="1720158">
+                <a:moveTo>
+                  <a:pt x="597528" y="0"/>
+                </a:moveTo>
+                <a:cubicBezTo>
+                  <a:pt x="588474" y="295746"/>
+                  <a:pt x="579421" y="591493"/>
+                  <a:pt x="479833" y="878186"/>
+                </a:cubicBezTo>
+                <a:cubicBezTo>
+                  <a:pt x="380245" y="1164879"/>
+                  <a:pt x="0" y="1720158"/>
+                  <a:pt x="0" y="1720158"/>
+                </a:cubicBezTo>
+              </a:path>
+            </a:pathLst>
+          </a:custGeom>
+          <a:noFill/>
+          <a:ln>
+            <a:prstDash val="sysDash"/>
+            <a:headEnd type="none" w="med" len="med"/>
+            <a:tailEnd type="arrow" w="med" len="med"/>
+          </a:ln>
+        </p:spPr>
+        <p:style>
+          <a:lnRef idx="2">
+            <a:schemeClr val="accent1">
+              <a:shade val="50000"/>
+            </a:schemeClr>
+          </a:lnRef>
+          <a:fillRef idx="1">
+            <a:schemeClr val="accent1"/>
+          </a:fillRef>
+          <a:effectRef idx="0">
+            <a:schemeClr val="accent1"/>
+          </a:effectRef>
+          <a:fontRef idx="minor">
+            <a:schemeClr val="lt1"/>
+          </a:fontRef>
+        </p:style>
+        <p:txBody>
+          <a:bodyPr rtlCol="0" anchor="ctr"/>
+          <a:lstStyle/>
+          <a:p>
+            <a:pPr algn="ctr"/>
+            <a:endParaRPr lang="en-US"/>
+          </a:p>
+        </p:txBody>
+      </p:sp>
+      <p:sp>
+        <p:nvSpPr>
+          <p:cNvPr id="23" name="Rectangle 22"/>
+          <p:cNvSpPr/>
+          <p:nvPr/>
+        </p:nvSpPr>
+        <p:spPr>
+          <a:xfrm>
+            <a:off x="2843808" y="4835373"/>
+            <a:ext cx="936104" cy="396707"/>
+          </a:xfrm>
+          <a:prstGeom prst="rect">
+            <a:avLst/>
+          </a:prstGeom>
+        </p:spPr>
+        <p:style>
+          <a:lnRef idx="2">
+            <a:schemeClr val="accent6">
+              <a:shade val="50000"/>
+            </a:schemeClr>
+          </a:lnRef>
+          <a:fillRef idx="1">
+            <a:schemeClr val="accent6"/>
+          </a:fillRef>
+          <a:effectRef idx="0">
+            <a:schemeClr val="accent6"/>
+          </a:effectRef>
+          <a:fontRef idx="minor">
+            <a:schemeClr val="lt1"/>
+          </a:fontRef>
+        </p:style>
+        <p:txBody>
+          <a:bodyPr rtlCol="0" anchor="ctr"/>
+          <a:lstStyle/>
+          <a:p>
+            <a:pPr algn="ctr"/>
+            <a:r>
+              <a:rPr lang="nl-NL" sz="1200" dirty="0" err="1" smtClean="0"/>
+              <a:t>Activate</a:t>
+            </a:r>
+            <a:r>
+              <a:rPr lang="nl-NL" sz="1200" dirty="0" smtClean="0"/>
+              <a:t>/</a:t>
+            </a:r>
+            <a:br>
+              <a:rPr lang="nl-NL" sz="1200" dirty="0" smtClean="0"/>
+            </a:br>
+            <a:r>
+              <a:rPr lang="nl-NL" sz="1200" dirty="0" err="1" smtClean="0"/>
+              <a:t>deactivate</a:t>
+            </a:r>
+            <a:endParaRPr lang="en-US" sz="1200" dirty="0"/>
+          </a:p>
+        </p:txBody>
+      </p:sp>
+      <p:sp>
+        <p:nvSpPr>
+          <p:cNvPr id="25" name="Rectangle 24"/>
+          <p:cNvSpPr/>
+          <p:nvPr/>
+        </p:nvSpPr>
+        <p:spPr>
+          <a:xfrm>
+            <a:off x="2830046" y="2908088"/>
+            <a:ext cx="1325384" cy="433461"/>
+          </a:xfrm>
+          <a:prstGeom prst="rect">
+            <a:avLst/>
+          </a:prstGeom>
+        </p:spPr>
+        <p:style>
+          <a:lnRef idx="2">
+            <a:schemeClr val="accent6">
+              <a:shade val="50000"/>
+            </a:schemeClr>
+          </a:lnRef>
+          <a:fillRef idx="1">
+            <a:schemeClr val="accent6"/>
+          </a:fillRef>
+          <a:effectRef idx="0">
+            <a:schemeClr val="accent6"/>
+          </a:effectRef>
+          <a:fontRef idx="minor">
+            <a:schemeClr val="lt1"/>
+          </a:fontRef>
+        </p:style>
+        <p:txBody>
+          <a:bodyPr rtlCol="0" anchor="ctr"/>
+          <a:lstStyle/>
+          <a:p>
+            <a:pPr algn="ctr"/>
+            <a:r>
+              <a:rPr lang="nl-NL" sz="1200" dirty="0" smtClean="0"/>
+              <a:t>Job </a:t>
+            </a:r>
+            <a:r>
+              <a:rPr lang="nl-NL" sz="1200" dirty="0" err="1" smtClean="0"/>
+              <a:t>Create</a:t>
+            </a:r>
+            <a:r>
+              <a:rPr lang="nl-NL" sz="1200" dirty="0" smtClean="0"/>
+              <a:t> </a:t>
+            </a:r>
+            <a:r>
+              <a:rPr lang="nl-NL" sz="1200" dirty="0" err="1" smtClean="0"/>
+              <a:t>CurrentFlightData</a:t>
+            </a:r>
+            <a:endParaRPr lang="en-US" sz="1200" dirty="0"/>
+          </a:p>
+        </p:txBody>
+      </p:sp>
+      <p:sp>
+        <p:nvSpPr>
+          <p:cNvPr id="24" name="Freeform 23"/>
+          <p:cNvSpPr/>
+          <p:nvPr/>
+        </p:nvSpPr>
+        <p:spPr>
+          <a:xfrm>
+            <a:off x="3585172" y="3341549"/>
+            <a:ext cx="3623418" cy="506174"/>
+          </a:xfrm>
+          <a:custGeom>
+            <a:avLst/>
+            <a:gdLst>
+              <a:gd name="connsiteX0" fmla="*/ 0 w 3132499"/>
+              <a:gd name="connsiteY0" fmla="*/ 316872 h 316872"/>
+              <a:gd name="connsiteX1" fmla="*/ 1439501 w 3132499"/>
+              <a:gd name="connsiteY1" fmla="*/ 27161 h 316872"/>
+              <a:gd name="connsiteX2" fmla="*/ 2625505 w 3132499"/>
+              <a:gd name="connsiteY2" fmla="*/ 144856 h 316872"/>
+              <a:gd name="connsiteX3" fmla="*/ 3132499 w 3132499"/>
+              <a:gd name="connsiteY3" fmla="*/ 0 h 316872"/>
+            </a:gdLst>
+            <a:ahLst/>
+            <a:cxnLst>
+              <a:cxn ang="0">
+                <a:pos x="connsiteX0" y="connsiteY0"/>
+              </a:cxn>
+              <a:cxn ang="0">
+                <a:pos x="connsiteX1" y="connsiteY1"/>
+              </a:cxn>
+              <a:cxn ang="0">
+                <a:pos x="connsiteX2" y="connsiteY2"/>
+              </a:cxn>
+              <a:cxn ang="0">
+                <a:pos x="connsiteX3" y="connsiteY3"/>
+              </a:cxn>
+            </a:cxnLst>
+            <a:rect l="l" t="t" r="r" b="b"/>
+            <a:pathLst>
+              <a:path w="3132499" h="316872">
+                <a:moveTo>
+                  <a:pt x="0" y="316872"/>
+                </a:moveTo>
+                <a:cubicBezTo>
+                  <a:pt x="500958" y="186351"/>
+                  <a:pt x="1001917" y="55830"/>
+                  <a:pt x="1439501" y="27161"/>
+                </a:cubicBezTo>
+                <a:cubicBezTo>
+                  <a:pt x="1877085" y="-1508"/>
+                  <a:pt x="2343339" y="149383"/>
+                  <a:pt x="2625505" y="144856"/>
+                </a:cubicBezTo>
+                <a:cubicBezTo>
+                  <a:pt x="2907671" y="140329"/>
+                  <a:pt x="3020085" y="70164"/>
+                  <a:pt x="3132499" y="0"/>
+                </a:cubicBezTo>
+              </a:path>
+            </a:pathLst>
+          </a:custGeom>
+          <a:noFill/>
+          <a:ln>
+            <a:headEnd type="none" w="med" len="med"/>
+            <a:tailEnd type="arrow" w="med" len="med"/>
+          </a:ln>
+        </p:spPr>
+        <p:style>
+          <a:lnRef idx="2">
+            <a:schemeClr val="accent1">
+              <a:shade val="50000"/>
+            </a:schemeClr>
+          </a:lnRef>
+          <a:fillRef idx="1">
+            <a:schemeClr val="accent1"/>
+          </a:fillRef>
+          <a:effectRef idx="0">
+            <a:schemeClr val="accent1"/>
+          </a:effectRef>
+          <a:fontRef idx="minor">
+            <a:schemeClr val="lt1"/>
+          </a:fontRef>
+        </p:style>
+        <p:txBody>
+          <a:bodyPr rtlCol="0" anchor="ctr"/>
+          <a:lstStyle/>
+          <a:p>
+            <a:pPr algn="ctr"/>
+            <a:endParaRPr lang="en-US"/>
+          </a:p>
+        </p:txBody>
+      </p:sp>
+      <p:sp>
+        <p:nvSpPr>
+          <p:cNvPr id="27" name="Rectangle 26"/>
+          <p:cNvSpPr/>
+          <p:nvPr/>
+        </p:nvSpPr>
+        <p:spPr>
+          <a:xfrm>
+            <a:off x="4686776" y="3355579"/>
+            <a:ext cx="1325384" cy="433461"/>
+          </a:xfrm>
+          <a:prstGeom prst="rect">
+            <a:avLst/>
+          </a:prstGeom>
+        </p:spPr>
+        <p:style>
+          <a:lnRef idx="2">
+            <a:schemeClr val="accent6">
+              <a:shade val="50000"/>
+            </a:schemeClr>
+          </a:lnRef>
+          <a:fillRef idx="1">
+            <a:schemeClr val="accent6"/>
+          </a:fillRef>
+          <a:effectRef idx="0">
+            <a:schemeClr val="accent6"/>
+          </a:effectRef>
+          <a:fontRef idx="minor">
+            <a:schemeClr val="lt1"/>
+          </a:fontRef>
+        </p:style>
+        <p:txBody>
+          <a:bodyPr rtlCol="0" anchor="ctr"/>
+          <a:lstStyle/>
+          <a:p>
+            <a:pPr algn="ctr"/>
+            <a:r>
+              <a:rPr lang="nl-NL" sz="1200" dirty="0" smtClean="0"/>
+              <a:t>Job </a:t>
+            </a:r>
+            <a:r>
+              <a:rPr lang="nl-NL" sz="1200" dirty="0" err="1" smtClean="0"/>
+              <a:t>CreateCurrent</a:t>
+            </a:r>
+            <a:r>
+              <a:rPr lang="nl-NL" sz="1200" dirty="0" smtClean="0"/>
+              <a:t/>
+            </a:r>
+            <a:br>
+              <a:rPr lang="nl-NL" sz="1200" dirty="0" smtClean="0"/>
+            </a:br>
+            <a:r>
+              <a:rPr lang="nl-NL" sz="1200" dirty="0" err="1" smtClean="0"/>
+              <a:t>FlightDataPLSQL</a:t>
+            </a:r>
+            <a:endParaRPr lang="en-US" sz="1200" dirty="0"/>
+          </a:p>
+        </p:txBody>
+      </p:sp>
+      <p:sp>
+        <p:nvSpPr>
+          <p:cNvPr id="26" name="Freeform 25"/>
+          <p:cNvSpPr/>
+          <p:nvPr/>
+        </p:nvSpPr>
+        <p:spPr>
+          <a:xfrm>
+            <a:off x="59508" y="4200808"/>
+            <a:ext cx="6916220" cy="2510215"/>
+          </a:xfrm>
+          <a:custGeom>
+            <a:avLst/>
+            <a:gdLst>
+              <a:gd name="connsiteX0" fmla="*/ 6024421 w 6916220"/>
+              <a:gd name="connsiteY0" fmla="*/ 1946495 h 2510215"/>
+              <a:gd name="connsiteX1" fmla="*/ 6513308 w 6916220"/>
+              <a:gd name="connsiteY1" fmla="*/ 2281473 h 2510215"/>
+              <a:gd name="connsiteX2" fmla="*/ 891106 w 6916220"/>
+              <a:gd name="connsiteY2" fmla="*/ 2444436 h 2510215"/>
+              <a:gd name="connsiteX3" fmla="*/ 49134 w 6916220"/>
+              <a:gd name="connsiteY3" fmla="*/ 1149790 h 2510215"/>
+              <a:gd name="connsiteX4" fmla="*/ 1262298 w 6916220"/>
+              <a:gd name="connsiteY4" fmla="*/ 0 h 2510215"/>
+            </a:gdLst>
+            <a:ahLst/>
+            <a:cxnLst>
+              <a:cxn ang="0">
+                <a:pos x="connsiteX0" y="connsiteY0"/>
+              </a:cxn>
+              <a:cxn ang="0">
+                <a:pos x="connsiteX1" y="connsiteY1"/>
+              </a:cxn>
+              <a:cxn ang="0">
+                <a:pos x="connsiteX2" y="connsiteY2"/>
+              </a:cxn>
+              <a:cxn ang="0">
+                <a:pos x="connsiteX3" y="connsiteY3"/>
+              </a:cxn>
+              <a:cxn ang="0">
+                <a:pos x="connsiteX4" y="connsiteY4"/>
+              </a:cxn>
+            </a:cxnLst>
+            <a:rect l="l" t="t" r="r" b="b"/>
+            <a:pathLst>
+              <a:path w="6916220" h="2510215">
+                <a:moveTo>
+                  <a:pt x="6024421" y="1946495"/>
+                </a:moveTo>
+                <a:cubicBezTo>
+                  <a:pt x="6696640" y="2072489"/>
+                  <a:pt x="7368860" y="2198483"/>
+                  <a:pt x="6513308" y="2281473"/>
+                </a:cubicBezTo>
+                <a:cubicBezTo>
+                  <a:pt x="5657756" y="2364463"/>
+                  <a:pt x="1968468" y="2633050"/>
+                  <a:pt x="891106" y="2444436"/>
+                </a:cubicBezTo>
+                <a:cubicBezTo>
+                  <a:pt x="-186256" y="2255822"/>
+                  <a:pt x="-12731" y="1557196"/>
+                  <a:pt x="49134" y="1149790"/>
+                </a:cubicBezTo>
+                <a:cubicBezTo>
+                  <a:pt x="110999" y="742384"/>
+                  <a:pt x="686648" y="371192"/>
+                  <a:pt x="1262298" y="0"/>
+                </a:cubicBezTo>
+              </a:path>
+            </a:pathLst>
+          </a:custGeom>
+          <a:noFill/>
+          <a:ln>
+            <a:headEnd type="none" w="med" len="med"/>
+            <a:tailEnd type="arrow" w="med" len="med"/>
+          </a:ln>
+        </p:spPr>
+        <p:style>
+          <a:lnRef idx="2">
+            <a:schemeClr val="accent1">
+              <a:shade val="50000"/>
+            </a:schemeClr>
+          </a:lnRef>
+          <a:fillRef idx="1">
+            <a:schemeClr val="accent1"/>
+          </a:fillRef>
+          <a:effectRef idx="0">
+            <a:schemeClr val="accent1"/>
+          </a:effectRef>
+          <a:fontRef idx="minor">
+            <a:schemeClr val="lt1"/>
+          </a:fontRef>
+        </p:style>
+        <p:txBody>
+          <a:bodyPr rtlCol="0" anchor="ctr"/>
+          <a:lstStyle/>
+          <a:p>
+            <a:pPr algn="ctr"/>
+            <a:endParaRPr lang="en-US"/>
+          </a:p>
+        </p:txBody>
+      </p:sp>
+      <p:sp>
+        <p:nvSpPr>
+          <p:cNvPr id="29" name="Rectangle 28"/>
+          <p:cNvSpPr/>
+          <p:nvPr/>
+        </p:nvSpPr>
+        <p:spPr>
+          <a:xfrm>
+            <a:off x="3173780" y="6379915"/>
+            <a:ext cx="1694764" cy="433461"/>
+          </a:xfrm>
+          <a:prstGeom prst="rect">
+            <a:avLst/>
+          </a:prstGeom>
+        </p:spPr>
+        <p:style>
+          <a:lnRef idx="2">
+            <a:schemeClr val="accent6">
+              <a:shade val="50000"/>
+            </a:schemeClr>
+          </a:lnRef>
+          <a:fillRef idx="1">
+            <a:schemeClr val="accent6"/>
+          </a:fillRef>
+          <a:effectRef idx="0">
+            <a:schemeClr val="accent6"/>
+          </a:effectRef>
+          <a:fontRef idx="minor">
+            <a:schemeClr val="lt1"/>
+          </a:fontRef>
+        </p:style>
+        <p:txBody>
+          <a:bodyPr rtlCol="0" anchor="ctr"/>
+          <a:lstStyle/>
+          <a:p>
+            <a:pPr algn="ctr"/>
+            <a:r>
+              <a:rPr lang="nl-NL" sz="1200" dirty="0" err="1" smtClean="0"/>
+              <a:t>Request</a:t>
+            </a:r>
+            <a:r>
+              <a:rPr lang="nl-NL" sz="1200" dirty="0" smtClean="0"/>
+              <a:t> for Job </a:t>
+            </a:r>
+            <a:r>
+              <a:rPr lang="nl-NL" sz="1200" dirty="0" err="1" smtClean="0"/>
+              <a:t>Create</a:t>
+            </a:r>
+            <a:r>
+              <a:rPr lang="nl-NL" sz="1200" dirty="0" smtClean="0"/>
+              <a:t> </a:t>
+            </a:r>
+            <a:r>
+              <a:rPr lang="nl-NL" sz="1200" dirty="0" err="1" smtClean="0"/>
+              <a:t>CurrentFlightDataPLSQL</a:t>
+            </a:r>
+            <a:endParaRPr lang="en-US" sz="1200" dirty="0"/>
+          </a:p>
+        </p:txBody>
+      </p:sp>
+      <p:pic>
+        <p:nvPicPr>
+          <p:cNvPr id="1027" name="Picture 3"/>
+          <p:cNvPicPr>
+            <a:picLocks noChangeAspect="1" noChangeArrowheads="1"/>
+          </p:cNvPicPr>
+          <p:nvPr/>
+        </p:nvPicPr>
+        <p:blipFill>
+          <a:blip r:embed="rId5">
+            <a:extLst>
+              <a:ext uri="{28A0092B-C50C-407E-A947-70E740481C1C}">
+                <a14:useLocalDpi xmlns:a14="http://schemas.microsoft.com/office/drawing/2010/main" val="0"/>
+              </a:ext>
+            </a:extLst>
+          </a:blip>
+          <a:srcRect/>
+          <a:stretch>
+            <a:fillRect/>
+          </a:stretch>
+        </p:blipFill>
+        <p:spPr bwMode="auto">
+          <a:xfrm>
+            <a:off x="1525897" y="4435342"/>
+            <a:ext cx="1274578" cy="572524"/>
+          </a:xfrm>
+          <a:prstGeom prst="rect">
+            <a:avLst/>
+          </a:prstGeom>
+          <a:noFill/>
+          <a:ln>
+            <a:noFill/>
+          </a:ln>
+          <a:extLst>
+            <a:ext uri="{909E8E84-426E-40DD-AFC4-6F175D3DCCD1}">
+              <a14:hiddenFill xmlns:a14="http://schemas.microsoft.com/office/drawing/2010/main">
+                <a:solidFill>
+                  <a:schemeClr val="accent1"/>
+                </a:solidFill>
+              </a14:hiddenFill>
+            </a:ext>
+            <a:ext uri="{91240B29-F687-4F45-9708-019B960494DF}">
+              <a14:hiddenLine xmlns:a14="http://schemas.microsoft.com/office/drawing/2010/main" w="9525">
+                <a:solidFill>
+                  <a:schemeClr val="tx1"/>
+                </a:solidFill>
+                <a:miter lim="800000"/>
+                <a:headEnd/>
+                <a:tailEnd/>
+              </a14:hiddenLine>
+            </a:ext>
+          </a:extLst>
+        </p:spPr>
+      </p:pic>
+      <p:pic>
+        <p:nvPicPr>
+          <p:cNvPr id="1028" name="Picture 4"/>
+          <p:cNvPicPr>
+            <a:picLocks noChangeAspect="1" noChangeArrowheads="1"/>
+          </p:cNvPicPr>
+          <p:nvPr/>
+        </p:nvPicPr>
+        <p:blipFill>
+          <a:blip r:embed="rId6">
+            <a:extLst>
+              <a:ext uri="{28A0092B-C50C-407E-A947-70E740481C1C}">
+                <a14:useLocalDpi xmlns:a14="http://schemas.microsoft.com/office/drawing/2010/main" val="0"/>
+              </a:ext>
+            </a:extLst>
+          </a:blip>
+          <a:srcRect/>
+          <a:stretch>
+            <a:fillRect/>
+          </a:stretch>
+        </p:blipFill>
+        <p:spPr bwMode="auto">
+          <a:xfrm>
+            <a:off x="1767327" y="1124744"/>
+            <a:ext cx="1211263" cy="685800"/>
+          </a:xfrm>
+          <a:prstGeom prst="rect">
+            <a:avLst/>
+          </a:prstGeom>
+          <a:noFill/>
+          <a:ln>
+            <a:noFill/>
+          </a:ln>
+          <a:extLst>
+            <a:ext uri="{909E8E84-426E-40DD-AFC4-6F175D3DCCD1}">
+              <a14:hiddenFill xmlns:a14="http://schemas.microsoft.com/office/drawing/2010/main">
+                <a:solidFill>
+                  <a:schemeClr val="accent1"/>
+                </a:solidFill>
+              </a14:hiddenFill>
+            </a:ext>
+            <a:ext uri="{91240B29-F687-4F45-9708-019B960494DF}">
+              <a14:hiddenLine xmlns:a14="http://schemas.microsoft.com/office/drawing/2010/main" w="9525">
+                <a:solidFill>
+                  <a:schemeClr val="tx1"/>
+                </a:solidFill>
+                <a:miter lim="800000"/>
+                <a:headEnd/>
+                <a:tailEnd/>
+              </a14:hiddenLine>
+            </a:ext>
+          </a:extLst>
+        </p:spPr>
+      </p:pic>
+    </p:spTree>
+    <p:extLst>
+      <p:ext uri="{BB962C8B-B14F-4D97-AF65-F5344CB8AC3E}">
+        <p14:creationId xmlns:p14="http://schemas.microsoft.com/office/powerpoint/2010/main" val="3664728314"/>
+      </p:ext>
+    </p:extLst>
+  </p:cSld>
+  <p:clrMapOvr>
+    <a:masterClrMapping/>
+  </p:clrMapOvr>
+</p:sld>
+</file>
+
 <file path=ppt/theme/theme1.xml><?xml version="1.0" encoding="utf-8"?>
 <a:theme xmlns:a="http://schemas.openxmlformats.org/drawingml/2006/main" name="Office Theme">
   <a:themeElements>

</xml_diff>

<commit_message>
Add chapter 15 (draft)
</commit_message>
<xml_diff>
--- a/ChapterOverviews_picturesOfService.pptx
+++ b/ChapterOverviews_picturesOfService.pptx
@@ -23,6 +23,7 @@
     <p:sldId id="273" r:id="rId17"/>
     <p:sldId id="263" r:id="rId18"/>
     <p:sldId id="274" r:id="rId19"/>
+    <p:sldId id="275" r:id="rId20"/>
   </p:sldIdLst>
   <p:sldSz cx="9144000" cy="6858000" type="screen4x3"/>
   <p:notesSz cx="6858000" cy="9144000"/>
@@ -8197,10 +8198,1415 @@
           </a:p>
         </p:txBody>
       </p:sp>
+      <p:sp>
+        <p:nvSpPr>
+          <p:cNvPr id="3" name="Cube 2"/>
+          <p:cNvSpPr/>
+          <p:nvPr/>
+        </p:nvSpPr>
+        <p:spPr>
+          <a:xfrm>
+            <a:off x="539552" y="1988840"/>
+            <a:ext cx="1728192" cy="1008112"/>
+          </a:xfrm>
+          <a:prstGeom prst="cube">
+            <a:avLst/>
+          </a:prstGeom>
+        </p:spPr>
+        <p:style>
+          <a:lnRef idx="2">
+            <a:schemeClr val="accent1">
+              <a:shade val="50000"/>
+            </a:schemeClr>
+          </a:lnRef>
+          <a:fillRef idx="1">
+            <a:schemeClr val="accent1"/>
+          </a:fillRef>
+          <a:effectRef idx="0">
+            <a:schemeClr val="accent1"/>
+          </a:effectRef>
+          <a:fontRef idx="minor">
+            <a:schemeClr val="lt1"/>
+          </a:fontRef>
+        </p:style>
+        <p:txBody>
+          <a:bodyPr rtlCol="0" anchor="ctr"/>
+          <a:lstStyle/>
+          <a:p>
+            <a:pPr algn="ctr"/>
+            <a:r>
+              <a:rPr lang="nl-NL" dirty="0" err="1" smtClean="0"/>
+              <a:t>FlightStatus</a:t>
+            </a:r>
+            <a:r>
+              <a:rPr lang="nl-NL" dirty="0" smtClean="0"/>
+              <a:t/>
+            </a:r>
+            <a:br>
+              <a:rPr lang="nl-NL" dirty="0" smtClean="0"/>
+            </a:br>
+            <a:r>
+              <a:rPr lang="nl-NL" dirty="0" smtClean="0"/>
+              <a:t>Update event</a:t>
+            </a:r>
+            <a:endParaRPr lang="en-US" dirty="0"/>
+          </a:p>
+        </p:txBody>
+      </p:sp>
+      <p:sp>
+        <p:nvSpPr>
+          <p:cNvPr id="4" name="Lightning Bolt 3"/>
+          <p:cNvSpPr/>
+          <p:nvPr/>
+        </p:nvSpPr>
+        <p:spPr>
+          <a:xfrm>
+            <a:off x="1402330" y="1556792"/>
+            <a:ext cx="576064" cy="648072"/>
+          </a:xfrm>
+          <a:prstGeom prst="lightningBolt">
+            <a:avLst/>
+          </a:prstGeom>
+        </p:spPr>
+        <p:style>
+          <a:lnRef idx="2">
+            <a:schemeClr val="accent6">
+              <a:shade val="50000"/>
+            </a:schemeClr>
+          </a:lnRef>
+          <a:fillRef idx="1">
+            <a:schemeClr val="accent6"/>
+          </a:fillRef>
+          <a:effectRef idx="0">
+            <a:schemeClr val="accent6"/>
+          </a:effectRef>
+          <a:fontRef idx="minor">
+            <a:schemeClr val="lt1"/>
+          </a:fontRef>
+        </p:style>
+        <p:txBody>
+          <a:bodyPr rtlCol="0" anchor="ctr"/>
+          <a:lstStyle/>
+          <a:p>
+            <a:pPr algn="ctr"/>
+            <a:endParaRPr lang="en-US"/>
+          </a:p>
+        </p:txBody>
+      </p:sp>
+      <p:pic>
+        <p:nvPicPr>
+          <p:cNvPr id="5" name="Picture 7"/>
+          <p:cNvPicPr>
+            <a:picLocks noChangeAspect="1" noChangeArrowheads="1"/>
+          </p:cNvPicPr>
+          <p:nvPr/>
+        </p:nvPicPr>
+        <p:blipFill>
+          <a:blip r:embed="rId2">
+            <a:extLst>
+              <a:ext uri="{28A0092B-C50C-407E-A947-70E740481C1C}">
+                <a14:useLocalDpi xmlns:a14="http://schemas.microsoft.com/office/drawing/2010/main" val="0"/>
+              </a:ext>
+            </a:extLst>
+          </a:blip>
+          <a:srcRect/>
+          <a:stretch>
+            <a:fillRect/>
+          </a:stretch>
+        </p:blipFill>
+        <p:spPr bwMode="auto">
+          <a:xfrm>
+            <a:off x="4653171" y="3764530"/>
+            <a:ext cx="4345394" cy="1236009"/>
+          </a:xfrm>
+          <a:prstGeom prst="rect">
+            <a:avLst/>
+          </a:prstGeom>
+          <a:noFill/>
+          <a:ln>
+            <a:noFill/>
+          </a:ln>
+          <a:extLst>
+            <a:ext uri="{909E8E84-426E-40DD-AFC4-6F175D3DCCD1}">
+              <a14:hiddenFill xmlns:a14="http://schemas.microsoft.com/office/drawing/2010/main">
+                <a:solidFill>
+                  <a:schemeClr val="accent1"/>
+                </a:solidFill>
+              </a14:hiddenFill>
+            </a:ext>
+            <a:ext uri="{91240B29-F687-4F45-9708-019B960494DF}">
+              <a14:hiddenLine xmlns:a14="http://schemas.microsoft.com/office/drawing/2010/main" w="9525">
+                <a:solidFill>
+                  <a:schemeClr val="tx1"/>
+                </a:solidFill>
+                <a:miter lim="800000"/>
+                <a:headEnd/>
+                <a:tailEnd/>
+              </a14:hiddenLine>
+            </a:ext>
+          </a:extLst>
+        </p:spPr>
+      </p:pic>
+      <p:pic>
+        <p:nvPicPr>
+          <p:cNvPr id="6" name="Picture 5"/>
+          <p:cNvPicPr/>
+          <p:nvPr/>
+        </p:nvPicPr>
+        <p:blipFill>
+          <a:blip r:embed="rId3"/>
+          <a:stretch>
+            <a:fillRect/>
+          </a:stretch>
+        </p:blipFill>
+        <p:spPr>
+          <a:xfrm>
+            <a:off x="3923928" y="1279956"/>
+            <a:ext cx="5074637" cy="2425879"/>
+          </a:xfrm>
+          <a:prstGeom prst="rect">
+            <a:avLst/>
+          </a:prstGeom>
+        </p:spPr>
+      </p:pic>
+      <p:sp>
+        <p:nvSpPr>
+          <p:cNvPr id="10" name="Freeform 9"/>
+          <p:cNvSpPr/>
+          <p:nvPr/>
+        </p:nvSpPr>
+        <p:spPr>
+          <a:xfrm>
+            <a:off x="2263366" y="2308634"/>
+            <a:ext cx="2860895" cy="952481"/>
+          </a:xfrm>
+          <a:custGeom>
+            <a:avLst/>
+            <a:gdLst>
+              <a:gd name="connsiteX0" fmla="*/ 0 w 2860895"/>
+              <a:gd name="connsiteY0" fmla="*/ 0 h 952481"/>
+              <a:gd name="connsiteX1" fmla="*/ 1140737 w 2860895"/>
+              <a:gd name="connsiteY1" fmla="*/ 769544 h 952481"/>
+              <a:gd name="connsiteX2" fmla="*/ 2000816 w 2860895"/>
+              <a:gd name="connsiteY2" fmla="*/ 932507 h 952481"/>
+              <a:gd name="connsiteX3" fmla="*/ 2263367 w 2860895"/>
+              <a:gd name="connsiteY3" fmla="*/ 434566 h 952481"/>
+              <a:gd name="connsiteX4" fmla="*/ 2860895 w 2860895"/>
+              <a:gd name="connsiteY4" fmla="*/ 262550 h 952481"/>
+            </a:gdLst>
+            <a:ahLst/>
+            <a:cxnLst>
+              <a:cxn ang="0">
+                <a:pos x="connsiteX0" y="connsiteY0"/>
+              </a:cxn>
+              <a:cxn ang="0">
+                <a:pos x="connsiteX1" y="connsiteY1"/>
+              </a:cxn>
+              <a:cxn ang="0">
+                <a:pos x="connsiteX2" y="connsiteY2"/>
+              </a:cxn>
+              <a:cxn ang="0">
+                <a:pos x="connsiteX3" y="connsiteY3"/>
+              </a:cxn>
+              <a:cxn ang="0">
+                <a:pos x="connsiteX4" y="connsiteY4"/>
+              </a:cxn>
+            </a:cxnLst>
+            <a:rect l="l" t="t" r="r" b="b"/>
+            <a:pathLst>
+              <a:path w="2860895" h="952481">
+                <a:moveTo>
+                  <a:pt x="0" y="0"/>
+                </a:moveTo>
+                <a:cubicBezTo>
+                  <a:pt x="403634" y="307063"/>
+                  <a:pt x="807268" y="614126"/>
+                  <a:pt x="1140737" y="769544"/>
+                </a:cubicBezTo>
+                <a:cubicBezTo>
+                  <a:pt x="1474206" y="924962"/>
+                  <a:pt x="1813711" y="988337"/>
+                  <a:pt x="2000816" y="932507"/>
+                </a:cubicBezTo>
+                <a:cubicBezTo>
+                  <a:pt x="2187921" y="876677"/>
+                  <a:pt x="2120021" y="546225"/>
+                  <a:pt x="2263367" y="434566"/>
+                </a:cubicBezTo>
+                <a:cubicBezTo>
+                  <a:pt x="2406713" y="322907"/>
+                  <a:pt x="2633804" y="292728"/>
+                  <a:pt x="2860895" y="262550"/>
+                </a:cubicBezTo>
+              </a:path>
+            </a:pathLst>
+          </a:custGeom>
+          <a:noFill/>
+          <a:ln>
+            <a:prstDash val="sysDash"/>
+            <a:headEnd type="none" w="med" len="med"/>
+            <a:tailEnd type="arrow" w="med" len="med"/>
+          </a:ln>
+        </p:spPr>
+        <p:style>
+          <a:lnRef idx="2">
+            <a:schemeClr val="accent1">
+              <a:shade val="50000"/>
+            </a:schemeClr>
+          </a:lnRef>
+          <a:fillRef idx="1">
+            <a:schemeClr val="accent1"/>
+          </a:fillRef>
+          <a:effectRef idx="0">
+            <a:schemeClr val="accent1"/>
+          </a:effectRef>
+          <a:fontRef idx="minor">
+            <a:schemeClr val="lt1"/>
+          </a:fontRef>
+        </p:style>
+        <p:txBody>
+          <a:bodyPr rtlCol="0" anchor="ctr"/>
+          <a:lstStyle/>
+          <a:p>
+            <a:pPr algn="ctr"/>
+            <a:endParaRPr lang="en-US"/>
+          </a:p>
+        </p:txBody>
+      </p:sp>
+      <p:sp>
+        <p:nvSpPr>
+          <p:cNvPr id="11" name="Rounded Rectangle 10"/>
+          <p:cNvSpPr/>
+          <p:nvPr/>
+        </p:nvSpPr>
+        <p:spPr>
+          <a:xfrm>
+            <a:off x="827584" y="4077072"/>
+            <a:ext cx="3537555" cy="1067483"/>
+          </a:xfrm>
+          <a:prstGeom prst="roundRect">
+            <a:avLst/>
+          </a:prstGeom>
+        </p:spPr>
+        <p:style>
+          <a:lnRef idx="2">
+            <a:schemeClr val="accent1">
+              <a:shade val="50000"/>
+            </a:schemeClr>
+          </a:lnRef>
+          <a:fillRef idx="1">
+            <a:schemeClr val="accent1"/>
+          </a:fillRef>
+          <a:effectRef idx="0">
+            <a:schemeClr val="accent1"/>
+          </a:effectRef>
+          <a:fontRef idx="minor">
+            <a:schemeClr val="lt1"/>
+          </a:fontRef>
+        </p:style>
+        <p:txBody>
+          <a:bodyPr rtlCol="0" anchor="ctr"/>
+          <a:lstStyle/>
+          <a:p>
+            <a:pPr algn="ctr"/>
+            <a:r>
+              <a:rPr lang="nl-NL" dirty="0" smtClean="0"/>
+              <a:t>SB: </a:t>
+            </a:r>
+          </a:p>
+          <a:p>
+            <a:pPr algn="ctr"/>
+            <a:r>
+              <a:rPr lang="nl-NL" dirty="0" err="1" smtClean="0"/>
+              <a:t>read</a:t>
+            </a:r>
+            <a:r>
+              <a:rPr lang="nl-NL" dirty="0" smtClean="0"/>
+              <a:t> </a:t>
+            </a:r>
+            <a:r>
+              <a:rPr lang="nl-NL" dirty="0" err="1" smtClean="0"/>
+              <a:t>from</a:t>
+            </a:r>
+            <a:r>
+              <a:rPr lang="nl-NL" dirty="0" smtClean="0"/>
+              <a:t> JMS</a:t>
+            </a:r>
+          </a:p>
+          <a:p>
+            <a:pPr algn="ctr"/>
+            <a:r>
+              <a:rPr lang="nl-NL" dirty="0" err="1" smtClean="0"/>
+              <a:t>Use</a:t>
+            </a:r>
+            <a:r>
+              <a:rPr lang="nl-NL" dirty="0" smtClean="0"/>
+              <a:t> </a:t>
+            </a:r>
+            <a:r>
+              <a:rPr lang="nl-NL" dirty="0" err="1" smtClean="0"/>
+              <a:t>intermediary</a:t>
+            </a:r>
+            <a:r>
+              <a:rPr lang="nl-NL" dirty="0" smtClean="0"/>
+              <a:t> SOA </a:t>
+            </a:r>
+            <a:r>
+              <a:rPr lang="nl-NL" dirty="0" err="1" smtClean="0"/>
+              <a:t>composite</a:t>
+            </a:r>
+            <a:endParaRPr lang="en-US" dirty="0"/>
+          </a:p>
+        </p:txBody>
+      </p:sp>
+      <p:sp>
+        <p:nvSpPr>
+          <p:cNvPr id="12" name="Freeform 11"/>
+          <p:cNvSpPr/>
+          <p:nvPr/>
+        </p:nvSpPr>
+        <p:spPr>
+          <a:xfrm>
+            <a:off x="1231271" y="2996697"/>
+            <a:ext cx="3657600" cy="2618154"/>
+          </a:xfrm>
+          <a:custGeom>
+            <a:avLst/>
+            <a:gdLst>
+              <a:gd name="connsiteX0" fmla="*/ 0 w 3657600"/>
+              <a:gd name="connsiteY0" fmla="*/ 0 h 2618154"/>
+              <a:gd name="connsiteX1" fmla="*/ 923454 w 3657600"/>
+              <a:gd name="connsiteY1" fmla="*/ 416459 h 2618154"/>
+              <a:gd name="connsiteX2" fmla="*/ 1167897 w 3657600"/>
+              <a:gd name="connsiteY2" fmla="*/ 1077362 h 2618154"/>
+              <a:gd name="connsiteX3" fmla="*/ 1231272 w 3657600"/>
+              <a:gd name="connsiteY3" fmla="*/ 2562131 h 2618154"/>
+              <a:gd name="connsiteX4" fmla="*/ 3304515 w 3657600"/>
+              <a:gd name="connsiteY4" fmla="*/ 2227153 h 2618154"/>
+              <a:gd name="connsiteX5" fmla="*/ 3358836 w 3657600"/>
+              <a:gd name="connsiteY5" fmla="*/ 1484768 h 2618154"/>
+              <a:gd name="connsiteX6" fmla="*/ 3657600 w 3657600"/>
+              <a:gd name="connsiteY6" fmla="*/ 1502875 h 2618154"/>
+            </a:gdLst>
+            <a:ahLst/>
+            <a:cxnLst>
+              <a:cxn ang="0">
+                <a:pos x="connsiteX0" y="connsiteY0"/>
+              </a:cxn>
+              <a:cxn ang="0">
+                <a:pos x="connsiteX1" y="connsiteY1"/>
+              </a:cxn>
+              <a:cxn ang="0">
+                <a:pos x="connsiteX2" y="connsiteY2"/>
+              </a:cxn>
+              <a:cxn ang="0">
+                <a:pos x="connsiteX3" y="connsiteY3"/>
+              </a:cxn>
+              <a:cxn ang="0">
+                <a:pos x="connsiteX4" y="connsiteY4"/>
+              </a:cxn>
+              <a:cxn ang="0">
+                <a:pos x="connsiteX5" y="connsiteY5"/>
+              </a:cxn>
+              <a:cxn ang="0">
+                <a:pos x="connsiteX6" y="connsiteY6"/>
+              </a:cxn>
+            </a:cxnLst>
+            <a:rect l="l" t="t" r="r" b="b"/>
+            <a:pathLst>
+              <a:path w="3657600" h="2618154">
+                <a:moveTo>
+                  <a:pt x="0" y="0"/>
+                </a:moveTo>
+                <a:cubicBezTo>
+                  <a:pt x="364402" y="118449"/>
+                  <a:pt x="728805" y="236899"/>
+                  <a:pt x="923454" y="416459"/>
+                </a:cubicBezTo>
+                <a:cubicBezTo>
+                  <a:pt x="1118103" y="596019"/>
+                  <a:pt x="1116594" y="719750"/>
+                  <a:pt x="1167897" y="1077362"/>
+                </a:cubicBezTo>
+                <a:cubicBezTo>
+                  <a:pt x="1219200" y="1434974"/>
+                  <a:pt x="875169" y="2370499"/>
+                  <a:pt x="1231272" y="2562131"/>
+                </a:cubicBezTo>
+                <a:cubicBezTo>
+                  <a:pt x="1587375" y="2753763"/>
+                  <a:pt x="2949921" y="2406713"/>
+                  <a:pt x="3304515" y="2227153"/>
+                </a:cubicBezTo>
+                <a:cubicBezTo>
+                  <a:pt x="3659109" y="2047593"/>
+                  <a:pt x="3299989" y="1605481"/>
+                  <a:pt x="3358836" y="1484768"/>
+                </a:cubicBezTo>
+                <a:cubicBezTo>
+                  <a:pt x="3417683" y="1364055"/>
+                  <a:pt x="3537641" y="1433465"/>
+                  <a:pt x="3657600" y="1502875"/>
+                </a:cubicBezTo>
+              </a:path>
+            </a:pathLst>
+          </a:custGeom>
+          <a:noFill/>
+          <a:ln>
+            <a:prstDash val="sysDash"/>
+          </a:ln>
+        </p:spPr>
+        <p:style>
+          <a:lnRef idx="2">
+            <a:schemeClr val="accent1">
+              <a:shade val="50000"/>
+            </a:schemeClr>
+          </a:lnRef>
+          <a:fillRef idx="1">
+            <a:schemeClr val="accent1"/>
+          </a:fillRef>
+          <a:effectRef idx="0">
+            <a:schemeClr val="accent1"/>
+          </a:effectRef>
+          <a:fontRef idx="minor">
+            <a:schemeClr val="lt1"/>
+          </a:fontRef>
+        </p:style>
+        <p:txBody>
+          <a:bodyPr rtlCol="0" anchor="ctr"/>
+          <a:lstStyle/>
+          <a:p>
+            <a:pPr algn="ctr"/>
+            <a:endParaRPr lang="en-US"/>
+          </a:p>
+        </p:txBody>
+      </p:sp>
+      <p:cxnSp>
+        <p:nvCxnSpPr>
+          <p:cNvPr id="14" name="Straight Arrow Connector 13"/>
+          <p:cNvCxnSpPr/>
+          <p:nvPr/>
+        </p:nvCxnSpPr>
+        <p:spPr>
+          <a:xfrm>
+            <a:off x="899592" y="1124744"/>
+            <a:ext cx="144016" cy="864096"/>
+          </a:xfrm>
+          <a:prstGeom prst="straightConnector1">
+            <a:avLst/>
+          </a:prstGeom>
+          <a:ln>
+            <a:tailEnd type="arrow"/>
+          </a:ln>
+        </p:spPr>
+        <p:style>
+          <a:lnRef idx="1">
+            <a:schemeClr val="accent1"/>
+          </a:lnRef>
+          <a:fillRef idx="0">
+            <a:schemeClr val="accent1"/>
+          </a:fillRef>
+          <a:effectRef idx="0">
+            <a:schemeClr val="accent1"/>
+          </a:effectRef>
+          <a:fontRef idx="minor">
+            <a:schemeClr val="tx1"/>
+          </a:fontRef>
+        </p:style>
+      </p:cxnSp>
+      <p:sp>
+        <p:nvSpPr>
+          <p:cNvPr id="15" name="Rectangle 14"/>
+          <p:cNvSpPr/>
+          <p:nvPr/>
+        </p:nvSpPr>
+        <p:spPr>
+          <a:xfrm>
+            <a:off x="251520" y="332656"/>
+            <a:ext cx="2376264" cy="792088"/>
+          </a:xfrm>
+          <a:prstGeom prst="rect">
+            <a:avLst/>
+          </a:prstGeom>
+        </p:spPr>
+        <p:style>
+          <a:lnRef idx="1">
+            <a:schemeClr val="accent1"/>
+          </a:lnRef>
+          <a:fillRef idx="2">
+            <a:schemeClr val="accent1"/>
+          </a:fillRef>
+          <a:effectRef idx="1">
+            <a:schemeClr val="accent1"/>
+          </a:effectRef>
+          <a:fontRef idx="minor">
+            <a:schemeClr val="dk1"/>
+          </a:fontRef>
+        </p:style>
+        <p:txBody>
+          <a:bodyPr rtlCol="0" anchor="ctr"/>
+          <a:lstStyle/>
+          <a:p>
+            <a:pPr algn="ctr"/>
+            <a:r>
+              <a:rPr lang="nl-NL" dirty="0" err="1" smtClean="0"/>
+              <a:t>Publish</a:t>
+            </a:r>
+            <a:r>
+              <a:rPr lang="nl-NL" dirty="0" smtClean="0"/>
+              <a:t> </a:t>
+            </a:r>
+            <a:r>
+              <a:rPr lang="nl-NL" dirty="0" err="1" smtClean="0"/>
+              <a:t>from</a:t>
+            </a:r>
+            <a:r>
+              <a:rPr lang="nl-NL" dirty="0" smtClean="0"/>
+              <a:t>:</a:t>
+            </a:r>
+          </a:p>
+          <a:p>
+            <a:pPr algn="ctr"/>
+            <a:r>
+              <a:rPr lang="nl-NL" dirty="0" smtClean="0"/>
+              <a:t>Mediator, BPEL</a:t>
+            </a:r>
+          </a:p>
+          <a:p>
+            <a:pPr algn="ctr"/>
+            <a:r>
+              <a:rPr lang="nl-NL" dirty="0" smtClean="0"/>
+              <a:t>Java Client, ESS, DB?</a:t>
+            </a:r>
+            <a:endParaRPr lang="en-US" dirty="0"/>
+          </a:p>
+        </p:txBody>
+      </p:sp>
     </p:spTree>
     <p:extLst>
       <p:ext uri="{BB962C8B-B14F-4D97-AF65-F5344CB8AC3E}">
         <p14:creationId xmlns:p14="http://schemas.microsoft.com/office/powerpoint/2010/main" val="3259033547"/>
+      </p:ext>
+    </p:extLst>
+  </p:cSld>
+  <p:clrMapOvr>
+    <a:masterClrMapping/>
+  </p:clrMapOvr>
+</p:sld>
+</file>
+
+<file path=ppt/slides/slide19.xml><?xml version="1.0" encoding="utf-8"?>
+<p:sld xmlns:a="http://schemas.openxmlformats.org/drawingml/2006/main" xmlns:r="http://schemas.openxmlformats.org/officeDocument/2006/relationships" xmlns:p="http://schemas.openxmlformats.org/presentationml/2006/main">
+  <p:cSld>
+    <p:spTree>
+      <p:nvGrpSpPr>
+        <p:cNvPr id="1" name=""/>
+        <p:cNvGrpSpPr/>
+        <p:nvPr/>
+      </p:nvGrpSpPr>
+      <p:grpSpPr>
+        <a:xfrm>
+          <a:off x="0" y="0"/>
+          <a:ext cx="0" cy="0"/>
+          <a:chOff x="0" y="0"/>
+          <a:chExt cx="0" cy="0"/>
+        </a:xfrm>
+      </p:grpSpPr>
+      <p:sp>
+        <p:nvSpPr>
+          <p:cNvPr id="2" name="Title 1"/>
+          <p:cNvSpPr>
+            <a:spLocks noGrp="1"/>
+          </p:cNvSpPr>
+          <p:nvPr>
+            <p:ph type="title"/>
+          </p:nvPr>
+        </p:nvSpPr>
+        <p:spPr/>
+        <p:txBody>
+          <a:bodyPr/>
+          <a:lstStyle/>
+          <a:p>
+            <a:r>
+              <a:rPr lang="nl-NL" dirty="0" err="1" smtClean="0"/>
+              <a:t>Chapter</a:t>
+            </a:r>
+            <a:r>
+              <a:rPr lang="nl-NL" dirty="0" smtClean="0"/>
+              <a:t> 15</a:t>
+            </a:r>
+            <a:endParaRPr lang="en-US" dirty="0"/>
+          </a:p>
+        </p:txBody>
+      </p:sp>
+      <p:sp>
+        <p:nvSpPr>
+          <p:cNvPr id="3" name="Cube 2"/>
+          <p:cNvSpPr/>
+          <p:nvPr/>
+        </p:nvSpPr>
+        <p:spPr>
+          <a:xfrm>
+            <a:off x="2741031" y="5517232"/>
+            <a:ext cx="1728192" cy="1008112"/>
+          </a:xfrm>
+          <a:prstGeom prst="cube">
+            <a:avLst/>
+          </a:prstGeom>
+        </p:spPr>
+        <p:style>
+          <a:lnRef idx="2">
+            <a:schemeClr val="accent1">
+              <a:shade val="50000"/>
+            </a:schemeClr>
+          </a:lnRef>
+          <a:fillRef idx="1">
+            <a:schemeClr val="accent1"/>
+          </a:fillRef>
+          <a:effectRef idx="0">
+            <a:schemeClr val="accent1"/>
+          </a:effectRef>
+          <a:fontRef idx="minor">
+            <a:schemeClr val="lt1"/>
+          </a:fontRef>
+        </p:style>
+        <p:txBody>
+          <a:bodyPr rtlCol="0" anchor="ctr"/>
+          <a:lstStyle/>
+          <a:p>
+            <a:pPr algn="ctr"/>
+            <a:r>
+              <a:rPr lang="nl-NL" dirty="0" err="1" smtClean="0"/>
+              <a:t>FlightStatus</a:t>
+            </a:r>
+            <a:r>
+              <a:rPr lang="nl-NL" dirty="0" smtClean="0"/>
+              <a:t/>
+            </a:r>
+            <a:br>
+              <a:rPr lang="nl-NL" dirty="0" smtClean="0"/>
+            </a:br>
+            <a:r>
+              <a:rPr lang="nl-NL" dirty="0" smtClean="0"/>
+              <a:t>Update event</a:t>
+            </a:r>
+            <a:endParaRPr lang="en-US" dirty="0"/>
+          </a:p>
+        </p:txBody>
+      </p:sp>
+      <p:sp>
+        <p:nvSpPr>
+          <p:cNvPr id="4" name="Lightning Bolt 3"/>
+          <p:cNvSpPr/>
+          <p:nvPr/>
+        </p:nvSpPr>
+        <p:spPr>
+          <a:xfrm>
+            <a:off x="3603809" y="5085184"/>
+            <a:ext cx="576064" cy="648072"/>
+          </a:xfrm>
+          <a:prstGeom prst="lightningBolt">
+            <a:avLst/>
+          </a:prstGeom>
+        </p:spPr>
+        <p:style>
+          <a:lnRef idx="2">
+            <a:schemeClr val="accent6">
+              <a:shade val="50000"/>
+            </a:schemeClr>
+          </a:lnRef>
+          <a:fillRef idx="1">
+            <a:schemeClr val="accent6"/>
+          </a:fillRef>
+          <a:effectRef idx="0">
+            <a:schemeClr val="accent6"/>
+          </a:effectRef>
+          <a:fontRef idx="minor">
+            <a:schemeClr val="lt1"/>
+          </a:fontRef>
+        </p:style>
+        <p:txBody>
+          <a:bodyPr rtlCol="0" anchor="ctr"/>
+          <a:lstStyle/>
+          <a:p>
+            <a:pPr algn="ctr"/>
+            <a:endParaRPr lang="en-US"/>
+          </a:p>
+        </p:txBody>
+      </p:sp>
+      <p:pic>
+        <p:nvPicPr>
+          <p:cNvPr id="5" name="Picture 7"/>
+          <p:cNvPicPr>
+            <a:picLocks noChangeAspect="1" noChangeArrowheads="1"/>
+          </p:cNvPicPr>
+          <p:nvPr/>
+        </p:nvPicPr>
+        <p:blipFill>
+          <a:blip r:embed="rId2" cstate="print">
+            <a:extLst>
+              <a:ext uri="{28A0092B-C50C-407E-A947-70E740481C1C}">
+                <a14:useLocalDpi xmlns:a14="http://schemas.microsoft.com/office/drawing/2010/main" val="0"/>
+              </a:ext>
+            </a:extLst>
+          </a:blip>
+          <a:srcRect/>
+          <a:stretch>
+            <a:fillRect/>
+          </a:stretch>
+        </p:blipFill>
+        <p:spPr bwMode="auto">
+          <a:xfrm>
+            <a:off x="5436096" y="5790017"/>
+            <a:ext cx="3528392" cy="1003620"/>
+          </a:xfrm>
+          <a:prstGeom prst="rect">
+            <a:avLst/>
+          </a:prstGeom>
+          <a:noFill/>
+          <a:ln>
+            <a:noFill/>
+          </a:ln>
+          <a:extLst>
+            <a:ext uri="{909E8E84-426E-40DD-AFC4-6F175D3DCCD1}">
+              <a14:hiddenFill xmlns:a14="http://schemas.microsoft.com/office/drawing/2010/main">
+                <a:solidFill>
+                  <a:schemeClr val="accent1"/>
+                </a:solidFill>
+              </a14:hiddenFill>
+            </a:ext>
+            <a:ext uri="{91240B29-F687-4F45-9708-019B960494DF}">
+              <a14:hiddenLine xmlns:a14="http://schemas.microsoft.com/office/drawing/2010/main" w="9525">
+                <a:solidFill>
+                  <a:schemeClr val="tx1"/>
+                </a:solidFill>
+                <a:miter lim="800000"/>
+                <a:headEnd/>
+                <a:tailEnd/>
+              </a14:hiddenLine>
+            </a:ext>
+          </a:extLst>
+        </p:spPr>
+      </p:pic>
+      <p:pic>
+        <p:nvPicPr>
+          <p:cNvPr id="6" name="Picture 5"/>
+          <p:cNvPicPr/>
+          <p:nvPr/>
+        </p:nvPicPr>
+        <p:blipFill>
+          <a:blip r:embed="rId3"/>
+          <a:stretch>
+            <a:fillRect/>
+          </a:stretch>
+        </p:blipFill>
+        <p:spPr>
+          <a:xfrm>
+            <a:off x="5618043" y="3861048"/>
+            <a:ext cx="3346445" cy="1538696"/>
+          </a:xfrm>
+          <a:prstGeom prst="rect">
+            <a:avLst/>
+          </a:prstGeom>
+        </p:spPr>
+      </p:pic>
+      <p:sp>
+        <p:nvSpPr>
+          <p:cNvPr id="7" name="Cube 6"/>
+          <p:cNvSpPr/>
+          <p:nvPr/>
+        </p:nvSpPr>
+        <p:spPr>
+          <a:xfrm>
+            <a:off x="464908" y="1453920"/>
+            <a:ext cx="1728192" cy="1008112"/>
+          </a:xfrm>
+          <a:prstGeom prst="cube">
+            <a:avLst/>
+          </a:prstGeom>
+        </p:spPr>
+        <p:style>
+          <a:lnRef idx="2">
+            <a:schemeClr val="accent1">
+              <a:shade val="50000"/>
+            </a:schemeClr>
+          </a:lnRef>
+          <a:fillRef idx="1">
+            <a:schemeClr val="accent1"/>
+          </a:fillRef>
+          <a:effectRef idx="0">
+            <a:schemeClr val="accent1"/>
+          </a:effectRef>
+          <a:fontRef idx="minor">
+            <a:schemeClr val="lt1"/>
+          </a:fontRef>
+        </p:style>
+        <p:txBody>
+          <a:bodyPr rtlCol="0" anchor="ctr"/>
+          <a:lstStyle/>
+          <a:p>
+            <a:pPr algn="ctr"/>
+            <a:r>
+              <a:rPr lang="nl-NL" dirty="0" smtClean="0"/>
+              <a:t>Air Carrier </a:t>
+            </a:r>
+            <a:r>
+              <a:rPr lang="nl-NL" dirty="0" err="1" smtClean="0"/>
+              <a:t>Suspended</a:t>
+            </a:r>
+            <a:r>
+              <a:rPr lang="nl-NL" dirty="0" smtClean="0"/>
+              <a:t> event</a:t>
+            </a:r>
+            <a:endParaRPr lang="en-US" dirty="0"/>
+          </a:p>
+        </p:txBody>
+      </p:sp>
+      <p:sp>
+        <p:nvSpPr>
+          <p:cNvPr id="8" name="Lightning Bolt 7"/>
+          <p:cNvSpPr/>
+          <p:nvPr/>
+        </p:nvSpPr>
+        <p:spPr>
+          <a:xfrm>
+            <a:off x="1327686" y="1021872"/>
+            <a:ext cx="576064" cy="648072"/>
+          </a:xfrm>
+          <a:prstGeom prst="lightningBolt">
+            <a:avLst/>
+          </a:prstGeom>
+        </p:spPr>
+        <p:style>
+          <a:lnRef idx="2">
+            <a:schemeClr val="accent6">
+              <a:shade val="50000"/>
+            </a:schemeClr>
+          </a:lnRef>
+          <a:fillRef idx="1">
+            <a:schemeClr val="accent6"/>
+          </a:fillRef>
+          <a:effectRef idx="0">
+            <a:schemeClr val="accent6"/>
+          </a:effectRef>
+          <a:fontRef idx="minor">
+            <a:schemeClr val="lt1"/>
+          </a:fontRef>
+        </p:style>
+        <p:txBody>
+          <a:bodyPr rtlCol="0" anchor="ctr"/>
+          <a:lstStyle/>
+          <a:p>
+            <a:pPr algn="ctr"/>
+            <a:endParaRPr lang="en-US"/>
+          </a:p>
+        </p:txBody>
+      </p:sp>
+      <p:pic>
+        <p:nvPicPr>
+          <p:cNvPr id="9" name="Picture 2"/>
+          <p:cNvPicPr>
+            <a:picLocks noChangeAspect="1" noChangeArrowheads="1"/>
+          </p:cNvPicPr>
+          <p:nvPr/>
+        </p:nvPicPr>
+        <p:blipFill>
+          <a:blip r:embed="rId4">
+            <a:extLst>
+              <a:ext uri="{28A0092B-C50C-407E-A947-70E740481C1C}">
+                <a14:useLocalDpi xmlns:a14="http://schemas.microsoft.com/office/drawing/2010/main" val="0"/>
+              </a:ext>
+            </a:extLst>
+          </a:blip>
+          <a:srcRect/>
+          <a:stretch>
+            <a:fillRect/>
+          </a:stretch>
+        </p:blipFill>
+        <p:spPr bwMode="auto">
+          <a:xfrm>
+            <a:off x="2909834" y="1627714"/>
+            <a:ext cx="6054654" cy="1850207"/>
+          </a:xfrm>
+          <a:prstGeom prst="rect">
+            <a:avLst/>
+          </a:prstGeom>
+          <a:noFill/>
+          <a:ln>
+            <a:noFill/>
+          </a:ln>
+          <a:extLst>
+            <a:ext uri="{909E8E84-426E-40DD-AFC4-6F175D3DCCD1}">
+              <a14:hiddenFill xmlns:a14="http://schemas.microsoft.com/office/drawing/2010/main">
+                <a:solidFill>
+                  <a:schemeClr val="accent1"/>
+                </a:solidFill>
+              </a14:hiddenFill>
+            </a:ext>
+            <a:ext uri="{91240B29-F687-4F45-9708-019B960494DF}">
+              <a14:hiddenLine xmlns:a14="http://schemas.microsoft.com/office/drawing/2010/main" w="9525">
+                <a:solidFill>
+                  <a:schemeClr val="tx1"/>
+                </a:solidFill>
+                <a:miter lim="800000"/>
+                <a:headEnd/>
+                <a:tailEnd/>
+              </a14:hiddenLine>
+            </a:ext>
+          </a:extLst>
+        </p:spPr>
+      </p:pic>
+      <p:sp>
+        <p:nvSpPr>
+          <p:cNvPr id="11" name="Freeform 10"/>
+          <p:cNvSpPr/>
+          <p:nvPr/>
+        </p:nvSpPr>
+        <p:spPr>
+          <a:xfrm>
+            <a:off x="2230016" y="2006082"/>
+            <a:ext cx="3303037" cy="813628"/>
+          </a:xfrm>
+          <a:custGeom>
+            <a:avLst/>
+            <a:gdLst>
+              <a:gd name="connsiteX0" fmla="*/ 0 w 3303037"/>
+              <a:gd name="connsiteY0" fmla="*/ 0 h 813628"/>
+              <a:gd name="connsiteX1" fmla="*/ 1306286 w 3303037"/>
+              <a:gd name="connsiteY1" fmla="*/ 177281 h 813628"/>
+              <a:gd name="connsiteX2" fmla="*/ 2575249 w 3303037"/>
+              <a:gd name="connsiteY2" fmla="*/ 139959 h 813628"/>
+              <a:gd name="connsiteX3" fmla="*/ 2911151 w 3303037"/>
+              <a:gd name="connsiteY3" fmla="*/ 709126 h 813628"/>
+              <a:gd name="connsiteX4" fmla="*/ 3303037 w 3303037"/>
+              <a:gd name="connsiteY4" fmla="*/ 811763 h 813628"/>
+            </a:gdLst>
+            <a:ahLst/>
+            <a:cxnLst>
+              <a:cxn ang="0">
+                <a:pos x="connsiteX0" y="connsiteY0"/>
+              </a:cxn>
+              <a:cxn ang="0">
+                <a:pos x="connsiteX1" y="connsiteY1"/>
+              </a:cxn>
+              <a:cxn ang="0">
+                <a:pos x="connsiteX2" y="connsiteY2"/>
+              </a:cxn>
+              <a:cxn ang="0">
+                <a:pos x="connsiteX3" y="connsiteY3"/>
+              </a:cxn>
+              <a:cxn ang="0">
+                <a:pos x="connsiteX4" y="connsiteY4"/>
+              </a:cxn>
+            </a:cxnLst>
+            <a:rect l="l" t="t" r="r" b="b"/>
+            <a:pathLst>
+              <a:path w="3303037" h="813628">
+                <a:moveTo>
+                  <a:pt x="0" y="0"/>
+                </a:moveTo>
+                <a:cubicBezTo>
+                  <a:pt x="438539" y="76977"/>
+                  <a:pt x="877078" y="153955"/>
+                  <a:pt x="1306286" y="177281"/>
+                </a:cubicBezTo>
+                <a:cubicBezTo>
+                  <a:pt x="1735494" y="200607"/>
+                  <a:pt x="2307772" y="51318"/>
+                  <a:pt x="2575249" y="139959"/>
+                </a:cubicBezTo>
+                <a:cubicBezTo>
+                  <a:pt x="2842727" y="228600"/>
+                  <a:pt x="2789853" y="597159"/>
+                  <a:pt x="2911151" y="709126"/>
+                </a:cubicBezTo>
+                <a:cubicBezTo>
+                  <a:pt x="3032449" y="821093"/>
+                  <a:pt x="3167743" y="816428"/>
+                  <a:pt x="3303037" y="811763"/>
+                </a:cubicBezTo>
+              </a:path>
+            </a:pathLst>
+          </a:custGeom>
+          <a:noFill/>
+          <a:ln>
+            <a:prstDash val="sysDash"/>
+            <a:headEnd type="none" w="med" len="med"/>
+            <a:tailEnd type="arrow" w="med" len="med"/>
+          </a:ln>
+        </p:spPr>
+        <p:style>
+          <a:lnRef idx="2">
+            <a:schemeClr val="accent1">
+              <a:shade val="50000"/>
+            </a:schemeClr>
+          </a:lnRef>
+          <a:fillRef idx="1">
+            <a:schemeClr val="accent1"/>
+          </a:fillRef>
+          <a:effectRef idx="0">
+            <a:schemeClr val="accent1"/>
+          </a:effectRef>
+          <a:fontRef idx="minor">
+            <a:schemeClr val="lt1"/>
+          </a:fontRef>
+        </p:style>
+        <p:txBody>
+          <a:bodyPr rtlCol="0" anchor="ctr"/>
+          <a:lstStyle/>
+          <a:p>
+            <a:pPr algn="ctr"/>
+            <a:endParaRPr lang="en-US"/>
+          </a:p>
+        </p:txBody>
+      </p:sp>
+      <p:sp>
+        <p:nvSpPr>
+          <p:cNvPr id="12" name="Rounded Rectangle 11"/>
+          <p:cNvSpPr/>
+          <p:nvPr/>
+        </p:nvSpPr>
+        <p:spPr>
+          <a:xfrm>
+            <a:off x="1547664" y="3745911"/>
+            <a:ext cx="2053952" cy="887183"/>
+          </a:xfrm>
+          <a:prstGeom prst="roundRect">
+            <a:avLst/>
+          </a:prstGeom>
+        </p:spPr>
+        <p:style>
+          <a:lnRef idx="2">
+            <a:schemeClr val="accent1">
+              <a:shade val="50000"/>
+            </a:schemeClr>
+          </a:lnRef>
+          <a:fillRef idx="1">
+            <a:schemeClr val="accent1"/>
+          </a:fillRef>
+          <a:effectRef idx="0">
+            <a:schemeClr val="accent1"/>
+          </a:effectRef>
+          <a:fontRef idx="minor">
+            <a:schemeClr val="lt1"/>
+          </a:fontRef>
+        </p:style>
+        <p:txBody>
+          <a:bodyPr rtlCol="0" anchor="ctr"/>
+          <a:lstStyle/>
+          <a:p>
+            <a:pPr algn="ctr"/>
+            <a:r>
+              <a:rPr lang="nl-NL" dirty="0" err="1" smtClean="0"/>
+              <a:t>FlightCanceller</a:t>
+            </a:r>
+            <a:endParaRPr lang="en-US" dirty="0"/>
+          </a:p>
+        </p:txBody>
+      </p:sp>
+      <p:cxnSp>
+        <p:nvCxnSpPr>
+          <p:cNvPr id="14" name="Straight Arrow Connector 13"/>
+          <p:cNvCxnSpPr/>
+          <p:nvPr/>
+        </p:nvCxnSpPr>
+        <p:spPr>
+          <a:xfrm>
+            <a:off x="3010642" y="4633094"/>
+            <a:ext cx="360040" cy="884138"/>
+          </a:xfrm>
+          <a:prstGeom prst="straightConnector1">
+            <a:avLst/>
+          </a:prstGeom>
+          <a:ln>
+            <a:tailEnd type="arrow"/>
+          </a:ln>
+        </p:spPr>
+        <p:style>
+          <a:lnRef idx="1">
+            <a:schemeClr val="accent1"/>
+          </a:lnRef>
+          <a:fillRef idx="0">
+            <a:schemeClr val="accent1"/>
+          </a:fillRef>
+          <a:effectRef idx="0">
+            <a:schemeClr val="accent1"/>
+          </a:effectRef>
+          <a:fontRef idx="minor">
+            <a:schemeClr val="tx1"/>
+          </a:fontRef>
+        </p:style>
+      </p:cxnSp>
+      <p:cxnSp>
+        <p:nvCxnSpPr>
+          <p:cNvPr id="16" name="Straight Arrow Connector 15"/>
+          <p:cNvCxnSpPr>
+            <a:stCxn id="12" idx="2"/>
+          </p:cNvCxnSpPr>
+          <p:nvPr/>
+        </p:nvCxnSpPr>
+        <p:spPr>
+          <a:xfrm>
+            <a:off x="2574640" y="4633094"/>
+            <a:ext cx="616022" cy="884138"/>
+          </a:xfrm>
+          <a:prstGeom prst="straightConnector1">
+            <a:avLst/>
+          </a:prstGeom>
+          <a:ln>
+            <a:tailEnd type="arrow"/>
+          </a:ln>
+        </p:spPr>
+        <p:style>
+          <a:lnRef idx="1">
+            <a:schemeClr val="accent1"/>
+          </a:lnRef>
+          <a:fillRef idx="0">
+            <a:schemeClr val="accent1"/>
+          </a:fillRef>
+          <a:effectRef idx="0">
+            <a:schemeClr val="accent1"/>
+          </a:effectRef>
+          <a:fontRef idx="minor">
+            <a:schemeClr val="tx1"/>
+          </a:fontRef>
+        </p:style>
+      </p:cxnSp>
+      <p:cxnSp>
+        <p:nvCxnSpPr>
+          <p:cNvPr id="18" name="Straight Arrow Connector 17"/>
+          <p:cNvCxnSpPr/>
+          <p:nvPr/>
+        </p:nvCxnSpPr>
+        <p:spPr>
+          <a:xfrm>
+            <a:off x="2036810" y="4633094"/>
+            <a:ext cx="845841" cy="936105"/>
+          </a:xfrm>
+          <a:prstGeom prst="straightConnector1">
+            <a:avLst/>
+          </a:prstGeom>
+          <a:ln>
+            <a:tailEnd type="arrow"/>
+          </a:ln>
+        </p:spPr>
+        <p:style>
+          <a:lnRef idx="1">
+            <a:schemeClr val="accent1"/>
+          </a:lnRef>
+          <a:fillRef idx="0">
+            <a:schemeClr val="accent1"/>
+          </a:fillRef>
+          <a:effectRef idx="0">
+            <a:schemeClr val="accent1"/>
+          </a:effectRef>
+          <a:fontRef idx="minor">
+            <a:schemeClr val="tx1"/>
+          </a:fontRef>
+        </p:style>
+      </p:cxnSp>
+      <p:sp>
+        <p:nvSpPr>
+          <p:cNvPr id="19" name="Freeform 18"/>
+          <p:cNvSpPr/>
+          <p:nvPr/>
+        </p:nvSpPr>
+        <p:spPr>
+          <a:xfrm>
+            <a:off x="887240" y="2462543"/>
+            <a:ext cx="760500" cy="1972099"/>
+          </a:xfrm>
+          <a:custGeom>
+            <a:avLst/>
+            <a:gdLst>
+              <a:gd name="connsiteX0" fmla="*/ 0 w 760500"/>
+              <a:gd name="connsiteY0" fmla="*/ 0 h 1972099"/>
+              <a:gd name="connsiteX1" fmla="*/ 760491 w 760500"/>
+              <a:gd name="connsiteY1" fmla="*/ 588475 h 1972099"/>
+              <a:gd name="connsiteX2" fmla="*/ 18107 w 760500"/>
+              <a:gd name="connsiteY2" fmla="*/ 1765425 h 1972099"/>
+              <a:gd name="connsiteX3" fmla="*/ 660903 w 760500"/>
+              <a:gd name="connsiteY3" fmla="*/ 1964602 h 1972099"/>
+            </a:gdLst>
+            <a:ahLst/>
+            <a:cxnLst>
+              <a:cxn ang="0">
+                <a:pos x="connsiteX0" y="connsiteY0"/>
+              </a:cxn>
+              <a:cxn ang="0">
+                <a:pos x="connsiteX1" y="connsiteY1"/>
+              </a:cxn>
+              <a:cxn ang="0">
+                <a:pos x="connsiteX2" y="connsiteY2"/>
+              </a:cxn>
+              <a:cxn ang="0">
+                <a:pos x="connsiteX3" y="connsiteY3"/>
+              </a:cxn>
+            </a:cxnLst>
+            <a:rect l="l" t="t" r="r" b="b"/>
+            <a:pathLst>
+              <a:path w="760500" h="1972099">
+                <a:moveTo>
+                  <a:pt x="0" y="0"/>
+                </a:moveTo>
+                <a:cubicBezTo>
+                  <a:pt x="378736" y="147119"/>
+                  <a:pt x="757473" y="294238"/>
+                  <a:pt x="760491" y="588475"/>
+                </a:cubicBezTo>
+                <a:cubicBezTo>
+                  <a:pt x="763509" y="882713"/>
+                  <a:pt x="34705" y="1536071"/>
+                  <a:pt x="18107" y="1765425"/>
+                </a:cubicBezTo>
+                <a:cubicBezTo>
+                  <a:pt x="1509" y="1994779"/>
+                  <a:pt x="331206" y="1979690"/>
+                  <a:pt x="660903" y="1964602"/>
+                </a:cubicBezTo>
+              </a:path>
+            </a:pathLst>
+          </a:custGeom>
+          <a:noFill/>
+          <a:ln>
+            <a:prstDash val="sysDash"/>
+            <a:headEnd type="none" w="med" len="med"/>
+            <a:tailEnd type="arrow" w="med" len="med"/>
+          </a:ln>
+        </p:spPr>
+        <p:style>
+          <a:lnRef idx="2">
+            <a:schemeClr val="accent1">
+              <a:shade val="50000"/>
+            </a:schemeClr>
+          </a:lnRef>
+          <a:fillRef idx="1">
+            <a:schemeClr val="accent1"/>
+          </a:fillRef>
+          <a:effectRef idx="0">
+            <a:schemeClr val="accent1"/>
+          </a:effectRef>
+          <a:fontRef idx="minor">
+            <a:schemeClr val="lt1"/>
+          </a:fontRef>
+        </p:style>
+        <p:txBody>
+          <a:bodyPr rtlCol="0" anchor="ctr"/>
+          <a:lstStyle/>
+          <a:p>
+            <a:pPr algn="ctr"/>
+            <a:endParaRPr lang="en-US"/>
+          </a:p>
+        </p:txBody>
+      </p:sp>
+      <p:sp>
+        <p:nvSpPr>
+          <p:cNvPr id="20" name="Freeform 19"/>
+          <p:cNvSpPr/>
+          <p:nvPr/>
+        </p:nvSpPr>
+        <p:spPr>
+          <a:xfrm>
+            <a:off x="4508626" y="4571630"/>
+            <a:ext cx="1910281" cy="1313122"/>
+          </a:xfrm>
+          <a:custGeom>
+            <a:avLst/>
+            <a:gdLst>
+              <a:gd name="connsiteX0" fmla="*/ 0 w 1910281"/>
+              <a:gd name="connsiteY0" fmla="*/ 1313122 h 1313122"/>
+              <a:gd name="connsiteX1" fmla="*/ 199176 w 1910281"/>
+              <a:gd name="connsiteY1" fmla="*/ 425883 h 1313122"/>
+              <a:gd name="connsiteX2" fmla="*/ 887239 w 1910281"/>
+              <a:gd name="connsiteY2" fmla="*/ 370 h 1313122"/>
+              <a:gd name="connsiteX3" fmla="*/ 1421394 w 1910281"/>
+              <a:gd name="connsiteY3" fmla="*/ 489257 h 1313122"/>
+              <a:gd name="connsiteX4" fmla="*/ 1910281 w 1910281"/>
+              <a:gd name="connsiteY4" fmla="*/ 154279 h 1313122"/>
+            </a:gdLst>
+            <a:ahLst/>
+            <a:cxnLst>
+              <a:cxn ang="0">
+                <a:pos x="connsiteX0" y="connsiteY0"/>
+              </a:cxn>
+              <a:cxn ang="0">
+                <a:pos x="connsiteX1" y="connsiteY1"/>
+              </a:cxn>
+              <a:cxn ang="0">
+                <a:pos x="connsiteX2" y="connsiteY2"/>
+              </a:cxn>
+              <a:cxn ang="0">
+                <a:pos x="connsiteX3" y="connsiteY3"/>
+              </a:cxn>
+              <a:cxn ang="0">
+                <a:pos x="connsiteX4" y="connsiteY4"/>
+              </a:cxn>
+            </a:cxnLst>
+            <a:rect l="l" t="t" r="r" b="b"/>
+            <a:pathLst>
+              <a:path w="1910281" h="1313122">
+                <a:moveTo>
+                  <a:pt x="0" y="1313122"/>
+                </a:moveTo>
+                <a:cubicBezTo>
+                  <a:pt x="25651" y="978898"/>
+                  <a:pt x="51303" y="644675"/>
+                  <a:pt x="199176" y="425883"/>
+                </a:cubicBezTo>
+                <a:cubicBezTo>
+                  <a:pt x="347049" y="207091"/>
+                  <a:pt x="683536" y="-10192"/>
+                  <a:pt x="887239" y="370"/>
+                </a:cubicBezTo>
+                <a:cubicBezTo>
+                  <a:pt x="1090942" y="10932"/>
+                  <a:pt x="1250887" y="463606"/>
+                  <a:pt x="1421394" y="489257"/>
+                </a:cubicBezTo>
+                <a:cubicBezTo>
+                  <a:pt x="1591901" y="514908"/>
+                  <a:pt x="1751091" y="334593"/>
+                  <a:pt x="1910281" y="154279"/>
+                </a:cubicBezTo>
+              </a:path>
+            </a:pathLst>
+          </a:custGeom>
+          <a:noFill/>
+          <a:ln>
+            <a:prstDash val="sysDash"/>
+            <a:headEnd type="none" w="med" len="med"/>
+            <a:tailEnd type="arrow" w="med" len="med"/>
+          </a:ln>
+        </p:spPr>
+        <p:style>
+          <a:lnRef idx="2">
+            <a:schemeClr val="accent1">
+              <a:shade val="50000"/>
+            </a:schemeClr>
+          </a:lnRef>
+          <a:fillRef idx="1">
+            <a:schemeClr val="accent1"/>
+          </a:fillRef>
+          <a:effectRef idx="0">
+            <a:schemeClr val="accent1"/>
+          </a:effectRef>
+          <a:fontRef idx="minor">
+            <a:schemeClr val="lt1"/>
+          </a:fontRef>
+        </p:style>
+        <p:txBody>
+          <a:bodyPr rtlCol="0" anchor="ctr"/>
+          <a:lstStyle/>
+          <a:p>
+            <a:pPr algn="ctr"/>
+            <a:endParaRPr lang="en-US"/>
+          </a:p>
+        </p:txBody>
+      </p:sp>
+    </p:spTree>
+    <p:extLst>
+      <p:ext uri="{BB962C8B-B14F-4D97-AF65-F5344CB8AC3E}">
+        <p14:creationId xmlns:p14="http://schemas.microsoft.com/office/powerpoint/2010/main" val="690230328"/>
       </p:ext>
     </p:extLst>
   </p:cSld>
@@ -10810,7 +12216,7 @@
           <a:p>
             <a:pPr algn="ctr"/>
             <a:r>
-              <a:rPr lang="en-US" sz="1200" dirty="0" err="1"/>
+              <a:rPr lang="en-US" sz="1200" dirty="0" err="1" smtClean="0"/>
               <a:t>aircraft_movements_queue</a:t>
             </a:r>
             <a:endParaRPr lang="en-US" sz="1200" dirty="0"/>
@@ -11021,8 +12427,19 @@
           <a:p>
             <a:pPr algn="ctr"/>
             <a:r>
-              <a:rPr lang="en-US" sz="1200" dirty="0" err="1"/>
-              <a:t>FinanceAircraftMovementReporter</a:t>
+              <a:rPr lang="en-US" sz="1200" dirty="0" err="1" smtClean="0"/>
+              <a:t>FinanceAircraft</a:t>
+            </a:r>
+            <a:r>
+              <a:rPr lang="en-US" sz="1200" dirty="0" smtClean="0"/>
+              <a:t/>
+            </a:r>
+            <a:br>
+              <a:rPr lang="en-US" sz="1200" dirty="0" smtClean="0"/>
+            </a:br>
+            <a:r>
+              <a:rPr lang="en-US" sz="1200" dirty="0" err="1" smtClean="0"/>
+              <a:t>MovementReporter</a:t>
             </a:r>
             <a:endParaRPr lang="en-US" sz="1200" dirty="0"/>
           </a:p>
@@ -11305,8 +12722,8 @@
         </p:nvSpPr>
         <p:spPr>
           <a:xfrm>
-            <a:off x="107504" y="6309320"/>
-            <a:ext cx="1656184" cy="504056"/>
+            <a:off x="188132" y="6309320"/>
+            <a:ext cx="2007604" cy="504056"/>
           </a:xfrm>
           <a:prstGeom prst="roundRect">
             <a:avLst/>
@@ -11333,7 +12750,18 @@
             <a:pPr algn="ctr"/>
             <a:r>
               <a:rPr lang="nl-NL" sz="1200" dirty="0" err="1" smtClean="0"/>
-              <a:t>AircraftMovementServiceDirectBindingClient</a:t>
+              <a:t>AircraftMovement</a:t>
+            </a:r>
+            <a:r>
+              <a:rPr lang="nl-NL" sz="1200" dirty="0" smtClean="0"/>
+              <a:t/>
+            </a:r>
+            <a:br>
+              <a:rPr lang="nl-NL" sz="1200" dirty="0" smtClean="0"/>
+            </a:br>
+            <a:r>
+              <a:rPr lang="nl-NL" sz="1200" dirty="0" err="1" smtClean="0"/>
+              <a:t>ServiceDirectBindingClient</a:t>
             </a:r>
             <a:endParaRPr lang="en-US" sz="1200" dirty="0"/>
           </a:p>
@@ -11350,13 +12778,13 @@
         </p:nvCxnSpPr>
         <p:spPr>
           <a:xfrm rot="16200000" flipV="1">
-            <a:off x="519506" y="5893230"/>
-            <a:ext cx="490143" cy="342038"/>
+            <a:off x="647675" y="5765061"/>
+            <a:ext cx="490143" cy="598376"/>
           </a:xfrm>
           <a:prstGeom prst="bentConnector4">
             <a:avLst>
               <a:gd name="adj1" fmla="val 22014"/>
-              <a:gd name="adj2" fmla="val 308940"/>
+              <a:gd name="adj2" fmla="val 157542"/>
             </a:avLst>
           </a:prstGeom>
           <a:ln>
@@ -11387,7 +12815,7 @@
         <p:spPr>
           <a:xfrm>
             <a:off x="107504" y="3501008"/>
-            <a:ext cx="1368152" cy="504056"/>
+            <a:ext cx="1440160" cy="504056"/>
           </a:xfrm>
           <a:prstGeom prst="roundRect">
             <a:avLst/>

</xml_diff>

<commit_message>
Added images for chapter 15
</commit_message>
<xml_diff>
--- a/ChapterOverviews_picturesOfService.pptx
+++ b/ChapterOverviews_picturesOfService.pptx
@@ -24,6 +24,7 @@
     <p:sldId id="263" r:id="rId18"/>
     <p:sldId id="274" r:id="rId19"/>
     <p:sldId id="275" r:id="rId20"/>
+    <p:sldId id="276" r:id="rId21"/>
   </p:sldIdLst>
   <p:sldSz cx="9144000" cy="6858000" type="screen4x3"/>
   <p:notesSz cx="6858000" cy="9144000"/>
@@ -306,7 +307,7 @@
           <a:p>
             <a:fld id="{56109F2C-2545-4AE2-8C8C-1380225067C3}" type="datetimeFigureOut">
               <a:rPr lang="en-US" smtClean="0"/>
-              <a:t>8/26/2014</a:t>
+              <a:t>8/28/2014</a:t>
             </a:fld>
             <a:endParaRPr lang="en-US"/>
           </a:p>
@@ -476,7 +477,7 @@
           <a:p>
             <a:fld id="{56109F2C-2545-4AE2-8C8C-1380225067C3}" type="datetimeFigureOut">
               <a:rPr lang="en-US" smtClean="0"/>
-              <a:t>8/26/2014</a:t>
+              <a:t>8/28/2014</a:t>
             </a:fld>
             <a:endParaRPr lang="en-US"/>
           </a:p>
@@ -656,7 +657,7 @@
           <a:p>
             <a:fld id="{56109F2C-2545-4AE2-8C8C-1380225067C3}" type="datetimeFigureOut">
               <a:rPr lang="en-US" smtClean="0"/>
-              <a:t>8/26/2014</a:t>
+              <a:t>8/28/2014</a:t>
             </a:fld>
             <a:endParaRPr lang="en-US"/>
           </a:p>
@@ -826,7 +827,7 @@
           <a:p>
             <a:fld id="{56109F2C-2545-4AE2-8C8C-1380225067C3}" type="datetimeFigureOut">
               <a:rPr lang="en-US" smtClean="0"/>
-              <a:t>8/26/2014</a:t>
+              <a:t>8/28/2014</a:t>
             </a:fld>
             <a:endParaRPr lang="en-US"/>
           </a:p>
@@ -1072,7 +1073,7 @@
           <a:p>
             <a:fld id="{56109F2C-2545-4AE2-8C8C-1380225067C3}" type="datetimeFigureOut">
               <a:rPr lang="en-US" smtClean="0"/>
-              <a:t>8/26/2014</a:t>
+              <a:t>8/28/2014</a:t>
             </a:fld>
             <a:endParaRPr lang="en-US"/>
           </a:p>
@@ -1360,7 +1361,7 @@
           <a:p>
             <a:fld id="{56109F2C-2545-4AE2-8C8C-1380225067C3}" type="datetimeFigureOut">
               <a:rPr lang="en-US" smtClean="0"/>
-              <a:t>8/26/2014</a:t>
+              <a:t>8/28/2014</a:t>
             </a:fld>
             <a:endParaRPr lang="en-US"/>
           </a:p>
@@ -1782,7 +1783,7 @@
           <a:p>
             <a:fld id="{56109F2C-2545-4AE2-8C8C-1380225067C3}" type="datetimeFigureOut">
               <a:rPr lang="en-US" smtClean="0"/>
-              <a:t>8/26/2014</a:t>
+              <a:t>8/28/2014</a:t>
             </a:fld>
             <a:endParaRPr lang="en-US"/>
           </a:p>
@@ -1900,7 +1901,7 @@
           <a:p>
             <a:fld id="{56109F2C-2545-4AE2-8C8C-1380225067C3}" type="datetimeFigureOut">
               <a:rPr lang="en-US" smtClean="0"/>
-              <a:t>8/26/2014</a:t>
+              <a:t>8/28/2014</a:t>
             </a:fld>
             <a:endParaRPr lang="en-US"/>
           </a:p>
@@ -1995,7 +1996,7 @@
           <a:p>
             <a:fld id="{56109F2C-2545-4AE2-8C8C-1380225067C3}" type="datetimeFigureOut">
               <a:rPr lang="en-US" smtClean="0"/>
-              <a:t>8/26/2014</a:t>
+              <a:t>8/28/2014</a:t>
             </a:fld>
             <a:endParaRPr lang="en-US"/>
           </a:p>
@@ -2272,7 +2273,7 @@
           <a:p>
             <a:fld id="{56109F2C-2545-4AE2-8C8C-1380225067C3}" type="datetimeFigureOut">
               <a:rPr lang="en-US" smtClean="0"/>
-              <a:t>8/26/2014</a:t>
+              <a:t>8/28/2014</a:t>
             </a:fld>
             <a:endParaRPr lang="en-US"/>
           </a:p>
@@ -2525,7 +2526,7 @@
           <a:p>
             <a:fld id="{56109F2C-2545-4AE2-8C8C-1380225067C3}" type="datetimeFigureOut">
               <a:rPr lang="en-US" smtClean="0"/>
-              <a:t>8/26/2014</a:t>
+              <a:t>8/28/2014</a:t>
             </a:fld>
             <a:endParaRPr lang="en-US"/>
           </a:p>
@@ -2738,7 +2739,7 @@
           <a:p>
             <a:fld id="{56109F2C-2545-4AE2-8C8C-1380225067C3}" type="datetimeFigureOut">
               <a:rPr lang="en-US" smtClean="0"/>
-              <a:t>8/26/2014</a:t>
+              <a:t>8/28/2014</a:t>
             </a:fld>
             <a:endParaRPr lang="en-US"/>
           </a:p>
@@ -8295,14 +8296,179 @@
       </p:sp>
       <p:pic>
         <p:nvPicPr>
-          <p:cNvPr id="5" name="Picture 7"/>
+          <p:cNvPr id="6" name="Picture 5"/>
+          <p:cNvPicPr/>
+          <p:nvPr/>
+        </p:nvPicPr>
+        <p:blipFill>
+          <a:blip r:embed="rId2"/>
+          <a:stretch>
+            <a:fillRect/>
+          </a:stretch>
+        </p:blipFill>
+        <p:spPr>
+          <a:xfrm>
+            <a:off x="4932041" y="1124744"/>
+            <a:ext cx="4066524" cy="2258411"/>
+          </a:xfrm>
+          <a:prstGeom prst="rect">
+            <a:avLst/>
+          </a:prstGeom>
+        </p:spPr>
+      </p:pic>
+      <p:cxnSp>
+        <p:nvCxnSpPr>
+          <p:cNvPr id="14" name="Straight Arrow Connector 13"/>
+          <p:cNvCxnSpPr/>
+          <p:nvPr/>
+        </p:nvCxnSpPr>
+        <p:spPr>
+          <a:xfrm>
+            <a:off x="899592" y="1124744"/>
+            <a:ext cx="144016" cy="864096"/>
+          </a:xfrm>
+          <a:prstGeom prst="straightConnector1">
+            <a:avLst/>
+          </a:prstGeom>
+          <a:ln>
+            <a:tailEnd type="arrow"/>
+          </a:ln>
+        </p:spPr>
+        <p:style>
+          <a:lnRef idx="1">
+            <a:schemeClr val="accent1"/>
+          </a:lnRef>
+          <a:fillRef idx="0">
+            <a:schemeClr val="accent1"/>
+          </a:fillRef>
+          <a:effectRef idx="0">
+            <a:schemeClr val="accent1"/>
+          </a:effectRef>
+          <a:fontRef idx="minor">
+            <a:schemeClr val="tx1"/>
+          </a:fontRef>
+        </p:style>
+      </p:cxnSp>
+      <p:sp>
+        <p:nvSpPr>
+          <p:cNvPr id="15" name="Rectangle 14"/>
+          <p:cNvSpPr/>
+          <p:nvPr/>
+        </p:nvSpPr>
+        <p:spPr>
+          <a:xfrm>
+            <a:off x="251519" y="116632"/>
+            <a:ext cx="2952329" cy="1008112"/>
+          </a:xfrm>
+          <a:prstGeom prst="rect">
+            <a:avLst/>
+          </a:prstGeom>
+        </p:spPr>
+        <p:style>
+          <a:lnRef idx="1">
+            <a:schemeClr val="accent1"/>
+          </a:lnRef>
+          <a:fillRef idx="2">
+            <a:schemeClr val="accent1"/>
+          </a:fillRef>
+          <a:effectRef idx="1">
+            <a:schemeClr val="accent1"/>
+          </a:effectRef>
+          <a:fontRef idx="minor">
+            <a:schemeClr val="dk1"/>
+          </a:fontRef>
+        </p:style>
+        <p:txBody>
+          <a:bodyPr rtlCol="0" anchor="ctr"/>
+          <a:lstStyle/>
+          <a:p>
+            <a:pPr algn="ctr"/>
+            <a:r>
+              <a:rPr lang="nl-NL" dirty="0" err="1" smtClean="0"/>
+              <a:t>Publish</a:t>
+            </a:r>
+            <a:r>
+              <a:rPr lang="nl-NL" dirty="0" smtClean="0"/>
+              <a:t> </a:t>
+            </a:r>
+            <a:r>
+              <a:rPr lang="nl-NL" dirty="0" err="1" smtClean="0"/>
+              <a:t>from</a:t>
+            </a:r>
+            <a:r>
+              <a:rPr lang="nl-NL" dirty="0" smtClean="0"/>
+              <a:t>: EM FMW Control, </a:t>
+            </a:r>
+            <a:endParaRPr lang="nl-NL" dirty="0" smtClean="0"/>
+          </a:p>
+          <a:p>
+            <a:pPr algn="ctr"/>
+            <a:r>
+              <a:rPr lang="nl-NL" dirty="0" smtClean="0"/>
+              <a:t>Mediator, </a:t>
+            </a:r>
+            <a:r>
+              <a:rPr lang="nl-NL" dirty="0" smtClean="0"/>
+              <a:t>BPEL</a:t>
+            </a:r>
+            <a:endParaRPr lang="en-US" dirty="0"/>
+          </a:p>
+        </p:txBody>
+      </p:sp>
+      <p:sp>
+        <p:nvSpPr>
+          <p:cNvPr id="16" name="Rounded Rectangle 15"/>
+          <p:cNvSpPr/>
+          <p:nvPr/>
+        </p:nvSpPr>
+        <p:spPr>
+          <a:xfrm>
+            <a:off x="2915816" y="3573016"/>
+            <a:ext cx="2117072" cy="432048"/>
+          </a:xfrm>
+          <a:prstGeom prst="roundRect">
+            <a:avLst/>
+          </a:prstGeom>
+        </p:spPr>
+        <p:style>
+          <a:lnRef idx="2">
+            <a:schemeClr val="accent1">
+              <a:shade val="50000"/>
+            </a:schemeClr>
+          </a:lnRef>
+          <a:fillRef idx="1">
+            <a:schemeClr val="accent1"/>
+          </a:fillRef>
+          <a:effectRef idx="0">
+            <a:schemeClr val="accent1"/>
+          </a:effectRef>
+          <a:fontRef idx="minor">
+            <a:schemeClr val="lt1"/>
+          </a:fontRef>
+        </p:style>
+        <p:txBody>
+          <a:bodyPr rtlCol="0" anchor="ctr"/>
+          <a:lstStyle/>
+          <a:p>
+            <a:pPr algn="ctr"/>
+            <a:r>
+              <a:rPr lang="nl-NL" dirty="0" err="1" smtClean="0"/>
+              <a:t>FlightUpdateRelay</a:t>
+            </a:r>
+            <a:endParaRPr lang="en-US" dirty="0"/>
+          </a:p>
+        </p:txBody>
+      </p:sp>
+      <p:pic>
+        <p:nvPicPr>
+          <p:cNvPr id="1026" name="Picture 2"/>
           <p:cNvPicPr>
             <a:picLocks noChangeAspect="1" noChangeArrowheads="1"/>
           </p:cNvPicPr>
           <p:nvPr/>
         </p:nvPicPr>
         <p:blipFill>
-          <a:blip r:embed="rId2">
+          <a:blip r:embed="rId3">
             <a:extLst>
               <a:ext uri="{28A0092B-C50C-407E-A947-70E740481C1C}">
                 <a14:useLocalDpi xmlns:a14="http://schemas.microsoft.com/office/drawing/2010/main" val="0"/>
@@ -8316,8 +8482,8 @@
         </p:blipFill>
         <p:spPr bwMode="auto">
           <a:xfrm>
-            <a:off x="4653171" y="3764530"/>
-            <a:ext cx="4345394" cy="1236009"/>
+            <a:off x="1907704" y="3907889"/>
+            <a:ext cx="3936713" cy="1354460"/>
           </a:xfrm>
           <a:prstGeom prst="rect">
             <a:avLst/>
@@ -8347,52 +8513,122 @@
           </a:extLst>
         </p:spPr>
       </p:pic>
-      <p:pic>
-        <p:nvPicPr>
-          <p:cNvPr id="6" name="Picture 5"/>
-          <p:cNvPicPr/>
-          <p:nvPr/>
-        </p:nvPicPr>
-        <p:blipFill>
-          <a:blip r:embed="rId3"/>
-          <a:stretch>
-            <a:fillRect/>
-          </a:stretch>
-        </p:blipFill>
-        <p:spPr>
-          <a:xfrm>
-            <a:off x="3923928" y="1279956"/>
-            <a:ext cx="5074637" cy="2425879"/>
-          </a:xfrm>
-          <a:prstGeom prst="rect">
-            <a:avLst/>
-          </a:prstGeom>
-        </p:spPr>
-      </p:pic>
-      <p:sp>
-        <p:nvSpPr>
-          <p:cNvPr id="10" name="Freeform 9"/>
+      <p:sp>
+        <p:nvSpPr>
+          <p:cNvPr id="7" name="Freeform 6"/>
           <p:cNvSpPr/>
           <p:nvPr/>
         </p:nvSpPr>
         <p:spPr>
           <a:xfrm>
-            <a:off x="2263366" y="2308634"/>
-            <a:ext cx="2860895" cy="952481"/>
+            <a:off x="899592" y="2960483"/>
+            <a:ext cx="2429639" cy="2298835"/>
           </a:xfrm>
           <a:custGeom>
             <a:avLst/>
             <a:gdLst>
-              <a:gd name="connsiteX0" fmla="*/ 0 w 2860895"/>
-              <a:gd name="connsiteY0" fmla="*/ 0 h 952481"/>
-              <a:gd name="connsiteX1" fmla="*/ 1140737 w 2860895"/>
-              <a:gd name="connsiteY1" fmla="*/ 769544 h 952481"/>
-              <a:gd name="connsiteX2" fmla="*/ 2000816 w 2860895"/>
-              <a:gd name="connsiteY2" fmla="*/ 932507 h 952481"/>
-              <a:gd name="connsiteX3" fmla="*/ 2263367 w 2860895"/>
-              <a:gd name="connsiteY3" fmla="*/ 434566 h 952481"/>
-              <a:gd name="connsiteX4" fmla="*/ 2860895 w 2860895"/>
-              <a:gd name="connsiteY4" fmla="*/ 262550 h 952481"/>
+              <a:gd name="connsiteX0" fmla="*/ 157219 w 2429639"/>
+              <a:gd name="connsiteY0" fmla="*/ 0 h 2298835"/>
+              <a:gd name="connsiteX1" fmla="*/ 102899 w 2429639"/>
+              <a:gd name="connsiteY1" fmla="*/ 1339913 h 2298835"/>
+              <a:gd name="connsiteX2" fmla="*/ 1343223 w 2429639"/>
+              <a:gd name="connsiteY2" fmla="*/ 2290527 h 2298835"/>
+              <a:gd name="connsiteX3" fmla="*/ 2429639 w 2429639"/>
+              <a:gd name="connsiteY3" fmla="*/ 1792586 h 2298835"/>
+            </a:gdLst>
+            <a:ahLst/>
+            <a:cxnLst>
+              <a:cxn ang="0">
+                <a:pos x="connsiteX0" y="connsiteY0"/>
+              </a:cxn>
+              <a:cxn ang="0">
+                <a:pos x="connsiteX1" y="connsiteY1"/>
+              </a:cxn>
+              <a:cxn ang="0">
+                <a:pos x="connsiteX2" y="connsiteY2"/>
+              </a:cxn>
+              <a:cxn ang="0">
+                <a:pos x="connsiteX3" y="connsiteY3"/>
+              </a:cxn>
+            </a:cxnLst>
+            <a:rect l="l" t="t" r="r" b="b"/>
+            <a:pathLst>
+              <a:path w="2429639" h="2298835">
+                <a:moveTo>
+                  <a:pt x="157219" y="0"/>
+                </a:moveTo>
+                <a:cubicBezTo>
+                  <a:pt x="31225" y="479079"/>
+                  <a:pt x="-94768" y="958159"/>
+                  <a:pt x="102899" y="1339913"/>
+                </a:cubicBezTo>
+                <a:cubicBezTo>
+                  <a:pt x="300566" y="1721667"/>
+                  <a:pt x="955433" y="2215082"/>
+                  <a:pt x="1343223" y="2290527"/>
+                </a:cubicBezTo>
+                <a:cubicBezTo>
+                  <a:pt x="1731013" y="2365972"/>
+                  <a:pt x="2023742" y="1905754"/>
+                  <a:pt x="2429639" y="1792586"/>
+                </a:cubicBezTo>
+              </a:path>
+            </a:pathLst>
+          </a:custGeom>
+          <a:noFill/>
+          <a:ln>
+            <a:prstDash val="sysDash"/>
+          </a:ln>
+        </p:spPr>
+        <p:style>
+          <a:lnRef idx="2">
+            <a:schemeClr val="accent1">
+              <a:shade val="50000"/>
+            </a:schemeClr>
+          </a:lnRef>
+          <a:fillRef idx="1">
+            <a:schemeClr val="accent1"/>
+          </a:fillRef>
+          <a:effectRef idx="0">
+            <a:schemeClr val="accent1"/>
+          </a:effectRef>
+          <a:fontRef idx="minor">
+            <a:schemeClr val="lt1"/>
+          </a:fontRef>
+        </p:style>
+        <p:txBody>
+          <a:bodyPr rtlCol="0" anchor="ctr"/>
+          <a:lstStyle/>
+          <a:p>
+            <a:pPr algn="ctr"/>
+            <a:endParaRPr lang="en-US"/>
+          </a:p>
+        </p:txBody>
+      </p:sp>
+      <p:sp>
+        <p:nvSpPr>
+          <p:cNvPr id="8" name="Freeform 7"/>
+          <p:cNvSpPr/>
+          <p:nvPr/>
+        </p:nvSpPr>
+        <p:spPr>
+          <a:xfrm>
+            <a:off x="3830757" y="2055137"/>
+            <a:ext cx="2729198" cy="2643612"/>
+          </a:xfrm>
+          <a:custGeom>
+            <a:avLst/>
+            <a:gdLst>
+              <a:gd name="connsiteX0" fmla="*/ 1756910 w 2729198"/>
+              <a:gd name="connsiteY0" fmla="*/ 2643612 h 2643612"/>
+              <a:gd name="connsiteX1" fmla="*/ 2725631 w 2729198"/>
+              <a:gd name="connsiteY1" fmla="*/ 2408221 h 2643612"/>
+              <a:gd name="connsiteX2" fmla="*/ 2001354 w 2729198"/>
+              <a:gd name="connsiteY2" fmla="*/ 1430447 h 2643612"/>
+              <a:gd name="connsiteX3" fmla="*/ 9591 w 2729198"/>
+              <a:gd name="connsiteY3" fmla="*/ 823865 h 2643612"/>
+              <a:gd name="connsiteX4" fmla="*/ 1195595 w 2729198"/>
+              <a:gd name="connsiteY4" fmla="*/ 0 h 2643612"/>
             </a:gdLst>
             <a:ahLst/>
             <a:cxnLst>
@@ -8414,36 +8650,35 @@
             </a:cxnLst>
             <a:rect l="l" t="t" r="r" b="b"/>
             <a:pathLst>
-              <a:path w="2860895" h="952481">
+              <a:path w="2729198" h="2643612">
                 <a:moveTo>
-                  <a:pt x="0" y="0"/>
+                  <a:pt x="1756910" y="2643612"/>
                 </a:moveTo>
                 <a:cubicBezTo>
-                  <a:pt x="403634" y="307063"/>
-                  <a:pt x="807268" y="614126"/>
-                  <a:pt x="1140737" y="769544"/>
+                  <a:pt x="2220900" y="2627013"/>
+                  <a:pt x="2684890" y="2610415"/>
+                  <a:pt x="2725631" y="2408221"/>
                 </a:cubicBezTo>
                 <a:cubicBezTo>
-                  <a:pt x="1474206" y="924962"/>
-                  <a:pt x="1813711" y="988337"/>
-                  <a:pt x="2000816" y="932507"/>
+                  <a:pt x="2766372" y="2206027"/>
+                  <a:pt x="2454027" y="1694506"/>
+                  <a:pt x="2001354" y="1430447"/>
                 </a:cubicBezTo>
                 <a:cubicBezTo>
-                  <a:pt x="2187921" y="876677"/>
-                  <a:pt x="2120021" y="546225"/>
-                  <a:pt x="2263367" y="434566"/>
+                  <a:pt x="1548681" y="1166388"/>
+                  <a:pt x="143884" y="1062273"/>
+                  <a:pt x="9591" y="823865"/>
                 </a:cubicBezTo>
                 <a:cubicBezTo>
-                  <a:pt x="2406713" y="322907"/>
-                  <a:pt x="2633804" y="292728"/>
-                  <a:pt x="2860895" y="262550"/>
+                  <a:pt x="-124702" y="585457"/>
+                  <a:pt x="1195595" y="0"/>
+                  <a:pt x="1195595" y="0"/>
                 </a:cubicBezTo>
               </a:path>
             </a:pathLst>
           </a:custGeom>
           <a:noFill/>
           <a:ln>
-            <a:prstDash val="sysDash"/>
             <a:headEnd type="none" w="med" len="med"/>
             <a:tailEnd type="arrow" w="med" len="med"/>
           </a:ln>
@@ -8470,315 +8705,6 @@
           <a:p>
             <a:pPr algn="ctr"/>
             <a:endParaRPr lang="en-US"/>
-          </a:p>
-        </p:txBody>
-      </p:sp>
-      <p:sp>
-        <p:nvSpPr>
-          <p:cNvPr id="11" name="Rounded Rectangle 10"/>
-          <p:cNvSpPr/>
-          <p:nvPr/>
-        </p:nvSpPr>
-        <p:spPr>
-          <a:xfrm>
-            <a:off x="827584" y="4077072"/>
-            <a:ext cx="3537555" cy="1067483"/>
-          </a:xfrm>
-          <a:prstGeom prst="roundRect">
-            <a:avLst/>
-          </a:prstGeom>
-        </p:spPr>
-        <p:style>
-          <a:lnRef idx="2">
-            <a:schemeClr val="accent1">
-              <a:shade val="50000"/>
-            </a:schemeClr>
-          </a:lnRef>
-          <a:fillRef idx="1">
-            <a:schemeClr val="accent1"/>
-          </a:fillRef>
-          <a:effectRef idx="0">
-            <a:schemeClr val="accent1"/>
-          </a:effectRef>
-          <a:fontRef idx="minor">
-            <a:schemeClr val="lt1"/>
-          </a:fontRef>
-        </p:style>
-        <p:txBody>
-          <a:bodyPr rtlCol="0" anchor="ctr"/>
-          <a:lstStyle/>
-          <a:p>
-            <a:pPr algn="ctr"/>
-            <a:r>
-              <a:rPr lang="nl-NL" dirty="0" smtClean="0"/>
-              <a:t>SB: </a:t>
-            </a:r>
-          </a:p>
-          <a:p>
-            <a:pPr algn="ctr"/>
-            <a:r>
-              <a:rPr lang="nl-NL" dirty="0" err="1" smtClean="0"/>
-              <a:t>read</a:t>
-            </a:r>
-            <a:r>
-              <a:rPr lang="nl-NL" dirty="0" smtClean="0"/>
-              <a:t> </a:t>
-            </a:r>
-            <a:r>
-              <a:rPr lang="nl-NL" dirty="0" err="1" smtClean="0"/>
-              <a:t>from</a:t>
-            </a:r>
-            <a:r>
-              <a:rPr lang="nl-NL" dirty="0" smtClean="0"/>
-              <a:t> JMS</a:t>
-            </a:r>
-          </a:p>
-          <a:p>
-            <a:pPr algn="ctr"/>
-            <a:r>
-              <a:rPr lang="nl-NL" dirty="0" err="1" smtClean="0"/>
-              <a:t>Use</a:t>
-            </a:r>
-            <a:r>
-              <a:rPr lang="nl-NL" dirty="0" smtClean="0"/>
-              <a:t> </a:t>
-            </a:r>
-            <a:r>
-              <a:rPr lang="nl-NL" dirty="0" err="1" smtClean="0"/>
-              <a:t>intermediary</a:t>
-            </a:r>
-            <a:r>
-              <a:rPr lang="nl-NL" dirty="0" smtClean="0"/>
-              <a:t> SOA </a:t>
-            </a:r>
-            <a:r>
-              <a:rPr lang="nl-NL" dirty="0" err="1" smtClean="0"/>
-              <a:t>composite</a:t>
-            </a:r>
-            <a:endParaRPr lang="en-US" dirty="0"/>
-          </a:p>
-        </p:txBody>
-      </p:sp>
-      <p:sp>
-        <p:nvSpPr>
-          <p:cNvPr id="12" name="Freeform 11"/>
-          <p:cNvSpPr/>
-          <p:nvPr/>
-        </p:nvSpPr>
-        <p:spPr>
-          <a:xfrm>
-            <a:off x="1231271" y="2996697"/>
-            <a:ext cx="3657600" cy="2618154"/>
-          </a:xfrm>
-          <a:custGeom>
-            <a:avLst/>
-            <a:gdLst>
-              <a:gd name="connsiteX0" fmla="*/ 0 w 3657600"/>
-              <a:gd name="connsiteY0" fmla="*/ 0 h 2618154"/>
-              <a:gd name="connsiteX1" fmla="*/ 923454 w 3657600"/>
-              <a:gd name="connsiteY1" fmla="*/ 416459 h 2618154"/>
-              <a:gd name="connsiteX2" fmla="*/ 1167897 w 3657600"/>
-              <a:gd name="connsiteY2" fmla="*/ 1077362 h 2618154"/>
-              <a:gd name="connsiteX3" fmla="*/ 1231272 w 3657600"/>
-              <a:gd name="connsiteY3" fmla="*/ 2562131 h 2618154"/>
-              <a:gd name="connsiteX4" fmla="*/ 3304515 w 3657600"/>
-              <a:gd name="connsiteY4" fmla="*/ 2227153 h 2618154"/>
-              <a:gd name="connsiteX5" fmla="*/ 3358836 w 3657600"/>
-              <a:gd name="connsiteY5" fmla="*/ 1484768 h 2618154"/>
-              <a:gd name="connsiteX6" fmla="*/ 3657600 w 3657600"/>
-              <a:gd name="connsiteY6" fmla="*/ 1502875 h 2618154"/>
-            </a:gdLst>
-            <a:ahLst/>
-            <a:cxnLst>
-              <a:cxn ang="0">
-                <a:pos x="connsiteX0" y="connsiteY0"/>
-              </a:cxn>
-              <a:cxn ang="0">
-                <a:pos x="connsiteX1" y="connsiteY1"/>
-              </a:cxn>
-              <a:cxn ang="0">
-                <a:pos x="connsiteX2" y="connsiteY2"/>
-              </a:cxn>
-              <a:cxn ang="0">
-                <a:pos x="connsiteX3" y="connsiteY3"/>
-              </a:cxn>
-              <a:cxn ang="0">
-                <a:pos x="connsiteX4" y="connsiteY4"/>
-              </a:cxn>
-              <a:cxn ang="0">
-                <a:pos x="connsiteX5" y="connsiteY5"/>
-              </a:cxn>
-              <a:cxn ang="0">
-                <a:pos x="connsiteX6" y="connsiteY6"/>
-              </a:cxn>
-            </a:cxnLst>
-            <a:rect l="l" t="t" r="r" b="b"/>
-            <a:pathLst>
-              <a:path w="3657600" h="2618154">
-                <a:moveTo>
-                  <a:pt x="0" y="0"/>
-                </a:moveTo>
-                <a:cubicBezTo>
-                  <a:pt x="364402" y="118449"/>
-                  <a:pt x="728805" y="236899"/>
-                  <a:pt x="923454" y="416459"/>
-                </a:cubicBezTo>
-                <a:cubicBezTo>
-                  <a:pt x="1118103" y="596019"/>
-                  <a:pt x="1116594" y="719750"/>
-                  <a:pt x="1167897" y="1077362"/>
-                </a:cubicBezTo>
-                <a:cubicBezTo>
-                  <a:pt x="1219200" y="1434974"/>
-                  <a:pt x="875169" y="2370499"/>
-                  <a:pt x="1231272" y="2562131"/>
-                </a:cubicBezTo>
-                <a:cubicBezTo>
-                  <a:pt x="1587375" y="2753763"/>
-                  <a:pt x="2949921" y="2406713"/>
-                  <a:pt x="3304515" y="2227153"/>
-                </a:cubicBezTo>
-                <a:cubicBezTo>
-                  <a:pt x="3659109" y="2047593"/>
-                  <a:pt x="3299989" y="1605481"/>
-                  <a:pt x="3358836" y="1484768"/>
-                </a:cubicBezTo>
-                <a:cubicBezTo>
-                  <a:pt x="3417683" y="1364055"/>
-                  <a:pt x="3537641" y="1433465"/>
-                  <a:pt x="3657600" y="1502875"/>
-                </a:cubicBezTo>
-              </a:path>
-            </a:pathLst>
-          </a:custGeom>
-          <a:noFill/>
-          <a:ln>
-            <a:prstDash val="sysDash"/>
-          </a:ln>
-        </p:spPr>
-        <p:style>
-          <a:lnRef idx="2">
-            <a:schemeClr val="accent1">
-              <a:shade val="50000"/>
-            </a:schemeClr>
-          </a:lnRef>
-          <a:fillRef idx="1">
-            <a:schemeClr val="accent1"/>
-          </a:fillRef>
-          <a:effectRef idx="0">
-            <a:schemeClr val="accent1"/>
-          </a:effectRef>
-          <a:fontRef idx="minor">
-            <a:schemeClr val="lt1"/>
-          </a:fontRef>
-        </p:style>
-        <p:txBody>
-          <a:bodyPr rtlCol="0" anchor="ctr"/>
-          <a:lstStyle/>
-          <a:p>
-            <a:pPr algn="ctr"/>
-            <a:endParaRPr lang="en-US"/>
-          </a:p>
-        </p:txBody>
-      </p:sp>
-      <p:cxnSp>
-        <p:nvCxnSpPr>
-          <p:cNvPr id="14" name="Straight Arrow Connector 13"/>
-          <p:cNvCxnSpPr/>
-          <p:nvPr/>
-        </p:nvCxnSpPr>
-        <p:spPr>
-          <a:xfrm>
-            <a:off x="899592" y="1124744"/>
-            <a:ext cx="144016" cy="864096"/>
-          </a:xfrm>
-          <a:prstGeom prst="straightConnector1">
-            <a:avLst/>
-          </a:prstGeom>
-          <a:ln>
-            <a:tailEnd type="arrow"/>
-          </a:ln>
-        </p:spPr>
-        <p:style>
-          <a:lnRef idx="1">
-            <a:schemeClr val="accent1"/>
-          </a:lnRef>
-          <a:fillRef idx="0">
-            <a:schemeClr val="accent1"/>
-          </a:fillRef>
-          <a:effectRef idx="0">
-            <a:schemeClr val="accent1"/>
-          </a:effectRef>
-          <a:fontRef idx="minor">
-            <a:schemeClr val="tx1"/>
-          </a:fontRef>
-        </p:style>
-      </p:cxnSp>
-      <p:sp>
-        <p:nvSpPr>
-          <p:cNvPr id="15" name="Rectangle 14"/>
-          <p:cNvSpPr/>
-          <p:nvPr/>
-        </p:nvSpPr>
-        <p:spPr>
-          <a:xfrm>
-            <a:off x="251520" y="332656"/>
-            <a:ext cx="2376264" cy="792088"/>
-          </a:xfrm>
-          <a:prstGeom prst="rect">
-            <a:avLst/>
-          </a:prstGeom>
-        </p:spPr>
-        <p:style>
-          <a:lnRef idx="1">
-            <a:schemeClr val="accent1"/>
-          </a:lnRef>
-          <a:fillRef idx="2">
-            <a:schemeClr val="accent1"/>
-          </a:fillRef>
-          <a:effectRef idx="1">
-            <a:schemeClr val="accent1"/>
-          </a:effectRef>
-          <a:fontRef idx="minor">
-            <a:schemeClr val="dk1"/>
-          </a:fontRef>
-        </p:style>
-        <p:txBody>
-          <a:bodyPr rtlCol="0" anchor="ctr"/>
-          <a:lstStyle/>
-          <a:p>
-            <a:pPr algn="ctr"/>
-            <a:r>
-              <a:rPr lang="nl-NL" dirty="0" err="1" smtClean="0"/>
-              <a:t>Publish</a:t>
-            </a:r>
-            <a:r>
-              <a:rPr lang="nl-NL" dirty="0" smtClean="0"/>
-              <a:t> </a:t>
-            </a:r>
-            <a:r>
-              <a:rPr lang="nl-NL" dirty="0" err="1" smtClean="0"/>
-              <a:t>from</a:t>
-            </a:r>
-            <a:r>
-              <a:rPr lang="nl-NL" dirty="0" smtClean="0"/>
-              <a:t>:</a:t>
-            </a:r>
-          </a:p>
-          <a:p>
-            <a:pPr algn="ctr"/>
-            <a:r>
-              <a:rPr lang="nl-NL" dirty="0" smtClean="0"/>
-              <a:t>Mediator, BPEL</a:t>
-            </a:r>
-          </a:p>
-          <a:p>
-            <a:pPr algn="ctr"/>
-            <a:r>
-              <a:rPr lang="nl-NL" dirty="0" smtClean="0"/>
-              <a:t>Java Client, ESS, DB?</a:t>
-            </a:r>
-            <a:endParaRPr lang="en-US" dirty="0"/>
           </a:p>
         </p:txBody>
       </p:sp>
@@ -10760,6 +10686,1110 @@
       </p:par>
     </p:tnLst>
   </p:timing>
+</p:sld>
+</file>
+
+<file path=ppt/slides/slide20.xml><?xml version="1.0" encoding="utf-8"?>
+<p:sld xmlns:a="http://schemas.openxmlformats.org/drawingml/2006/main" xmlns:r="http://schemas.openxmlformats.org/officeDocument/2006/relationships" xmlns:p="http://schemas.openxmlformats.org/presentationml/2006/main">
+  <p:cSld>
+    <p:spTree>
+      <p:nvGrpSpPr>
+        <p:cNvPr id="1" name=""/>
+        <p:cNvGrpSpPr/>
+        <p:nvPr/>
+      </p:nvGrpSpPr>
+      <p:grpSpPr>
+        <a:xfrm>
+          <a:off x="0" y="0"/>
+          <a:ext cx="0" cy="0"/>
+          <a:chOff x="0" y="0"/>
+          <a:chExt cx="0" cy="0"/>
+        </a:xfrm>
+      </p:grpSpPr>
+      <p:sp>
+        <p:nvSpPr>
+          <p:cNvPr id="2" name="Title 1"/>
+          <p:cNvSpPr>
+            <a:spLocks noGrp="1"/>
+          </p:cNvSpPr>
+          <p:nvPr>
+            <p:ph type="title"/>
+          </p:nvPr>
+        </p:nvSpPr>
+        <p:spPr/>
+        <p:txBody>
+          <a:bodyPr/>
+          <a:lstStyle/>
+          <a:p>
+            <a:r>
+              <a:rPr lang="nl-NL" dirty="0" err="1" smtClean="0"/>
+              <a:t>Chapter</a:t>
+            </a:r>
+            <a:r>
+              <a:rPr lang="nl-NL" dirty="0" smtClean="0"/>
+              <a:t> 15</a:t>
+            </a:r>
+            <a:endParaRPr lang="en-US" dirty="0"/>
+          </a:p>
+        </p:txBody>
+      </p:sp>
+      <p:sp>
+        <p:nvSpPr>
+          <p:cNvPr id="3" name="Cube 2"/>
+          <p:cNvSpPr/>
+          <p:nvPr/>
+        </p:nvSpPr>
+        <p:spPr>
+          <a:xfrm>
+            <a:off x="3213011" y="2784874"/>
+            <a:ext cx="1728192" cy="1008112"/>
+          </a:xfrm>
+          <a:prstGeom prst="cube">
+            <a:avLst/>
+          </a:prstGeom>
+        </p:spPr>
+        <p:style>
+          <a:lnRef idx="2">
+            <a:schemeClr val="accent1">
+              <a:shade val="50000"/>
+            </a:schemeClr>
+          </a:lnRef>
+          <a:fillRef idx="1">
+            <a:schemeClr val="accent1"/>
+          </a:fillRef>
+          <a:effectRef idx="0">
+            <a:schemeClr val="accent1"/>
+          </a:effectRef>
+          <a:fontRef idx="minor">
+            <a:schemeClr val="lt1"/>
+          </a:fontRef>
+        </p:style>
+        <p:txBody>
+          <a:bodyPr rtlCol="0" anchor="ctr"/>
+          <a:lstStyle/>
+          <a:p>
+            <a:pPr algn="ctr"/>
+            <a:r>
+              <a:rPr lang="nl-NL" dirty="0" err="1" smtClean="0"/>
+              <a:t>FlightStatus</a:t>
+            </a:r>
+            <a:r>
+              <a:rPr lang="nl-NL" dirty="0" smtClean="0"/>
+              <a:t/>
+            </a:r>
+            <a:br>
+              <a:rPr lang="nl-NL" dirty="0" smtClean="0"/>
+            </a:br>
+            <a:r>
+              <a:rPr lang="nl-NL" dirty="0" smtClean="0"/>
+              <a:t>Update event</a:t>
+            </a:r>
+            <a:endParaRPr lang="en-US" dirty="0"/>
+          </a:p>
+        </p:txBody>
+      </p:sp>
+      <p:sp>
+        <p:nvSpPr>
+          <p:cNvPr id="4" name="Lightning Bolt 3"/>
+          <p:cNvSpPr/>
+          <p:nvPr/>
+        </p:nvSpPr>
+        <p:spPr>
+          <a:xfrm>
+            <a:off x="4075789" y="2352826"/>
+            <a:ext cx="576064" cy="648072"/>
+          </a:xfrm>
+          <a:prstGeom prst="lightningBolt">
+            <a:avLst/>
+          </a:prstGeom>
+        </p:spPr>
+        <p:style>
+          <a:lnRef idx="2">
+            <a:schemeClr val="accent6">
+              <a:shade val="50000"/>
+            </a:schemeClr>
+          </a:lnRef>
+          <a:fillRef idx="1">
+            <a:schemeClr val="accent6"/>
+          </a:fillRef>
+          <a:effectRef idx="0">
+            <a:schemeClr val="accent6"/>
+          </a:effectRef>
+          <a:fontRef idx="minor">
+            <a:schemeClr val="lt1"/>
+          </a:fontRef>
+        </p:style>
+        <p:txBody>
+          <a:bodyPr rtlCol="0" anchor="ctr"/>
+          <a:lstStyle/>
+          <a:p>
+            <a:pPr algn="ctr"/>
+            <a:endParaRPr lang="en-US"/>
+          </a:p>
+        </p:txBody>
+      </p:sp>
+      <p:pic>
+        <p:nvPicPr>
+          <p:cNvPr id="13" name="Picture 2"/>
+          <p:cNvPicPr>
+            <a:picLocks noChangeAspect="1" noChangeArrowheads="1"/>
+          </p:cNvPicPr>
+          <p:nvPr/>
+        </p:nvPicPr>
+        <p:blipFill>
+          <a:blip r:embed="rId2">
+            <a:extLst>
+              <a:ext uri="{28A0092B-C50C-407E-A947-70E740481C1C}">
+                <a14:useLocalDpi xmlns:a14="http://schemas.microsoft.com/office/drawing/2010/main" val="0"/>
+              </a:ext>
+            </a:extLst>
+          </a:blip>
+          <a:srcRect/>
+          <a:stretch>
+            <a:fillRect/>
+          </a:stretch>
+        </p:blipFill>
+        <p:spPr bwMode="auto">
+          <a:xfrm>
+            <a:off x="5004048" y="1322402"/>
+            <a:ext cx="3936713" cy="1354460"/>
+          </a:xfrm>
+          <a:prstGeom prst="rect">
+            <a:avLst/>
+          </a:prstGeom>
+          <a:noFill/>
+          <a:ln>
+            <a:noFill/>
+          </a:ln>
+          <a:extLst>
+            <a:ext uri="{909E8E84-426E-40DD-AFC4-6F175D3DCCD1}">
+              <a14:hiddenFill xmlns:a14="http://schemas.microsoft.com/office/drawing/2010/main">
+                <a:solidFill>
+                  <a:schemeClr val="accent1"/>
+                </a:solidFill>
+              </a14:hiddenFill>
+            </a:ext>
+            <a:ext uri="{91240B29-F687-4F45-9708-019B960494DF}">
+              <a14:hiddenLine xmlns:a14="http://schemas.microsoft.com/office/drawing/2010/main" w="9525">
+                <a:solidFill>
+                  <a:schemeClr val="tx1"/>
+                </a:solidFill>
+                <a:miter lim="800000"/>
+                <a:headEnd/>
+                <a:tailEnd/>
+              </a14:hiddenLine>
+            </a:ext>
+          </a:extLst>
+        </p:spPr>
+      </p:pic>
+      <p:sp>
+        <p:nvSpPr>
+          <p:cNvPr id="7" name="Freeform 6"/>
+          <p:cNvSpPr/>
+          <p:nvPr/>
+        </p:nvSpPr>
+        <p:spPr>
+          <a:xfrm>
+            <a:off x="4941203" y="2075175"/>
+            <a:ext cx="1495811" cy="1213756"/>
+          </a:xfrm>
+          <a:custGeom>
+            <a:avLst/>
+            <a:gdLst>
+              <a:gd name="connsiteX0" fmla="*/ 0 w 1303699"/>
+              <a:gd name="connsiteY0" fmla="*/ 1220287 h 1491795"/>
+              <a:gd name="connsiteX1" fmla="*/ 552261 w 1303699"/>
+              <a:gd name="connsiteY1" fmla="*/ 1482838 h 1491795"/>
+              <a:gd name="connsiteX2" fmla="*/ 851026 w 1303699"/>
+              <a:gd name="connsiteY2" fmla="*/ 930576 h 1491795"/>
+              <a:gd name="connsiteX3" fmla="*/ 271604 w 1303699"/>
+              <a:gd name="connsiteY3" fmla="*/ 61444 h 1491795"/>
+              <a:gd name="connsiteX4" fmla="*/ 1303699 w 1303699"/>
+              <a:gd name="connsiteY4" fmla="*/ 70497 h 1491795"/>
+            </a:gdLst>
+            <a:ahLst/>
+            <a:cxnLst>
+              <a:cxn ang="0">
+                <a:pos x="connsiteX0" y="connsiteY0"/>
+              </a:cxn>
+              <a:cxn ang="0">
+                <a:pos x="connsiteX1" y="connsiteY1"/>
+              </a:cxn>
+              <a:cxn ang="0">
+                <a:pos x="connsiteX2" y="connsiteY2"/>
+              </a:cxn>
+              <a:cxn ang="0">
+                <a:pos x="connsiteX3" y="connsiteY3"/>
+              </a:cxn>
+              <a:cxn ang="0">
+                <a:pos x="connsiteX4" y="connsiteY4"/>
+              </a:cxn>
+            </a:cxnLst>
+            <a:rect l="l" t="t" r="r" b="b"/>
+            <a:pathLst>
+              <a:path w="1303699" h="1491795">
+                <a:moveTo>
+                  <a:pt x="0" y="1220287"/>
+                </a:moveTo>
+                <a:cubicBezTo>
+                  <a:pt x="205211" y="1375705"/>
+                  <a:pt x="410423" y="1531123"/>
+                  <a:pt x="552261" y="1482838"/>
+                </a:cubicBezTo>
+                <a:cubicBezTo>
+                  <a:pt x="694099" y="1434553"/>
+                  <a:pt x="897802" y="1167475"/>
+                  <a:pt x="851026" y="930576"/>
+                </a:cubicBezTo>
+                <a:cubicBezTo>
+                  <a:pt x="804250" y="693677"/>
+                  <a:pt x="196159" y="204790"/>
+                  <a:pt x="271604" y="61444"/>
+                </a:cubicBezTo>
+                <a:cubicBezTo>
+                  <a:pt x="347050" y="-81903"/>
+                  <a:pt x="1303699" y="70497"/>
+                  <a:pt x="1303699" y="70497"/>
+                </a:cubicBezTo>
+              </a:path>
+            </a:pathLst>
+          </a:custGeom>
+          <a:noFill/>
+          <a:ln>
+            <a:prstDash val="sysDash"/>
+          </a:ln>
+        </p:spPr>
+        <p:style>
+          <a:lnRef idx="2">
+            <a:schemeClr val="accent1">
+              <a:shade val="50000"/>
+            </a:schemeClr>
+          </a:lnRef>
+          <a:fillRef idx="1">
+            <a:schemeClr val="accent1"/>
+          </a:fillRef>
+          <a:effectRef idx="0">
+            <a:schemeClr val="accent1"/>
+          </a:effectRef>
+          <a:fontRef idx="minor">
+            <a:schemeClr val="lt1"/>
+          </a:fontRef>
+        </p:style>
+        <p:txBody>
+          <a:bodyPr rtlCol="0" anchor="ctr"/>
+          <a:lstStyle/>
+          <a:p>
+            <a:pPr algn="ctr"/>
+            <a:endParaRPr lang="en-US"/>
+          </a:p>
+        </p:txBody>
+      </p:sp>
+      <p:pic>
+        <p:nvPicPr>
+          <p:cNvPr id="2050" name="Picture 2"/>
+          <p:cNvPicPr>
+            <a:picLocks noChangeAspect="1" noChangeArrowheads="1"/>
+          </p:cNvPicPr>
+          <p:nvPr/>
+        </p:nvPicPr>
+        <p:blipFill>
+          <a:blip r:embed="rId3">
+            <a:extLst>
+              <a:ext uri="{28A0092B-C50C-407E-A947-70E740481C1C}">
+                <a14:useLocalDpi xmlns:a14="http://schemas.microsoft.com/office/drawing/2010/main" val="0"/>
+              </a:ext>
+            </a:extLst>
+          </a:blip>
+          <a:srcRect/>
+          <a:stretch>
+            <a:fillRect/>
+          </a:stretch>
+        </p:blipFill>
+        <p:spPr bwMode="auto">
+          <a:xfrm>
+            <a:off x="-180528" y="5152020"/>
+            <a:ext cx="4930775" cy="1463675"/>
+          </a:xfrm>
+          <a:prstGeom prst="rect">
+            <a:avLst/>
+          </a:prstGeom>
+          <a:noFill/>
+          <a:ln>
+            <a:noFill/>
+          </a:ln>
+          <a:extLst>
+            <a:ext uri="{909E8E84-426E-40DD-AFC4-6F175D3DCCD1}">
+              <a14:hiddenFill xmlns:a14="http://schemas.microsoft.com/office/drawing/2010/main">
+                <a:solidFill>
+                  <a:schemeClr val="accent1"/>
+                </a:solidFill>
+              </a14:hiddenFill>
+            </a:ext>
+            <a:ext uri="{91240B29-F687-4F45-9708-019B960494DF}">
+              <a14:hiddenLine xmlns:a14="http://schemas.microsoft.com/office/drawing/2010/main" w="9525">
+                <a:solidFill>
+                  <a:schemeClr val="tx1"/>
+                </a:solidFill>
+                <a:miter lim="800000"/>
+                <a:headEnd/>
+                <a:tailEnd/>
+              </a14:hiddenLine>
+            </a:ext>
+          </a:extLst>
+        </p:spPr>
+      </p:pic>
+      <p:sp>
+        <p:nvSpPr>
+          <p:cNvPr id="8" name="Rounded Rectangle 7"/>
+          <p:cNvSpPr/>
+          <p:nvPr/>
+        </p:nvSpPr>
+        <p:spPr>
+          <a:xfrm>
+            <a:off x="2458134" y="4725144"/>
+            <a:ext cx="2051021" cy="504056"/>
+          </a:xfrm>
+          <a:prstGeom prst="roundRect">
+            <a:avLst/>
+          </a:prstGeom>
+        </p:spPr>
+        <p:style>
+          <a:lnRef idx="1">
+            <a:schemeClr val="accent1"/>
+          </a:lnRef>
+          <a:fillRef idx="2">
+            <a:schemeClr val="accent1"/>
+          </a:fillRef>
+          <a:effectRef idx="1">
+            <a:schemeClr val="accent1"/>
+          </a:effectRef>
+          <a:fontRef idx="minor">
+            <a:schemeClr val="dk1"/>
+          </a:fontRef>
+        </p:style>
+        <p:txBody>
+          <a:bodyPr rtlCol="0" anchor="ctr"/>
+          <a:lstStyle/>
+          <a:p>
+            <a:pPr algn="ctr"/>
+            <a:r>
+              <a:rPr lang="nl-NL" dirty="0" smtClean="0"/>
+              <a:t>Java Class</a:t>
+            </a:r>
+          </a:p>
+          <a:p>
+            <a:pPr algn="ctr"/>
+            <a:r>
+              <a:rPr lang="en-US" dirty="0" err="1"/>
+              <a:t>EDNEventPublisher</a:t>
+            </a:r>
+            <a:endParaRPr lang="en-US" dirty="0"/>
+          </a:p>
+        </p:txBody>
+      </p:sp>
+      <p:cxnSp>
+        <p:nvCxnSpPr>
+          <p:cNvPr id="17" name="Straight Arrow Connector 16"/>
+          <p:cNvCxnSpPr/>
+          <p:nvPr/>
+        </p:nvCxnSpPr>
+        <p:spPr>
+          <a:xfrm flipV="1">
+            <a:off x="2646730" y="5229200"/>
+            <a:ext cx="432048" cy="654657"/>
+          </a:xfrm>
+          <a:prstGeom prst="straightConnector1">
+            <a:avLst/>
+          </a:prstGeom>
+          <a:ln>
+            <a:tailEnd type="arrow"/>
+          </a:ln>
+        </p:spPr>
+        <p:style>
+          <a:lnRef idx="1">
+            <a:schemeClr val="dk1"/>
+          </a:lnRef>
+          <a:fillRef idx="0">
+            <a:schemeClr val="dk1"/>
+          </a:fillRef>
+          <a:effectRef idx="0">
+            <a:schemeClr val="dk1"/>
+          </a:effectRef>
+          <a:fontRef idx="minor">
+            <a:schemeClr val="tx1"/>
+          </a:fontRef>
+        </p:style>
+      </p:cxnSp>
+      <p:sp>
+        <p:nvSpPr>
+          <p:cNvPr id="18" name="Freeform 17"/>
+          <p:cNvSpPr/>
+          <p:nvPr/>
+        </p:nvSpPr>
+        <p:spPr>
+          <a:xfrm>
+            <a:off x="2023780" y="3553653"/>
+            <a:ext cx="1834675" cy="1163202"/>
+          </a:xfrm>
+          <a:custGeom>
+            <a:avLst/>
+            <a:gdLst>
+              <a:gd name="connsiteX0" fmla="*/ 1834675 w 1834675"/>
+              <a:gd name="connsiteY0" fmla="*/ 1163202 h 1163202"/>
+              <a:gd name="connsiteX1" fmla="*/ 1490643 w 1834675"/>
+              <a:gd name="connsiteY1" fmla="*/ 647155 h 1163202"/>
+              <a:gd name="connsiteX2" fmla="*/ 23982 w 1834675"/>
+              <a:gd name="connsiteY2" fmla="*/ 945919 h 1163202"/>
+              <a:gd name="connsiteX3" fmla="*/ 621511 w 1834675"/>
+              <a:gd name="connsiteY3" fmla="*/ 122054 h 1163202"/>
+              <a:gd name="connsiteX4" fmla="*/ 1173772 w 1834675"/>
+              <a:gd name="connsiteY4" fmla="*/ 4359 h 1163202"/>
+            </a:gdLst>
+            <a:ahLst/>
+            <a:cxnLst>
+              <a:cxn ang="0">
+                <a:pos x="connsiteX0" y="connsiteY0"/>
+              </a:cxn>
+              <a:cxn ang="0">
+                <a:pos x="connsiteX1" y="connsiteY1"/>
+              </a:cxn>
+              <a:cxn ang="0">
+                <a:pos x="connsiteX2" y="connsiteY2"/>
+              </a:cxn>
+              <a:cxn ang="0">
+                <a:pos x="connsiteX3" y="connsiteY3"/>
+              </a:cxn>
+              <a:cxn ang="0">
+                <a:pos x="connsiteX4" y="connsiteY4"/>
+              </a:cxn>
+            </a:cxnLst>
+            <a:rect l="l" t="t" r="r" b="b"/>
+            <a:pathLst>
+              <a:path w="1834675" h="1163202">
+                <a:moveTo>
+                  <a:pt x="1834675" y="1163202"/>
+                </a:moveTo>
+                <a:cubicBezTo>
+                  <a:pt x="1813550" y="923285"/>
+                  <a:pt x="1792425" y="683369"/>
+                  <a:pt x="1490643" y="647155"/>
+                </a:cubicBezTo>
+                <a:cubicBezTo>
+                  <a:pt x="1188861" y="610941"/>
+                  <a:pt x="168837" y="1033436"/>
+                  <a:pt x="23982" y="945919"/>
+                </a:cubicBezTo>
+                <a:cubicBezTo>
+                  <a:pt x="-120873" y="858402"/>
+                  <a:pt x="429879" y="278981"/>
+                  <a:pt x="621511" y="122054"/>
+                </a:cubicBezTo>
+                <a:cubicBezTo>
+                  <a:pt x="813143" y="-34873"/>
+                  <a:pt x="1173772" y="4359"/>
+                  <a:pt x="1173772" y="4359"/>
+                </a:cubicBezTo>
+              </a:path>
+            </a:pathLst>
+          </a:custGeom>
+          <a:noFill/>
+          <a:ln>
+            <a:prstDash val="sysDash"/>
+            <a:headEnd type="none" w="med" len="med"/>
+            <a:tailEnd type="arrow" w="med" len="med"/>
+          </a:ln>
+        </p:spPr>
+        <p:style>
+          <a:lnRef idx="2">
+            <a:schemeClr val="accent1">
+              <a:shade val="50000"/>
+            </a:schemeClr>
+          </a:lnRef>
+          <a:fillRef idx="1">
+            <a:schemeClr val="accent1"/>
+          </a:fillRef>
+          <a:effectRef idx="0">
+            <a:schemeClr val="accent1"/>
+          </a:effectRef>
+          <a:fontRef idx="minor">
+            <a:schemeClr val="lt1"/>
+          </a:fontRef>
+        </p:style>
+        <p:txBody>
+          <a:bodyPr rtlCol="0" anchor="ctr"/>
+          <a:lstStyle/>
+          <a:p>
+            <a:pPr algn="ctr"/>
+            <a:endParaRPr lang="en-US"/>
+          </a:p>
+        </p:txBody>
+      </p:sp>
+      <p:pic>
+        <p:nvPicPr>
+          <p:cNvPr id="2051" name="Picture 3"/>
+          <p:cNvPicPr>
+            <a:picLocks noChangeAspect="1" noChangeArrowheads="1"/>
+          </p:cNvPicPr>
+          <p:nvPr/>
+        </p:nvPicPr>
+        <p:blipFill>
+          <a:blip r:embed="rId4">
+            <a:extLst>
+              <a:ext uri="{28A0092B-C50C-407E-A947-70E740481C1C}">
+                <a14:useLocalDpi xmlns:a14="http://schemas.microsoft.com/office/drawing/2010/main" val="0"/>
+              </a:ext>
+            </a:extLst>
+          </a:blip>
+          <a:srcRect/>
+          <a:stretch>
+            <a:fillRect/>
+          </a:stretch>
+        </p:blipFill>
+        <p:spPr bwMode="auto">
+          <a:xfrm>
+            <a:off x="5076056" y="4605186"/>
+            <a:ext cx="4251632" cy="1378067"/>
+          </a:xfrm>
+          <a:prstGeom prst="rect">
+            <a:avLst/>
+          </a:prstGeom>
+          <a:noFill/>
+          <a:ln>
+            <a:noFill/>
+          </a:ln>
+          <a:extLst>
+            <a:ext uri="{909E8E84-426E-40DD-AFC4-6F175D3DCCD1}">
+              <a14:hiddenFill xmlns:a14="http://schemas.microsoft.com/office/drawing/2010/main">
+                <a:solidFill>
+                  <a:schemeClr val="accent1"/>
+                </a:solidFill>
+              </a14:hiddenFill>
+            </a:ext>
+            <a:ext uri="{91240B29-F687-4F45-9708-019B960494DF}">
+              <a14:hiddenLine xmlns:a14="http://schemas.microsoft.com/office/drawing/2010/main" w="9525">
+                <a:solidFill>
+                  <a:schemeClr val="tx1"/>
+                </a:solidFill>
+                <a:miter lim="800000"/>
+                <a:headEnd/>
+                <a:tailEnd/>
+              </a14:hiddenLine>
+            </a:ext>
+          </a:extLst>
+        </p:spPr>
+      </p:pic>
+      <p:sp>
+        <p:nvSpPr>
+          <p:cNvPr id="19" name="Freeform 18"/>
+          <p:cNvSpPr/>
+          <p:nvPr/>
+        </p:nvSpPr>
+        <p:spPr>
+          <a:xfrm>
+            <a:off x="4941203" y="3573016"/>
+            <a:ext cx="1443489" cy="1792587"/>
+          </a:xfrm>
+          <a:custGeom>
+            <a:avLst/>
+            <a:gdLst>
+              <a:gd name="connsiteX0" fmla="*/ 0 w 1260431"/>
+              <a:gd name="connsiteY0" fmla="*/ 0 h 1792587"/>
+              <a:gd name="connsiteX1" fmla="*/ 1059256 w 1260431"/>
+              <a:gd name="connsiteY1" fmla="*/ 362139 h 1792587"/>
+              <a:gd name="connsiteX2" fmla="*/ 1176951 w 1260431"/>
+              <a:gd name="connsiteY2" fmla="*/ 642796 h 1792587"/>
+              <a:gd name="connsiteX3" fmla="*/ 117695 w 1260431"/>
+              <a:gd name="connsiteY3" fmla="*/ 606583 h 1792587"/>
+              <a:gd name="connsiteX4" fmla="*/ 217284 w 1260431"/>
+              <a:gd name="connsiteY4" fmla="*/ 1792587 h 1792587"/>
+            </a:gdLst>
+            <a:ahLst/>
+            <a:cxnLst>
+              <a:cxn ang="0">
+                <a:pos x="connsiteX0" y="connsiteY0"/>
+              </a:cxn>
+              <a:cxn ang="0">
+                <a:pos x="connsiteX1" y="connsiteY1"/>
+              </a:cxn>
+              <a:cxn ang="0">
+                <a:pos x="connsiteX2" y="connsiteY2"/>
+              </a:cxn>
+              <a:cxn ang="0">
+                <a:pos x="connsiteX3" y="connsiteY3"/>
+              </a:cxn>
+              <a:cxn ang="0">
+                <a:pos x="connsiteX4" y="connsiteY4"/>
+              </a:cxn>
+            </a:cxnLst>
+            <a:rect l="l" t="t" r="r" b="b"/>
+            <a:pathLst>
+              <a:path w="1260431" h="1792587">
+                <a:moveTo>
+                  <a:pt x="0" y="0"/>
+                </a:moveTo>
+                <a:cubicBezTo>
+                  <a:pt x="431549" y="127503"/>
+                  <a:pt x="863098" y="255006"/>
+                  <a:pt x="1059256" y="362139"/>
+                </a:cubicBezTo>
+                <a:cubicBezTo>
+                  <a:pt x="1255414" y="469272"/>
+                  <a:pt x="1333878" y="602055"/>
+                  <a:pt x="1176951" y="642796"/>
+                </a:cubicBezTo>
+                <a:cubicBezTo>
+                  <a:pt x="1020024" y="683537"/>
+                  <a:pt x="277640" y="414951"/>
+                  <a:pt x="117695" y="606583"/>
+                </a:cubicBezTo>
+                <a:cubicBezTo>
+                  <a:pt x="-42250" y="798215"/>
+                  <a:pt x="217284" y="1792587"/>
+                  <a:pt x="217284" y="1792587"/>
+                </a:cubicBezTo>
+              </a:path>
+            </a:pathLst>
+          </a:custGeom>
+          <a:noFill/>
+          <a:ln>
+            <a:prstDash val="sysDash"/>
+          </a:ln>
+        </p:spPr>
+        <p:style>
+          <a:lnRef idx="2">
+            <a:schemeClr val="accent1">
+              <a:shade val="50000"/>
+            </a:schemeClr>
+          </a:lnRef>
+          <a:fillRef idx="1">
+            <a:schemeClr val="accent1"/>
+          </a:fillRef>
+          <a:effectRef idx="0">
+            <a:schemeClr val="accent1"/>
+          </a:effectRef>
+          <a:fontRef idx="minor">
+            <a:schemeClr val="lt1"/>
+          </a:fontRef>
+        </p:style>
+        <p:txBody>
+          <a:bodyPr rtlCol="0" anchor="ctr"/>
+          <a:lstStyle/>
+          <a:p>
+            <a:pPr algn="ctr"/>
+            <a:endParaRPr lang="en-US"/>
+          </a:p>
+        </p:txBody>
+      </p:sp>
+      <p:sp>
+        <p:nvSpPr>
+          <p:cNvPr id="22" name="Rounded Rectangle 21"/>
+          <p:cNvSpPr/>
+          <p:nvPr/>
+        </p:nvSpPr>
+        <p:spPr>
+          <a:xfrm>
+            <a:off x="6985475" y="3226802"/>
+            <a:ext cx="2051021" cy="922278"/>
+          </a:xfrm>
+          <a:prstGeom prst="roundRect">
+            <a:avLst/>
+          </a:prstGeom>
+        </p:spPr>
+        <p:style>
+          <a:lnRef idx="1">
+            <a:schemeClr val="accent1"/>
+          </a:lnRef>
+          <a:fillRef idx="2">
+            <a:schemeClr val="accent1"/>
+          </a:fillRef>
+          <a:effectRef idx="1">
+            <a:schemeClr val="accent1"/>
+          </a:effectRef>
+          <a:fontRef idx="minor">
+            <a:schemeClr val="dk1"/>
+          </a:fontRef>
+        </p:style>
+        <p:txBody>
+          <a:bodyPr rtlCol="0" anchor="ctr"/>
+          <a:lstStyle/>
+          <a:p>
+            <a:pPr algn="ctr"/>
+            <a:r>
+              <a:rPr lang="nl-NL" dirty="0" smtClean="0"/>
+              <a:t>Java Class</a:t>
+            </a:r>
+          </a:p>
+          <a:p>
+            <a:pPr algn="ctr"/>
+            <a:r>
+              <a:rPr lang="en-US" dirty="0" err="1"/>
+              <a:t>FlightStatusUpdateEventSubscriber</a:t>
+            </a:r>
+            <a:endParaRPr lang="en-US" dirty="0"/>
+          </a:p>
+        </p:txBody>
+      </p:sp>
+      <p:sp>
+        <p:nvSpPr>
+          <p:cNvPr id="20" name="Rounded Rectangle 19"/>
+          <p:cNvSpPr/>
+          <p:nvPr/>
+        </p:nvSpPr>
+        <p:spPr>
+          <a:xfrm>
+            <a:off x="6556890" y="3226802"/>
+            <a:ext cx="535390" cy="994286"/>
+          </a:xfrm>
+          <a:prstGeom prst="roundRect">
+            <a:avLst/>
+          </a:prstGeom>
+        </p:spPr>
+        <p:style>
+          <a:lnRef idx="2">
+            <a:schemeClr val="accent1">
+              <a:shade val="50000"/>
+            </a:schemeClr>
+          </a:lnRef>
+          <a:fillRef idx="1">
+            <a:schemeClr val="accent1"/>
+          </a:fillRef>
+          <a:effectRef idx="0">
+            <a:schemeClr val="accent1"/>
+          </a:effectRef>
+          <a:fontRef idx="minor">
+            <a:schemeClr val="lt1"/>
+          </a:fontRef>
+        </p:style>
+        <p:txBody>
+          <a:bodyPr rtlCol="0" anchor="ctr"/>
+          <a:lstStyle/>
+          <a:p>
+            <a:pPr algn="ctr"/>
+            <a:r>
+              <a:rPr lang="nl-NL" sz="1200" dirty="0" smtClean="0"/>
+              <a:t>EDN API</a:t>
+            </a:r>
+            <a:endParaRPr lang="en-US" sz="1200" dirty="0"/>
+          </a:p>
+        </p:txBody>
+      </p:sp>
+      <p:sp>
+        <p:nvSpPr>
+          <p:cNvPr id="21" name="Freeform 20"/>
+          <p:cNvSpPr/>
+          <p:nvPr/>
+        </p:nvSpPr>
+        <p:spPr>
+          <a:xfrm>
+            <a:off x="4941203" y="3284984"/>
+            <a:ext cx="2346837" cy="430670"/>
+          </a:xfrm>
+          <a:custGeom>
+            <a:avLst/>
+            <a:gdLst>
+              <a:gd name="connsiteX0" fmla="*/ 0 w 2055137"/>
+              <a:gd name="connsiteY0" fmla="*/ 74832 h 430670"/>
+              <a:gd name="connsiteX1" fmla="*/ 896293 w 2055137"/>
+              <a:gd name="connsiteY1" fmla="*/ 418864 h 430670"/>
+              <a:gd name="connsiteX2" fmla="*/ 1032095 w 2055137"/>
+              <a:gd name="connsiteY2" fmla="*/ 319276 h 430670"/>
+              <a:gd name="connsiteX3" fmla="*/ 878186 w 2055137"/>
+              <a:gd name="connsiteY3" fmla="*/ 11458 h 430670"/>
+              <a:gd name="connsiteX4" fmla="*/ 1321806 w 2055137"/>
+              <a:gd name="connsiteY4" fmla="*/ 65779 h 430670"/>
+              <a:gd name="connsiteX5" fmla="*/ 2055137 w 2055137"/>
+              <a:gd name="connsiteY5" fmla="*/ 65779 h 430670"/>
+            </a:gdLst>
+            <a:ahLst/>
+            <a:cxnLst>
+              <a:cxn ang="0">
+                <a:pos x="connsiteX0" y="connsiteY0"/>
+              </a:cxn>
+              <a:cxn ang="0">
+                <a:pos x="connsiteX1" y="connsiteY1"/>
+              </a:cxn>
+              <a:cxn ang="0">
+                <a:pos x="connsiteX2" y="connsiteY2"/>
+              </a:cxn>
+              <a:cxn ang="0">
+                <a:pos x="connsiteX3" y="connsiteY3"/>
+              </a:cxn>
+              <a:cxn ang="0">
+                <a:pos x="connsiteX4" y="connsiteY4"/>
+              </a:cxn>
+              <a:cxn ang="0">
+                <a:pos x="connsiteX5" y="connsiteY5"/>
+              </a:cxn>
+            </a:cxnLst>
+            <a:rect l="l" t="t" r="r" b="b"/>
+            <a:pathLst>
+              <a:path w="2055137" h="430670">
+                <a:moveTo>
+                  <a:pt x="0" y="74832"/>
+                </a:moveTo>
+                <a:cubicBezTo>
+                  <a:pt x="362138" y="226477"/>
+                  <a:pt x="724277" y="378123"/>
+                  <a:pt x="896293" y="418864"/>
+                </a:cubicBezTo>
+                <a:cubicBezTo>
+                  <a:pt x="1068309" y="459605"/>
+                  <a:pt x="1035113" y="387177"/>
+                  <a:pt x="1032095" y="319276"/>
+                </a:cubicBezTo>
+                <a:cubicBezTo>
+                  <a:pt x="1029077" y="251375"/>
+                  <a:pt x="829901" y="53707"/>
+                  <a:pt x="878186" y="11458"/>
+                </a:cubicBezTo>
+                <a:cubicBezTo>
+                  <a:pt x="926471" y="-30791"/>
+                  <a:pt x="1125648" y="56726"/>
+                  <a:pt x="1321806" y="65779"/>
+                </a:cubicBezTo>
+                <a:cubicBezTo>
+                  <a:pt x="1517964" y="74832"/>
+                  <a:pt x="2055137" y="65779"/>
+                  <a:pt x="2055137" y="65779"/>
+                </a:cubicBezTo>
+              </a:path>
+            </a:pathLst>
+          </a:custGeom>
+          <a:noFill/>
+          <a:ln>
+            <a:prstDash val="sysDash"/>
+          </a:ln>
+        </p:spPr>
+        <p:style>
+          <a:lnRef idx="2">
+            <a:schemeClr val="accent1">
+              <a:shade val="50000"/>
+            </a:schemeClr>
+          </a:lnRef>
+          <a:fillRef idx="1">
+            <a:schemeClr val="accent1"/>
+          </a:fillRef>
+          <a:effectRef idx="0">
+            <a:schemeClr val="accent1"/>
+          </a:effectRef>
+          <a:fontRef idx="minor">
+            <a:schemeClr val="lt1"/>
+          </a:fontRef>
+        </p:style>
+        <p:txBody>
+          <a:bodyPr rtlCol="0" anchor="ctr"/>
+          <a:lstStyle/>
+          <a:p>
+            <a:pPr algn="ctr"/>
+            <a:endParaRPr lang="en-US"/>
+          </a:p>
+        </p:txBody>
+      </p:sp>
+      <p:sp>
+        <p:nvSpPr>
+          <p:cNvPr id="25" name="Rounded Rectangle 24"/>
+          <p:cNvSpPr/>
+          <p:nvPr/>
+        </p:nvSpPr>
+        <p:spPr>
+          <a:xfrm>
+            <a:off x="168612" y="1538493"/>
+            <a:ext cx="2051021" cy="922278"/>
+          </a:xfrm>
+          <a:prstGeom prst="roundRect">
+            <a:avLst/>
+          </a:prstGeom>
+        </p:spPr>
+        <p:style>
+          <a:lnRef idx="1">
+            <a:schemeClr val="accent1"/>
+          </a:lnRef>
+          <a:fillRef idx="2">
+            <a:schemeClr val="accent1"/>
+          </a:fillRef>
+          <a:effectRef idx="1">
+            <a:schemeClr val="accent1"/>
+          </a:effectRef>
+          <a:fontRef idx="minor">
+            <a:schemeClr val="dk1"/>
+          </a:fontRef>
+        </p:style>
+        <p:txBody>
+          <a:bodyPr rtlCol="0" anchor="ctr"/>
+          <a:lstStyle/>
+          <a:p>
+            <a:pPr algn="ctr"/>
+            <a:r>
+              <a:rPr lang="nl-NL" dirty="0" smtClean="0"/>
+              <a:t>Java Class</a:t>
+            </a:r>
+          </a:p>
+          <a:p>
+            <a:pPr algn="ctr"/>
+            <a:r>
+              <a:rPr lang="en-US" dirty="0" err="1"/>
+              <a:t>FlightStatusUpdateEventPublisher</a:t>
+            </a:r>
+            <a:endParaRPr lang="en-US" dirty="0"/>
+          </a:p>
+        </p:txBody>
+      </p:sp>
+      <p:sp>
+        <p:nvSpPr>
+          <p:cNvPr id="26" name="Rounded Rectangle 25"/>
+          <p:cNvSpPr/>
+          <p:nvPr/>
+        </p:nvSpPr>
+        <p:spPr>
+          <a:xfrm>
+            <a:off x="2219633" y="1538493"/>
+            <a:ext cx="535390" cy="994286"/>
+          </a:xfrm>
+          <a:prstGeom prst="roundRect">
+            <a:avLst/>
+          </a:prstGeom>
+        </p:spPr>
+        <p:style>
+          <a:lnRef idx="2">
+            <a:schemeClr val="accent1">
+              <a:shade val="50000"/>
+            </a:schemeClr>
+          </a:lnRef>
+          <a:fillRef idx="1">
+            <a:schemeClr val="accent1"/>
+          </a:fillRef>
+          <a:effectRef idx="0">
+            <a:schemeClr val="accent1"/>
+          </a:effectRef>
+          <a:fontRef idx="minor">
+            <a:schemeClr val="lt1"/>
+          </a:fontRef>
+        </p:style>
+        <p:txBody>
+          <a:bodyPr rtlCol="0" anchor="ctr"/>
+          <a:lstStyle/>
+          <a:p>
+            <a:pPr algn="ctr"/>
+            <a:r>
+              <a:rPr lang="nl-NL" sz="1200" dirty="0" smtClean="0"/>
+              <a:t>EDN API</a:t>
+            </a:r>
+            <a:endParaRPr lang="en-US" sz="1200" dirty="0"/>
+          </a:p>
+        </p:txBody>
+      </p:sp>
+      <p:sp>
+        <p:nvSpPr>
+          <p:cNvPr id="23" name="Freeform 22"/>
+          <p:cNvSpPr/>
+          <p:nvPr/>
+        </p:nvSpPr>
+        <p:spPr>
+          <a:xfrm>
+            <a:off x="1921014" y="1610979"/>
+            <a:ext cx="1294645" cy="1566787"/>
+          </a:xfrm>
+          <a:custGeom>
+            <a:avLst/>
+            <a:gdLst>
+              <a:gd name="connsiteX0" fmla="*/ 0 w 1294645"/>
+              <a:gd name="connsiteY0" fmla="*/ 163500 h 1566787"/>
+              <a:gd name="connsiteX1" fmla="*/ 316871 w 1294645"/>
+              <a:gd name="connsiteY1" fmla="*/ 136340 h 1566787"/>
+              <a:gd name="connsiteX2" fmla="*/ 1113576 w 1294645"/>
+              <a:gd name="connsiteY2" fmla="*/ 63912 h 1566787"/>
+              <a:gd name="connsiteX3" fmla="*/ 959667 w 1294645"/>
+              <a:gd name="connsiteY3" fmla="*/ 1168435 h 1566787"/>
+              <a:gd name="connsiteX4" fmla="*/ 1294645 w 1294645"/>
+              <a:gd name="connsiteY4" fmla="*/ 1566787 h 1566787"/>
+            </a:gdLst>
+            <a:ahLst/>
+            <a:cxnLst>
+              <a:cxn ang="0">
+                <a:pos x="connsiteX0" y="connsiteY0"/>
+              </a:cxn>
+              <a:cxn ang="0">
+                <a:pos x="connsiteX1" y="connsiteY1"/>
+              </a:cxn>
+              <a:cxn ang="0">
+                <a:pos x="connsiteX2" y="connsiteY2"/>
+              </a:cxn>
+              <a:cxn ang="0">
+                <a:pos x="connsiteX3" y="connsiteY3"/>
+              </a:cxn>
+              <a:cxn ang="0">
+                <a:pos x="connsiteX4" y="connsiteY4"/>
+              </a:cxn>
+            </a:cxnLst>
+            <a:rect l="l" t="t" r="r" b="b"/>
+            <a:pathLst>
+              <a:path w="1294645" h="1566787">
+                <a:moveTo>
+                  <a:pt x="0" y="163500"/>
+                </a:moveTo>
+                <a:lnTo>
+                  <a:pt x="316871" y="136340"/>
+                </a:lnTo>
+                <a:cubicBezTo>
+                  <a:pt x="502467" y="119742"/>
+                  <a:pt x="1006443" y="-108104"/>
+                  <a:pt x="1113576" y="63912"/>
+                </a:cubicBezTo>
+                <a:cubicBezTo>
+                  <a:pt x="1220709" y="235928"/>
+                  <a:pt x="929489" y="917956"/>
+                  <a:pt x="959667" y="1168435"/>
+                </a:cubicBezTo>
+                <a:cubicBezTo>
+                  <a:pt x="989845" y="1418914"/>
+                  <a:pt x="1294645" y="1566787"/>
+                  <a:pt x="1294645" y="1566787"/>
+                </a:cubicBezTo>
+              </a:path>
+            </a:pathLst>
+          </a:custGeom>
+          <a:noFill/>
+          <a:ln>
+            <a:prstDash val="sysDash"/>
+            <a:headEnd type="none" w="med" len="med"/>
+            <a:tailEnd type="arrow" w="med" len="med"/>
+          </a:ln>
+        </p:spPr>
+        <p:style>
+          <a:lnRef idx="2">
+            <a:schemeClr val="accent1">
+              <a:shade val="50000"/>
+            </a:schemeClr>
+          </a:lnRef>
+          <a:fillRef idx="1">
+            <a:schemeClr val="accent1"/>
+          </a:fillRef>
+          <a:effectRef idx="0">
+            <a:schemeClr val="accent1"/>
+          </a:effectRef>
+          <a:fontRef idx="minor">
+            <a:schemeClr val="lt1"/>
+          </a:fontRef>
+        </p:style>
+        <p:txBody>
+          <a:bodyPr rtlCol="0" anchor="ctr"/>
+          <a:lstStyle/>
+          <a:p>
+            <a:pPr algn="ctr"/>
+            <a:endParaRPr lang="en-US"/>
+          </a:p>
+        </p:txBody>
+      </p:sp>
+    </p:spTree>
+    <p:extLst>
+      <p:ext uri="{BB962C8B-B14F-4D97-AF65-F5344CB8AC3E}">
+        <p14:creationId xmlns:p14="http://schemas.microsoft.com/office/powerpoint/2010/main" val="2597445144"/>
+      </p:ext>
+    </p:extLst>
+  </p:cSld>
+  <p:clrMapOvr>
+    <a:masterClrMapping/>
+  </p:clrMapOvr>
 </p:sld>
 </file>
 

</xml_diff>

<commit_message>
Updated Chapter 15 overviews
</commit_message>
<xml_diff>
--- a/ChapterOverviews_picturesOfService.pptx
+++ b/ChapterOverviews_picturesOfService.pptx
@@ -25,6 +25,7 @@
     <p:sldId id="274" r:id="rId19"/>
     <p:sldId id="275" r:id="rId20"/>
     <p:sldId id="276" r:id="rId21"/>
+    <p:sldId id="277" r:id="rId22"/>
   </p:sldIdLst>
   <p:sldSz cx="9144000" cy="6858000" type="screen4x3"/>
   <p:notesSz cx="6858000" cy="9144000"/>
@@ -8738,138 +8739,16 @@
           <a:chExt cx="0" cy="0"/>
         </a:xfrm>
       </p:grpSpPr>
-      <p:sp>
-        <p:nvSpPr>
-          <p:cNvPr id="2" name="Title 1"/>
-          <p:cNvSpPr>
-            <a:spLocks noGrp="1"/>
-          </p:cNvSpPr>
-          <p:nvPr>
-            <p:ph type="title"/>
-          </p:nvPr>
-        </p:nvSpPr>
-        <p:spPr/>
-        <p:txBody>
-          <a:bodyPr/>
-          <a:lstStyle/>
-          <a:p>
-            <a:r>
-              <a:rPr lang="nl-NL" dirty="0" err="1" smtClean="0"/>
-              <a:t>Chapter</a:t>
-            </a:r>
-            <a:r>
-              <a:rPr lang="nl-NL" dirty="0" smtClean="0"/>
-              <a:t> 15</a:t>
-            </a:r>
-            <a:endParaRPr lang="en-US" dirty="0"/>
-          </a:p>
-        </p:txBody>
-      </p:sp>
-      <p:sp>
-        <p:nvSpPr>
-          <p:cNvPr id="3" name="Cube 2"/>
-          <p:cNvSpPr/>
-          <p:nvPr/>
-        </p:nvSpPr>
-        <p:spPr>
-          <a:xfrm>
-            <a:off x="2741031" y="5517232"/>
-            <a:ext cx="1728192" cy="1008112"/>
-          </a:xfrm>
-          <a:prstGeom prst="cube">
-            <a:avLst/>
-          </a:prstGeom>
-        </p:spPr>
-        <p:style>
-          <a:lnRef idx="2">
-            <a:schemeClr val="accent1">
-              <a:shade val="50000"/>
-            </a:schemeClr>
-          </a:lnRef>
-          <a:fillRef idx="1">
-            <a:schemeClr val="accent1"/>
-          </a:fillRef>
-          <a:effectRef idx="0">
-            <a:schemeClr val="accent1"/>
-          </a:effectRef>
-          <a:fontRef idx="minor">
-            <a:schemeClr val="lt1"/>
-          </a:fontRef>
-        </p:style>
-        <p:txBody>
-          <a:bodyPr rtlCol="0" anchor="ctr"/>
-          <a:lstStyle/>
-          <a:p>
-            <a:pPr algn="ctr"/>
-            <a:r>
-              <a:rPr lang="nl-NL" dirty="0" err="1" smtClean="0"/>
-              <a:t>FlightStatus</a:t>
-            </a:r>
-            <a:r>
-              <a:rPr lang="nl-NL" dirty="0" smtClean="0"/>
-              <a:t/>
-            </a:r>
-            <a:br>
-              <a:rPr lang="nl-NL" dirty="0" smtClean="0"/>
-            </a:br>
-            <a:r>
-              <a:rPr lang="nl-NL" dirty="0" smtClean="0"/>
-              <a:t>Update event</a:t>
-            </a:r>
-            <a:endParaRPr lang="en-US" dirty="0"/>
-          </a:p>
-        </p:txBody>
-      </p:sp>
-      <p:sp>
-        <p:nvSpPr>
-          <p:cNvPr id="4" name="Lightning Bolt 3"/>
-          <p:cNvSpPr/>
-          <p:nvPr/>
-        </p:nvSpPr>
-        <p:spPr>
-          <a:xfrm>
-            <a:off x="3603809" y="5085184"/>
-            <a:ext cx="576064" cy="648072"/>
-          </a:xfrm>
-          <a:prstGeom prst="lightningBolt">
-            <a:avLst/>
-          </a:prstGeom>
-        </p:spPr>
-        <p:style>
-          <a:lnRef idx="2">
-            <a:schemeClr val="accent6">
-              <a:shade val="50000"/>
-            </a:schemeClr>
-          </a:lnRef>
-          <a:fillRef idx="1">
-            <a:schemeClr val="accent6"/>
-          </a:fillRef>
-          <a:effectRef idx="0">
-            <a:schemeClr val="accent6"/>
-          </a:effectRef>
-          <a:fontRef idx="minor">
-            <a:schemeClr val="lt1"/>
-          </a:fontRef>
-        </p:style>
-        <p:txBody>
-          <a:bodyPr rtlCol="0" anchor="ctr"/>
-          <a:lstStyle/>
-          <a:p>
-            <a:pPr algn="ctr"/>
-            <a:endParaRPr lang="en-US"/>
-          </a:p>
-        </p:txBody>
-      </p:sp>
       <p:pic>
         <p:nvPicPr>
-          <p:cNvPr id="5" name="Picture 7"/>
+          <p:cNvPr id="3075" name="Picture 3"/>
           <p:cNvPicPr>
             <a:picLocks noChangeAspect="1" noChangeArrowheads="1"/>
           </p:cNvPicPr>
           <p:nvPr/>
         </p:nvPicPr>
         <p:blipFill>
-          <a:blip r:embed="rId2" cstate="print">
+          <a:blip r:embed="rId2">
             <a:extLst>
               <a:ext uri="{28A0092B-C50C-407E-A947-70E740481C1C}">
                 <a14:useLocalDpi xmlns:a14="http://schemas.microsoft.com/office/drawing/2010/main" val="0"/>
@@ -8883,8 +8762,8 @@
         </p:blipFill>
         <p:spPr bwMode="auto">
           <a:xfrm>
-            <a:off x="5436096" y="5790017"/>
-            <a:ext cx="3528392" cy="1003620"/>
+            <a:off x="356504" y="3448592"/>
+            <a:ext cx="4436272" cy="1459586"/>
           </a:xfrm>
           <a:prstGeom prst="rect">
             <a:avLst/>
@@ -8916,128 +8795,14 @@
       </p:pic>
       <p:pic>
         <p:nvPicPr>
-          <p:cNvPr id="6" name="Picture 5"/>
-          <p:cNvPicPr/>
-          <p:nvPr/>
-        </p:nvPicPr>
-        <p:blipFill>
-          <a:blip r:embed="rId3"/>
-          <a:stretch>
-            <a:fillRect/>
-          </a:stretch>
-        </p:blipFill>
-        <p:spPr>
-          <a:xfrm>
-            <a:off x="5618043" y="3861048"/>
-            <a:ext cx="3346445" cy="1538696"/>
-          </a:xfrm>
-          <a:prstGeom prst="rect">
-            <a:avLst/>
-          </a:prstGeom>
-        </p:spPr>
-      </p:pic>
-      <p:sp>
-        <p:nvSpPr>
-          <p:cNvPr id="7" name="Cube 6"/>
-          <p:cNvSpPr/>
-          <p:nvPr/>
-        </p:nvSpPr>
-        <p:spPr>
-          <a:xfrm>
-            <a:off x="464908" y="1453920"/>
-            <a:ext cx="1728192" cy="1008112"/>
-          </a:xfrm>
-          <a:prstGeom prst="cube">
-            <a:avLst/>
-          </a:prstGeom>
-        </p:spPr>
-        <p:style>
-          <a:lnRef idx="2">
-            <a:schemeClr val="accent1">
-              <a:shade val="50000"/>
-            </a:schemeClr>
-          </a:lnRef>
-          <a:fillRef idx="1">
-            <a:schemeClr val="accent1"/>
-          </a:fillRef>
-          <a:effectRef idx="0">
-            <a:schemeClr val="accent1"/>
-          </a:effectRef>
-          <a:fontRef idx="minor">
-            <a:schemeClr val="lt1"/>
-          </a:fontRef>
-        </p:style>
-        <p:txBody>
-          <a:bodyPr rtlCol="0" anchor="ctr"/>
-          <a:lstStyle/>
-          <a:p>
-            <a:pPr algn="ctr"/>
-            <a:r>
-              <a:rPr lang="nl-NL" dirty="0" smtClean="0"/>
-              <a:t>Air Carrier </a:t>
-            </a:r>
-            <a:r>
-              <a:rPr lang="nl-NL" dirty="0" err="1" smtClean="0"/>
-              <a:t>Suspended</a:t>
-            </a:r>
-            <a:r>
-              <a:rPr lang="nl-NL" dirty="0" smtClean="0"/>
-              <a:t> event</a:t>
-            </a:r>
-            <a:endParaRPr lang="en-US" dirty="0"/>
-          </a:p>
-        </p:txBody>
-      </p:sp>
-      <p:sp>
-        <p:nvSpPr>
-          <p:cNvPr id="8" name="Lightning Bolt 7"/>
-          <p:cNvSpPr/>
-          <p:nvPr/>
-        </p:nvSpPr>
-        <p:spPr>
-          <a:xfrm>
-            <a:off x="1327686" y="1021872"/>
-            <a:ext cx="576064" cy="648072"/>
-          </a:xfrm>
-          <a:prstGeom prst="lightningBolt">
-            <a:avLst/>
-          </a:prstGeom>
-        </p:spPr>
-        <p:style>
-          <a:lnRef idx="2">
-            <a:schemeClr val="accent6">
-              <a:shade val="50000"/>
-            </a:schemeClr>
-          </a:lnRef>
-          <a:fillRef idx="1">
-            <a:schemeClr val="accent6"/>
-          </a:fillRef>
-          <a:effectRef idx="0">
-            <a:schemeClr val="accent6"/>
-          </a:effectRef>
-          <a:fontRef idx="minor">
-            <a:schemeClr val="lt1"/>
-          </a:fontRef>
-        </p:style>
-        <p:txBody>
-          <a:bodyPr rtlCol="0" anchor="ctr"/>
-          <a:lstStyle/>
-          <a:p>
-            <a:pPr algn="ctr"/>
-            <a:endParaRPr lang="en-US"/>
-          </a:p>
-        </p:txBody>
-      </p:sp>
-      <p:pic>
-        <p:nvPicPr>
-          <p:cNvPr id="9" name="Picture 2"/>
+          <p:cNvPr id="3074" name="Picture 2"/>
           <p:cNvPicPr>
             <a:picLocks noChangeAspect="1" noChangeArrowheads="1"/>
           </p:cNvPicPr>
           <p:nvPr/>
         </p:nvPicPr>
         <p:blipFill>
-          <a:blip r:embed="rId4">
+          <a:blip r:embed="rId3">
             <a:extLst>
               <a:ext uri="{28A0092B-C50C-407E-A947-70E740481C1C}">
                 <a14:useLocalDpi xmlns:a14="http://schemas.microsoft.com/office/drawing/2010/main" val="0"/>
@@ -9051,8 +8816,8 @@
         </p:blipFill>
         <p:spPr bwMode="auto">
           <a:xfrm>
-            <a:off x="2909834" y="1627714"/>
-            <a:ext cx="6054654" cy="1850207"/>
+            <a:off x="2835622" y="1622889"/>
+            <a:ext cx="6295166" cy="2123022"/>
           </a:xfrm>
           <a:prstGeom prst="rect">
             <a:avLst/>
@@ -9082,6 +8847,242 @@
           </a:extLst>
         </p:spPr>
       </p:pic>
+      <p:sp>
+        <p:nvSpPr>
+          <p:cNvPr id="2" name="Title 1"/>
+          <p:cNvSpPr>
+            <a:spLocks noGrp="1"/>
+          </p:cNvSpPr>
+          <p:nvPr>
+            <p:ph type="title"/>
+          </p:nvPr>
+        </p:nvSpPr>
+        <p:spPr/>
+        <p:txBody>
+          <a:bodyPr/>
+          <a:lstStyle/>
+          <a:p>
+            <a:r>
+              <a:rPr lang="nl-NL" dirty="0" err="1" smtClean="0"/>
+              <a:t>Chapter</a:t>
+            </a:r>
+            <a:r>
+              <a:rPr lang="nl-NL" dirty="0" smtClean="0"/>
+              <a:t> 15</a:t>
+            </a:r>
+            <a:endParaRPr lang="en-US" dirty="0"/>
+          </a:p>
+        </p:txBody>
+      </p:sp>
+      <p:sp>
+        <p:nvSpPr>
+          <p:cNvPr id="3" name="Cube 2"/>
+          <p:cNvSpPr/>
+          <p:nvPr/>
+        </p:nvSpPr>
+        <p:spPr>
+          <a:xfrm>
+            <a:off x="2741031" y="5517232"/>
+            <a:ext cx="1728192" cy="1008112"/>
+          </a:xfrm>
+          <a:prstGeom prst="cube">
+            <a:avLst/>
+          </a:prstGeom>
+        </p:spPr>
+        <p:style>
+          <a:lnRef idx="2">
+            <a:schemeClr val="accent1">
+              <a:shade val="50000"/>
+            </a:schemeClr>
+          </a:lnRef>
+          <a:fillRef idx="1">
+            <a:schemeClr val="accent1"/>
+          </a:fillRef>
+          <a:effectRef idx="0">
+            <a:schemeClr val="accent1"/>
+          </a:effectRef>
+          <a:fontRef idx="minor">
+            <a:schemeClr val="lt1"/>
+          </a:fontRef>
+        </p:style>
+        <p:txBody>
+          <a:bodyPr rtlCol="0" anchor="ctr"/>
+          <a:lstStyle/>
+          <a:p>
+            <a:pPr algn="ctr"/>
+            <a:r>
+              <a:rPr lang="nl-NL" dirty="0" err="1" smtClean="0"/>
+              <a:t>FlightStatus</a:t>
+            </a:r>
+            <a:r>
+              <a:rPr lang="nl-NL" dirty="0" smtClean="0"/>
+              <a:t/>
+            </a:r>
+            <a:br>
+              <a:rPr lang="nl-NL" dirty="0" smtClean="0"/>
+            </a:br>
+            <a:r>
+              <a:rPr lang="nl-NL" dirty="0" smtClean="0"/>
+              <a:t>Update event</a:t>
+            </a:r>
+            <a:endParaRPr lang="en-US" dirty="0"/>
+          </a:p>
+        </p:txBody>
+      </p:sp>
+      <p:sp>
+        <p:nvSpPr>
+          <p:cNvPr id="4" name="Lightning Bolt 3"/>
+          <p:cNvSpPr/>
+          <p:nvPr/>
+        </p:nvSpPr>
+        <p:spPr>
+          <a:xfrm>
+            <a:off x="3603809" y="5085184"/>
+            <a:ext cx="576064" cy="648072"/>
+          </a:xfrm>
+          <a:prstGeom prst="lightningBolt">
+            <a:avLst/>
+          </a:prstGeom>
+        </p:spPr>
+        <p:style>
+          <a:lnRef idx="2">
+            <a:schemeClr val="accent6">
+              <a:shade val="50000"/>
+            </a:schemeClr>
+          </a:lnRef>
+          <a:fillRef idx="1">
+            <a:schemeClr val="accent6"/>
+          </a:fillRef>
+          <a:effectRef idx="0">
+            <a:schemeClr val="accent6"/>
+          </a:effectRef>
+          <a:fontRef idx="minor">
+            <a:schemeClr val="lt1"/>
+          </a:fontRef>
+        </p:style>
+        <p:txBody>
+          <a:bodyPr rtlCol="0" anchor="ctr"/>
+          <a:lstStyle/>
+          <a:p>
+            <a:pPr algn="ctr"/>
+            <a:endParaRPr lang="en-US"/>
+          </a:p>
+        </p:txBody>
+      </p:sp>
+      <p:pic>
+        <p:nvPicPr>
+          <p:cNvPr id="6" name="Picture 5"/>
+          <p:cNvPicPr/>
+          <p:nvPr/>
+        </p:nvPicPr>
+        <p:blipFill>
+          <a:blip r:embed="rId4"/>
+          <a:stretch>
+            <a:fillRect/>
+          </a:stretch>
+        </p:blipFill>
+        <p:spPr>
+          <a:xfrm>
+            <a:off x="5618043" y="3861048"/>
+            <a:ext cx="3346445" cy="1538696"/>
+          </a:xfrm>
+          <a:prstGeom prst="rect">
+            <a:avLst/>
+          </a:prstGeom>
+        </p:spPr>
+      </p:pic>
+      <p:sp>
+        <p:nvSpPr>
+          <p:cNvPr id="7" name="Cube 6"/>
+          <p:cNvSpPr/>
+          <p:nvPr/>
+        </p:nvSpPr>
+        <p:spPr>
+          <a:xfrm>
+            <a:off x="464908" y="1453920"/>
+            <a:ext cx="1728192" cy="1008112"/>
+          </a:xfrm>
+          <a:prstGeom prst="cube">
+            <a:avLst/>
+          </a:prstGeom>
+        </p:spPr>
+        <p:style>
+          <a:lnRef idx="2">
+            <a:schemeClr val="accent1">
+              <a:shade val="50000"/>
+            </a:schemeClr>
+          </a:lnRef>
+          <a:fillRef idx="1">
+            <a:schemeClr val="accent1"/>
+          </a:fillRef>
+          <a:effectRef idx="0">
+            <a:schemeClr val="accent1"/>
+          </a:effectRef>
+          <a:fontRef idx="minor">
+            <a:schemeClr val="lt1"/>
+          </a:fontRef>
+        </p:style>
+        <p:txBody>
+          <a:bodyPr rtlCol="0" anchor="ctr"/>
+          <a:lstStyle/>
+          <a:p>
+            <a:pPr algn="ctr"/>
+            <a:r>
+              <a:rPr lang="nl-NL" dirty="0" smtClean="0"/>
+              <a:t>Air Carrier </a:t>
+            </a:r>
+            <a:r>
+              <a:rPr lang="nl-NL" dirty="0" err="1" smtClean="0"/>
+              <a:t>Suspended</a:t>
+            </a:r>
+            <a:r>
+              <a:rPr lang="nl-NL" dirty="0" smtClean="0"/>
+              <a:t> event</a:t>
+            </a:r>
+            <a:endParaRPr lang="en-US" dirty="0"/>
+          </a:p>
+        </p:txBody>
+      </p:sp>
+      <p:sp>
+        <p:nvSpPr>
+          <p:cNvPr id="8" name="Lightning Bolt 7"/>
+          <p:cNvSpPr/>
+          <p:nvPr/>
+        </p:nvSpPr>
+        <p:spPr>
+          <a:xfrm>
+            <a:off x="1327686" y="1021872"/>
+            <a:ext cx="576064" cy="648072"/>
+          </a:xfrm>
+          <a:prstGeom prst="lightningBolt">
+            <a:avLst/>
+          </a:prstGeom>
+        </p:spPr>
+        <p:style>
+          <a:lnRef idx="2">
+            <a:schemeClr val="accent6">
+              <a:shade val="50000"/>
+            </a:schemeClr>
+          </a:lnRef>
+          <a:fillRef idx="1">
+            <a:schemeClr val="accent6"/>
+          </a:fillRef>
+          <a:effectRef idx="0">
+            <a:schemeClr val="accent6"/>
+          </a:effectRef>
+          <a:fontRef idx="minor">
+            <a:schemeClr val="lt1"/>
+          </a:fontRef>
+        </p:style>
+        <p:txBody>
+          <a:bodyPr rtlCol="0" anchor="ctr"/>
+          <a:lstStyle/>
+          <a:p>
+            <a:pPr algn="ctr"/>
+            <a:endParaRPr lang="en-US"/>
+          </a:p>
+        </p:txBody>
+      </p:sp>
       <p:sp>
         <p:nvSpPr>
           <p:cNvPr id="11" name="Freeform 10"/>
@@ -9186,50 +9187,6 @@
           </a:p>
         </p:txBody>
       </p:sp>
-      <p:sp>
-        <p:nvSpPr>
-          <p:cNvPr id="12" name="Rounded Rectangle 11"/>
-          <p:cNvSpPr/>
-          <p:nvPr/>
-        </p:nvSpPr>
-        <p:spPr>
-          <a:xfrm>
-            <a:off x="1547664" y="3745911"/>
-            <a:ext cx="2053952" cy="887183"/>
-          </a:xfrm>
-          <a:prstGeom prst="roundRect">
-            <a:avLst/>
-          </a:prstGeom>
-        </p:spPr>
-        <p:style>
-          <a:lnRef idx="2">
-            <a:schemeClr val="accent1">
-              <a:shade val="50000"/>
-            </a:schemeClr>
-          </a:lnRef>
-          <a:fillRef idx="1">
-            <a:schemeClr val="accent1"/>
-          </a:fillRef>
-          <a:effectRef idx="0">
-            <a:schemeClr val="accent1"/>
-          </a:effectRef>
-          <a:fontRef idx="minor">
-            <a:schemeClr val="lt1"/>
-          </a:fontRef>
-        </p:style>
-        <p:txBody>
-          <a:bodyPr rtlCol="0" anchor="ctr"/>
-          <a:lstStyle/>
-          <a:p>
-            <a:pPr algn="ctr"/>
-            <a:r>
-              <a:rPr lang="nl-NL" dirty="0" err="1" smtClean="0"/>
-              <a:t>FlightCanceller</a:t>
-            </a:r>
-            <a:endParaRPr lang="en-US" dirty="0"/>
-          </a:p>
-        </p:txBody>
-      </p:sp>
       <p:cxnSp>
         <p:nvCxnSpPr>
           <p:cNvPr id="14" name="Straight Arrow Connector 13"/>
@@ -9238,8 +9195,8 @@
         </p:nvCxnSpPr>
         <p:spPr>
           <a:xfrm>
-            <a:off x="3010642" y="4633094"/>
-            <a:ext cx="360040" cy="884138"/>
+            <a:off x="2411760" y="4434642"/>
+            <a:ext cx="958922" cy="1082590"/>
           </a:xfrm>
           <a:prstGeom prst="straightConnector1">
             <a:avLst/>
@@ -9266,15 +9223,13 @@
       <p:cxnSp>
         <p:nvCxnSpPr>
           <p:cNvPr id="16" name="Straight Arrow Connector 15"/>
-          <p:cNvCxnSpPr>
-            <a:stCxn id="12" idx="2"/>
-          </p:cNvCxnSpPr>
+          <p:cNvCxnSpPr/>
           <p:nvPr/>
         </p:nvCxnSpPr>
         <p:spPr>
           <a:xfrm>
-            <a:off x="2574640" y="4633094"/>
-            <a:ext cx="616022" cy="884138"/>
+            <a:off x="2411760" y="4434642"/>
+            <a:ext cx="778902" cy="1082590"/>
           </a:xfrm>
           <a:prstGeom prst="straightConnector1">
             <a:avLst/>
@@ -9306,8 +9261,8 @@
         </p:nvCxnSpPr>
         <p:spPr>
           <a:xfrm>
-            <a:off x="2036810" y="4633094"/>
-            <a:ext cx="845841" cy="936105"/>
+            <a:off x="2339752" y="4434642"/>
+            <a:ext cx="542899" cy="1134557"/>
           </a:xfrm>
           <a:prstGeom prst="straightConnector1">
             <a:avLst/>
@@ -11784,6 +11739,63 @@
     <p:extLst>
       <p:ext uri="{BB962C8B-B14F-4D97-AF65-F5344CB8AC3E}">
         <p14:creationId xmlns:p14="http://schemas.microsoft.com/office/powerpoint/2010/main" val="2597445144"/>
+      </p:ext>
+    </p:extLst>
+  </p:cSld>
+  <p:clrMapOvr>
+    <a:masterClrMapping/>
+  </p:clrMapOvr>
+</p:sld>
+</file>
+
+<file path=ppt/slides/slide21.xml><?xml version="1.0" encoding="utf-8"?>
+<p:sld xmlns:a="http://schemas.openxmlformats.org/drawingml/2006/main" xmlns:r="http://schemas.openxmlformats.org/officeDocument/2006/relationships" xmlns:p="http://schemas.openxmlformats.org/presentationml/2006/main">
+  <p:cSld>
+    <p:spTree>
+      <p:nvGrpSpPr>
+        <p:cNvPr id="1" name=""/>
+        <p:cNvGrpSpPr/>
+        <p:nvPr/>
+      </p:nvGrpSpPr>
+      <p:grpSpPr>
+        <a:xfrm>
+          <a:off x="0" y="0"/>
+          <a:ext cx="0" cy="0"/>
+          <a:chOff x="0" y="0"/>
+          <a:chExt cx="0" cy="0"/>
+        </a:xfrm>
+      </p:grpSpPr>
+      <p:sp>
+        <p:nvSpPr>
+          <p:cNvPr id="2" name="Title 1"/>
+          <p:cNvSpPr>
+            <a:spLocks noGrp="1"/>
+          </p:cNvSpPr>
+          <p:nvPr>
+            <p:ph type="title"/>
+          </p:nvPr>
+        </p:nvSpPr>
+        <p:spPr/>
+        <p:txBody>
+          <a:bodyPr/>
+          <a:lstStyle/>
+          <a:p>
+            <a:r>
+              <a:rPr lang="nl-NL" dirty="0" err="1" smtClean="0"/>
+              <a:t>Chapter</a:t>
+            </a:r>
+            <a:r>
+              <a:rPr lang="nl-NL" dirty="0" smtClean="0"/>
+              <a:t> 16</a:t>
+            </a:r>
+            <a:endParaRPr lang="en-US" dirty="0"/>
+          </a:p>
+        </p:txBody>
+      </p:sp>
+    </p:spTree>
+    <p:extLst>
+      <p:ext uri="{BB962C8B-B14F-4D97-AF65-F5344CB8AC3E}">
+        <p14:creationId xmlns:p14="http://schemas.microsoft.com/office/powerpoint/2010/main" val="1567605004"/>
       </p:ext>
     </p:extLst>
   </p:cSld>

</xml_diff>

<commit_message>
added chapter 18 overview
</commit_message>
<xml_diff>
--- a/ChapterOverviews_picturesOfService.pptx
+++ b/ChapterOverviews_picturesOfService.pptx
@@ -33,9 +33,12 @@
     <p:sldId id="287" r:id="rId27"/>
     <p:sldId id="286" r:id="rId28"/>
     <p:sldId id="282" r:id="rId29"/>
-    <p:sldId id="283" r:id="rId30"/>
-    <p:sldId id="284" r:id="rId31"/>
-    <p:sldId id="285" r:id="rId32"/>
+    <p:sldId id="288" r:id="rId30"/>
+    <p:sldId id="290" r:id="rId31"/>
+    <p:sldId id="289" r:id="rId32"/>
+    <p:sldId id="283" r:id="rId33"/>
+    <p:sldId id="284" r:id="rId34"/>
+    <p:sldId id="285" r:id="rId35"/>
   </p:sldIdLst>
   <p:sldSz cx="9144000" cy="6858000" type="screen4x3"/>
   <p:notesSz cx="6858000" cy="9144000"/>
@@ -318,7 +321,7 @@
           <a:p>
             <a:fld id="{56109F2C-2545-4AE2-8C8C-1380225067C3}" type="datetimeFigureOut">
               <a:rPr lang="en-US" smtClean="0"/>
-              <a:t>10/19/2014</a:t>
+              <a:t>11/11/2014</a:t>
             </a:fld>
             <a:endParaRPr lang="en-US"/>
           </a:p>
@@ -488,7 +491,7 @@
           <a:p>
             <a:fld id="{56109F2C-2545-4AE2-8C8C-1380225067C3}" type="datetimeFigureOut">
               <a:rPr lang="en-US" smtClean="0"/>
-              <a:t>10/19/2014</a:t>
+              <a:t>11/11/2014</a:t>
             </a:fld>
             <a:endParaRPr lang="en-US"/>
           </a:p>
@@ -668,7 +671,7 @@
           <a:p>
             <a:fld id="{56109F2C-2545-4AE2-8C8C-1380225067C3}" type="datetimeFigureOut">
               <a:rPr lang="en-US" smtClean="0"/>
-              <a:t>10/19/2014</a:t>
+              <a:t>11/11/2014</a:t>
             </a:fld>
             <a:endParaRPr lang="en-US"/>
           </a:p>
@@ -838,7 +841,7 @@
           <a:p>
             <a:fld id="{56109F2C-2545-4AE2-8C8C-1380225067C3}" type="datetimeFigureOut">
               <a:rPr lang="en-US" smtClean="0"/>
-              <a:t>10/19/2014</a:t>
+              <a:t>11/11/2014</a:t>
             </a:fld>
             <a:endParaRPr lang="en-US"/>
           </a:p>
@@ -1084,7 +1087,7 @@
           <a:p>
             <a:fld id="{56109F2C-2545-4AE2-8C8C-1380225067C3}" type="datetimeFigureOut">
               <a:rPr lang="en-US" smtClean="0"/>
-              <a:t>10/19/2014</a:t>
+              <a:t>11/11/2014</a:t>
             </a:fld>
             <a:endParaRPr lang="en-US"/>
           </a:p>
@@ -1372,7 +1375,7 @@
           <a:p>
             <a:fld id="{56109F2C-2545-4AE2-8C8C-1380225067C3}" type="datetimeFigureOut">
               <a:rPr lang="en-US" smtClean="0"/>
-              <a:t>10/19/2014</a:t>
+              <a:t>11/11/2014</a:t>
             </a:fld>
             <a:endParaRPr lang="en-US"/>
           </a:p>
@@ -1794,7 +1797,7 @@
           <a:p>
             <a:fld id="{56109F2C-2545-4AE2-8C8C-1380225067C3}" type="datetimeFigureOut">
               <a:rPr lang="en-US" smtClean="0"/>
-              <a:t>10/19/2014</a:t>
+              <a:t>11/11/2014</a:t>
             </a:fld>
             <a:endParaRPr lang="en-US"/>
           </a:p>
@@ -1912,7 +1915,7 @@
           <a:p>
             <a:fld id="{56109F2C-2545-4AE2-8C8C-1380225067C3}" type="datetimeFigureOut">
               <a:rPr lang="en-US" smtClean="0"/>
-              <a:t>10/19/2014</a:t>
+              <a:t>11/11/2014</a:t>
             </a:fld>
             <a:endParaRPr lang="en-US"/>
           </a:p>
@@ -2007,7 +2010,7 @@
           <a:p>
             <a:fld id="{56109F2C-2545-4AE2-8C8C-1380225067C3}" type="datetimeFigureOut">
               <a:rPr lang="en-US" smtClean="0"/>
-              <a:t>10/19/2014</a:t>
+              <a:t>11/11/2014</a:t>
             </a:fld>
             <a:endParaRPr lang="en-US"/>
           </a:p>
@@ -2284,7 +2287,7 @@
           <a:p>
             <a:fld id="{56109F2C-2545-4AE2-8C8C-1380225067C3}" type="datetimeFigureOut">
               <a:rPr lang="en-US" smtClean="0"/>
-              <a:t>10/19/2014</a:t>
+              <a:t>11/11/2014</a:t>
             </a:fld>
             <a:endParaRPr lang="en-US"/>
           </a:p>
@@ -2537,7 +2540,7 @@
           <a:p>
             <a:fld id="{56109F2C-2545-4AE2-8C8C-1380225067C3}" type="datetimeFigureOut">
               <a:rPr lang="en-US" smtClean="0"/>
-              <a:t>10/19/2014</a:t>
+              <a:t>11/11/2014</a:t>
             </a:fld>
             <a:endParaRPr lang="en-US"/>
           </a:p>
@@ -2750,7 +2753,7 @@
           <a:p>
             <a:fld id="{56109F2C-2545-4AE2-8C8C-1380225067C3}" type="datetimeFigureOut">
               <a:rPr lang="en-US" smtClean="0"/>
-              <a:t>10/19/2014</a:t>
+              <a:t>11/11/2014</a:t>
             </a:fld>
             <a:endParaRPr lang="en-US"/>
           </a:p>
@@ -29067,6 +29070,28 @@
           </a:p>
         </p:txBody>
       </p:sp>
+      <p:pic>
+        <p:nvPicPr>
+          <p:cNvPr id="3" name="Picture 2"/>
+          <p:cNvPicPr/>
+          <p:nvPr/>
+        </p:nvPicPr>
+        <p:blipFill>
+          <a:blip r:embed="rId2"/>
+          <a:stretch>
+            <a:fillRect/>
+          </a:stretch>
+        </p:blipFill>
+        <p:spPr>
+          <a:xfrm>
+            <a:off x="1475656" y="2276872"/>
+            <a:ext cx="5972810" cy="3766185"/>
+          </a:xfrm>
+          <a:prstGeom prst="rect">
+            <a:avLst/>
+          </a:prstGeom>
+        </p:spPr>
+      </p:pic>
     </p:spTree>
     <p:extLst>
       <p:ext uri="{BB962C8B-B14F-4D97-AF65-F5344CB8AC3E}">
@@ -29109,42 +29134,39 @@
         </p:nvSpPr>
         <p:spPr/>
         <p:txBody>
-          <a:bodyPr>
-            <a:normAutofit fontScale="90000"/>
-          </a:bodyPr>
-          <a:lstStyle/>
-          <a:p>
-            <a:r>
-              <a:rPr lang="nl-NL" dirty="0" err="1" smtClean="0"/>
-              <a:t>Chapter</a:t>
-            </a:r>
-            <a:r>
-              <a:rPr lang="nl-NL" dirty="0" smtClean="0"/>
-              <a:t> 19</a:t>
-            </a:r>
-            <a:br>
-              <a:rPr lang="nl-NL" dirty="0" smtClean="0"/>
-            </a:br>
-            <a:r>
-              <a:rPr lang="nl-NL" dirty="0" smtClean="0"/>
-              <a:t>BPM(N) </a:t>
-            </a:r>
-            <a:r>
-              <a:rPr lang="nl-NL" dirty="0" err="1" smtClean="0"/>
-              <a:t>and</a:t>
-            </a:r>
-            <a:r>
-              <a:rPr lang="nl-NL" dirty="0" smtClean="0"/>
-              <a:t> ACM</a:t>
-            </a:r>
-            <a:endParaRPr lang="en-US" dirty="0"/>
-          </a:p>
-        </p:txBody>
-      </p:sp>
+          <a:bodyPr/>
+          <a:lstStyle/>
+          <a:p>
+            <a:endParaRPr lang="en-US"/>
+          </a:p>
+        </p:txBody>
+      </p:sp>
+      <p:pic>
+        <p:nvPicPr>
+          <p:cNvPr id="3" name="Picture 2"/>
+          <p:cNvPicPr/>
+          <p:nvPr/>
+        </p:nvPicPr>
+        <p:blipFill>
+          <a:blip r:embed="rId2"/>
+          <a:stretch>
+            <a:fillRect/>
+          </a:stretch>
+        </p:blipFill>
+        <p:spPr>
+          <a:xfrm>
+            <a:off x="1331640" y="2060848"/>
+            <a:ext cx="5227320" cy="3810000"/>
+          </a:xfrm>
+          <a:prstGeom prst="rect">
+            <a:avLst/>
+          </a:prstGeom>
+        </p:spPr>
+      </p:pic>
     </p:spTree>
     <p:extLst>
       <p:ext uri="{BB962C8B-B14F-4D97-AF65-F5344CB8AC3E}">
-        <p14:creationId xmlns:p14="http://schemas.microsoft.com/office/powerpoint/2010/main" val="2552142499"/>
+        <p14:creationId xmlns:p14="http://schemas.microsoft.com/office/powerpoint/2010/main" val="1449893543"/>
       </p:ext>
     </p:extLst>
   </p:cSld>
@@ -29730,6 +29752,189 @@
         </p:nvSpPr>
         <p:spPr/>
         <p:txBody>
+          <a:bodyPr/>
+          <a:lstStyle/>
+          <a:p>
+            <a:endParaRPr lang="en-US"/>
+          </a:p>
+        </p:txBody>
+      </p:sp>
+      <p:pic>
+        <p:nvPicPr>
+          <p:cNvPr id="1028" name="Picture 4" descr="C:\Users\lucas_j\AppData\Local\Temp\SNAGHTMLa89178.PNG"/>
+          <p:cNvPicPr>
+            <a:picLocks noChangeAspect="1" noChangeArrowheads="1"/>
+          </p:cNvPicPr>
+          <p:nvPr/>
+        </p:nvPicPr>
+        <p:blipFill>
+          <a:blip r:embed="rId2">
+            <a:extLst>
+              <a:ext uri="{28A0092B-C50C-407E-A947-70E740481C1C}">
+                <a14:useLocalDpi xmlns:a14="http://schemas.microsoft.com/office/drawing/2010/main" val="0"/>
+              </a:ext>
+            </a:extLst>
+          </a:blip>
+          <a:srcRect/>
+          <a:stretch>
+            <a:fillRect/>
+          </a:stretch>
+        </p:blipFill>
+        <p:spPr bwMode="auto">
+          <a:xfrm>
+            <a:off x="356719" y="1163695"/>
+            <a:ext cx="8535761" cy="5547420"/>
+          </a:xfrm>
+          <a:prstGeom prst="rect">
+            <a:avLst/>
+          </a:prstGeom>
+          <a:noFill/>
+          <a:extLst>
+            <a:ext uri="{909E8E84-426E-40DD-AFC4-6F175D3DCCD1}">
+              <a14:hiddenFill xmlns:a14="http://schemas.microsoft.com/office/drawing/2010/main">
+                <a:solidFill>
+                  <a:srgbClr val="FFFFFF"/>
+                </a:solidFill>
+              </a14:hiddenFill>
+            </a:ext>
+          </a:extLst>
+        </p:spPr>
+      </p:pic>
+    </p:spTree>
+    <p:extLst>
+      <p:ext uri="{BB962C8B-B14F-4D97-AF65-F5344CB8AC3E}">
+        <p14:creationId xmlns:p14="http://schemas.microsoft.com/office/powerpoint/2010/main" val="2865386228"/>
+      </p:ext>
+    </p:extLst>
+  </p:cSld>
+  <p:clrMapOvr>
+    <a:masterClrMapping/>
+  </p:clrMapOvr>
+</p:sld>
+</file>
+
+<file path=ppt/slides/slide31.xml><?xml version="1.0" encoding="utf-8"?>
+<p:sld xmlns:a="http://schemas.openxmlformats.org/drawingml/2006/main" xmlns:r="http://schemas.openxmlformats.org/officeDocument/2006/relationships" xmlns:p="http://schemas.openxmlformats.org/presentationml/2006/main">
+  <p:cSld>
+    <p:spTree>
+      <p:nvGrpSpPr>
+        <p:cNvPr id="1" name=""/>
+        <p:cNvGrpSpPr/>
+        <p:nvPr/>
+      </p:nvGrpSpPr>
+      <p:grpSpPr>
+        <a:xfrm>
+          <a:off x="0" y="0"/>
+          <a:ext cx="0" cy="0"/>
+          <a:chOff x="0" y="0"/>
+          <a:chExt cx="0" cy="0"/>
+        </a:xfrm>
+      </p:grpSpPr>
+      <p:sp>
+        <p:nvSpPr>
+          <p:cNvPr id="2" name="Title 1"/>
+          <p:cNvSpPr>
+            <a:spLocks noGrp="1"/>
+          </p:cNvSpPr>
+          <p:nvPr>
+            <p:ph type="title"/>
+          </p:nvPr>
+        </p:nvSpPr>
+        <p:spPr/>
+        <p:txBody>
+          <a:bodyPr/>
+          <a:lstStyle/>
+          <a:p>
+            <a:endParaRPr lang="en-US"/>
+          </a:p>
+        </p:txBody>
+      </p:sp>
+      <p:pic>
+        <p:nvPicPr>
+          <p:cNvPr id="4" name="Picture 3"/>
+          <p:cNvPicPr/>
+          <p:nvPr/>
+        </p:nvPicPr>
+        <p:blipFill>
+          <a:blip r:embed="rId2"/>
+          <a:stretch>
+            <a:fillRect/>
+          </a:stretch>
+        </p:blipFill>
+        <p:spPr>
+          <a:xfrm>
+            <a:off x="35496" y="44624"/>
+            <a:ext cx="8136904" cy="4104456"/>
+          </a:xfrm>
+          <a:prstGeom prst="rect">
+            <a:avLst/>
+          </a:prstGeom>
+        </p:spPr>
+      </p:pic>
+      <p:pic>
+        <p:nvPicPr>
+          <p:cNvPr id="3" name="Picture 2"/>
+          <p:cNvPicPr/>
+          <p:nvPr/>
+        </p:nvPicPr>
+        <p:blipFill>
+          <a:blip r:embed="rId3"/>
+          <a:stretch>
+            <a:fillRect/>
+          </a:stretch>
+        </p:blipFill>
+        <p:spPr>
+          <a:xfrm>
+            <a:off x="6156176" y="3068960"/>
+            <a:ext cx="2952328" cy="3744416"/>
+          </a:xfrm>
+          <a:prstGeom prst="rect">
+            <a:avLst/>
+          </a:prstGeom>
+        </p:spPr>
+      </p:pic>
+    </p:spTree>
+    <p:extLst>
+      <p:ext uri="{BB962C8B-B14F-4D97-AF65-F5344CB8AC3E}">
+        <p14:creationId xmlns:p14="http://schemas.microsoft.com/office/powerpoint/2010/main" val="2929260844"/>
+      </p:ext>
+    </p:extLst>
+  </p:cSld>
+  <p:clrMapOvr>
+    <a:masterClrMapping/>
+  </p:clrMapOvr>
+</p:sld>
+</file>
+
+<file path=ppt/slides/slide32.xml><?xml version="1.0" encoding="utf-8"?>
+<p:sld xmlns:a="http://schemas.openxmlformats.org/drawingml/2006/main" xmlns:r="http://schemas.openxmlformats.org/officeDocument/2006/relationships" xmlns:p="http://schemas.openxmlformats.org/presentationml/2006/main">
+  <p:cSld>
+    <p:spTree>
+      <p:nvGrpSpPr>
+        <p:cNvPr id="1" name=""/>
+        <p:cNvGrpSpPr/>
+        <p:nvPr/>
+      </p:nvGrpSpPr>
+      <p:grpSpPr>
+        <a:xfrm>
+          <a:off x="0" y="0"/>
+          <a:ext cx="0" cy="0"/>
+          <a:chOff x="0" y="0"/>
+          <a:chExt cx="0" cy="0"/>
+        </a:xfrm>
+      </p:grpSpPr>
+      <p:sp>
+        <p:nvSpPr>
+          <p:cNvPr id="2" name="Title 1"/>
+          <p:cNvSpPr>
+            <a:spLocks noGrp="1"/>
+          </p:cNvSpPr>
+          <p:nvPr>
+            <p:ph type="title"/>
+          </p:nvPr>
+        </p:nvSpPr>
+        <p:spPr/>
+        <p:txBody>
           <a:bodyPr>
             <a:normAutofit fontScale="90000"/>
           </a:bodyPr>
@@ -29741,12 +29946,86 @@
             </a:r>
             <a:r>
               <a:rPr lang="nl-NL" dirty="0" smtClean="0"/>
-              <a:t> 20</a:t>
+              <a:t> 19</a:t>
             </a:r>
             <a:br>
               <a:rPr lang="nl-NL" dirty="0" smtClean="0"/>
             </a:br>
             <a:r>
+              <a:rPr lang="nl-NL" dirty="0" smtClean="0"/>
+              <a:t>BPM(N) </a:t>
+            </a:r>
+            <a:r>
+              <a:rPr lang="nl-NL" dirty="0" err="1" smtClean="0"/>
+              <a:t>and</a:t>
+            </a:r>
+            <a:r>
+              <a:rPr lang="nl-NL" dirty="0" smtClean="0"/>
+              <a:t> ACM</a:t>
+            </a:r>
+            <a:endParaRPr lang="en-US" dirty="0"/>
+          </a:p>
+        </p:txBody>
+      </p:sp>
+    </p:spTree>
+    <p:extLst>
+      <p:ext uri="{BB962C8B-B14F-4D97-AF65-F5344CB8AC3E}">
+        <p14:creationId xmlns:p14="http://schemas.microsoft.com/office/powerpoint/2010/main" val="2552142499"/>
+      </p:ext>
+    </p:extLst>
+  </p:cSld>
+  <p:clrMapOvr>
+    <a:masterClrMapping/>
+  </p:clrMapOvr>
+</p:sld>
+</file>
+
+<file path=ppt/slides/slide33.xml><?xml version="1.0" encoding="utf-8"?>
+<p:sld xmlns:a="http://schemas.openxmlformats.org/drawingml/2006/main" xmlns:r="http://schemas.openxmlformats.org/officeDocument/2006/relationships" xmlns:p="http://schemas.openxmlformats.org/presentationml/2006/main">
+  <p:cSld>
+    <p:spTree>
+      <p:nvGrpSpPr>
+        <p:cNvPr id="1" name=""/>
+        <p:cNvGrpSpPr/>
+        <p:nvPr/>
+      </p:nvGrpSpPr>
+      <p:grpSpPr>
+        <a:xfrm>
+          <a:off x="0" y="0"/>
+          <a:ext cx="0" cy="0"/>
+          <a:chOff x="0" y="0"/>
+          <a:chExt cx="0" cy="0"/>
+        </a:xfrm>
+      </p:grpSpPr>
+      <p:sp>
+        <p:nvSpPr>
+          <p:cNvPr id="2" name="Title 1"/>
+          <p:cNvSpPr>
+            <a:spLocks noGrp="1"/>
+          </p:cNvSpPr>
+          <p:nvPr>
+            <p:ph type="title"/>
+          </p:nvPr>
+        </p:nvSpPr>
+        <p:spPr/>
+        <p:txBody>
+          <a:bodyPr>
+            <a:normAutofit fontScale="90000"/>
+          </a:bodyPr>
+          <a:lstStyle/>
+          <a:p>
+            <a:r>
+              <a:rPr lang="nl-NL" dirty="0" err="1" smtClean="0"/>
+              <a:t>Chapter</a:t>
+            </a:r>
+            <a:r>
+              <a:rPr lang="nl-NL" dirty="0" smtClean="0"/>
+              <a:t> 20</a:t>
+            </a:r>
+            <a:br>
+              <a:rPr lang="nl-NL" dirty="0" smtClean="0"/>
+            </a:br>
+            <a:r>
               <a:rPr lang="nl-NL" dirty="0" err="1" smtClean="0"/>
               <a:t>Operational</a:t>
             </a:r>
@@ -29787,7 +30066,7 @@
         <p:spPr>
           <a:xfrm>
             <a:off x="1043608" y="2636912"/>
-            <a:ext cx="3125407" cy="1754326"/>
+            <a:ext cx="3669081" cy="2585323"/>
           </a:xfrm>
           <a:prstGeom prst="rect">
             <a:avLst/>
@@ -29874,6 +30153,46 @@
             <a:r>
               <a:rPr lang="nl-NL" dirty="0" err="1" smtClean="0"/>
               <a:t>Reports</a:t>
+            </a:r>
+            <a:endParaRPr lang="nl-NL" dirty="0" smtClean="0"/>
+          </a:p>
+          <a:p>
+            <a:endParaRPr lang="nl-NL" dirty="0"/>
+          </a:p>
+          <a:p>
+            <a:r>
+              <a:rPr lang="nl-NL" dirty="0" smtClean="0"/>
+              <a:t>Look </a:t>
+            </a:r>
+            <a:r>
+              <a:rPr lang="nl-NL" dirty="0" err="1" smtClean="0"/>
+              <a:t>ahead</a:t>
+            </a:r>
+            <a:r>
+              <a:rPr lang="nl-NL" dirty="0" smtClean="0"/>
+              <a:t>:</a:t>
+            </a:r>
+          </a:p>
+          <a:p>
+            <a:r>
+              <a:rPr lang="nl-NL" dirty="0" smtClean="0"/>
+              <a:t>SOA Suite </a:t>
+            </a:r>
+            <a:r>
+              <a:rPr lang="nl-NL" dirty="0" err="1" smtClean="0"/>
+              <a:t>process</a:t>
+            </a:r>
+            <a:r>
+              <a:rPr lang="nl-NL" dirty="0" smtClean="0"/>
+              <a:t> </a:t>
+            </a:r>
+            <a:r>
+              <a:rPr lang="nl-NL" dirty="0" err="1" smtClean="0"/>
+              <a:t>analytics</a:t>
+            </a:r>
+            <a:r>
+              <a:rPr lang="nl-NL" dirty="0" smtClean="0"/>
+              <a:t> (OOW14)</a:t>
             </a:r>
             <a:endParaRPr lang="en-US" dirty="0"/>
           </a:p>
@@ -29892,7 +30211,7 @@
 </p:sld>
 </file>
 
-<file path=ppt/slides/slide31.xml><?xml version="1.0" encoding="utf-8"?>
+<file path=ppt/slides/slide34.xml><?xml version="1.0" encoding="utf-8"?>
 <p:sld xmlns:a="http://schemas.openxmlformats.org/drawingml/2006/main" xmlns:r="http://schemas.openxmlformats.org/officeDocument/2006/relationships" xmlns:p="http://schemas.openxmlformats.org/presentationml/2006/main">
   <p:cSld>
     <p:spTree>

</xml_diff>